<commit_message>
CourseWork - presentation updated.
</commit_message>
<xml_diff>
--- a/course-work/Presentation/Circus - Presentation.pptx
+++ b/course-work/Presentation/Circus - Presentation.pptx
@@ -10,7 +10,12 @@
     <p:sldId id="259" r:id="rId4"/>
     <p:sldId id="260" r:id="rId5"/>
     <p:sldId id="261" r:id="rId6"/>
-    <p:sldId id="262" r:id="rId7"/>
+    <p:sldId id="264" r:id="rId7"/>
+    <p:sldId id="262" r:id="rId8"/>
+    <p:sldId id="267" r:id="rId9"/>
+    <p:sldId id="265" r:id="rId10"/>
+    <p:sldId id="266" r:id="rId11"/>
+    <p:sldId id="268" r:id="rId12"/>
   </p:sldIdLst>
   <p:sldSz cx="12192000" cy="6858000"/>
   <p:notesSz cx="6858000" cy="9144000"/>
@@ -109,6 +114,11 @@
       </a:defRPr>
     </a:lvl9pPr>
   </p:defaultTextStyle>
+  <p:extLst>
+    <p:ext uri="{EFAFB233-063F-42B5-8137-9DF3F51BA10A}">
+      <p15:sldGuideLst xmlns:p15="http://schemas.microsoft.com/office/powerpoint/2012/main"/>
+    </p:ext>
+  </p:extLst>
 </p:presentation>
 </file>
 
@@ -298,7 +308,7 @@
           <a:p>
             <a:fld id="{12FDE44A-B5A5-422E-A044-ACFC71B9BE9C}" type="datetimeFigureOut">
               <a:rPr lang="ru-RU" smtClean="0"/>
-              <a:t>05.06.2021</a:t>
+              <a:t>09.06.2021</a:t>
             </a:fld>
             <a:endParaRPr lang="ru-RU"/>
           </a:p>
@@ -573,7 +583,7 @@
           <a:p>
             <a:fld id="{12FDE44A-B5A5-422E-A044-ACFC71B9BE9C}" type="datetimeFigureOut">
               <a:rPr lang="ru-RU" smtClean="0"/>
-              <a:t>05.06.2021</a:t>
+              <a:t>09.06.2021</a:t>
             </a:fld>
             <a:endParaRPr lang="ru-RU"/>
           </a:p>
@@ -767,7 +777,7 @@
           <a:p>
             <a:fld id="{12FDE44A-B5A5-422E-A044-ACFC71B9BE9C}" type="datetimeFigureOut">
               <a:rPr lang="ru-RU" smtClean="0"/>
-              <a:t>05.06.2021</a:t>
+              <a:t>09.06.2021</a:t>
             </a:fld>
             <a:endParaRPr lang="ru-RU"/>
           </a:p>
@@ -1040,7 +1050,7 @@
           <a:p>
             <a:fld id="{12FDE44A-B5A5-422E-A044-ACFC71B9BE9C}" type="datetimeFigureOut">
               <a:rPr lang="ru-RU" smtClean="0"/>
-              <a:t>05.06.2021</a:t>
+              <a:t>09.06.2021</a:t>
             </a:fld>
             <a:endParaRPr lang="ru-RU"/>
           </a:p>
@@ -1381,7 +1391,7 @@
           <a:p>
             <a:fld id="{12FDE44A-B5A5-422E-A044-ACFC71B9BE9C}" type="datetimeFigureOut">
               <a:rPr lang="ru-RU" smtClean="0"/>
-              <a:t>05.06.2021</a:t>
+              <a:t>09.06.2021</a:t>
             </a:fld>
             <a:endParaRPr lang="ru-RU"/>
           </a:p>
@@ -2004,7 +2014,7 @@
           <a:p>
             <a:fld id="{12FDE44A-B5A5-422E-A044-ACFC71B9BE9C}" type="datetimeFigureOut">
               <a:rPr lang="ru-RU" smtClean="0"/>
-              <a:t>05.06.2021</a:t>
+              <a:t>09.06.2021</a:t>
             </a:fld>
             <a:endParaRPr lang="ru-RU"/>
           </a:p>
@@ -2864,7 +2874,7 @@
           <a:p>
             <a:fld id="{12FDE44A-B5A5-422E-A044-ACFC71B9BE9C}" type="datetimeFigureOut">
               <a:rPr lang="ru-RU" smtClean="0"/>
-              <a:t>05.06.2021</a:t>
+              <a:t>09.06.2021</a:t>
             </a:fld>
             <a:endParaRPr lang="ru-RU"/>
           </a:p>
@@ -3034,7 +3044,7 @@
           <a:p>
             <a:fld id="{12FDE44A-B5A5-422E-A044-ACFC71B9BE9C}" type="datetimeFigureOut">
               <a:rPr lang="ru-RU" smtClean="0"/>
-              <a:t>05.06.2021</a:t>
+              <a:t>09.06.2021</a:t>
             </a:fld>
             <a:endParaRPr lang="ru-RU"/>
           </a:p>
@@ -3214,7 +3224,7 @@
           <a:p>
             <a:fld id="{12FDE44A-B5A5-422E-A044-ACFC71B9BE9C}" type="datetimeFigureOut">
               <a:rPr lang="ru-RU" smtClean="0"/>
-              <a:t>05.06.2021</a:t>
+              <a:t>09.06.2021</a:t>
             </a:fld>
             <a:endParaRPr lang="ru-RU"/>
           </a:p>
@@ -3384,7 +3394,7 @@
           <a:p>
             <a:fld id="{12FDE44A-B5A5-422E-A044-ACFC71B9BE9C}" type="datetimeFigureOut">
               <a:rPr lang="ru-RU" smtClean="0"/>
-              <a:t>05.06.2021</a:t>
+              <a:t>09.06.2021</a:t>
             </a:fld>
             <a:endParaRPr lang="ru-RU"/>
           </a:p>
@@ -3631,7 +3641,7 @@
           <a:p>
             <a:fld id="{12FDE44A-B5A5-422E-A044-ACFC71B9BE9C}" type="datetimeFigureOut">
               <a:rPr lang="ru-RU" smtClean="0"/>
-              <a:t>05.06.2021</a:t>
+              <a:t>09.06.2021</a:t>
             </a:fld>
             <a:endParaRPr lang="ru-RU"/>
           </a:p>
@@ -3923,7 +3933,7 @@
           <a:p>
             <a:fld id="{12FDE44A-B5A5-422E-A044-ACFC71B9BE9C}" type="datetimeFigureOut">
               <a:rPr lang="ru-RU" smtClean="0"/>
-              <a:t>05.06.2021</a:t>
+              <a:t>09.06.2021</a:t>
             </a:fld>
             <a:endParaRPr lang="ru-RU"/>
           </a:p>
@@ -4367,7 +4377,7 @@
           <a:p>
             <a:fld id="{12FDE44A-B5A5-422E-A044-ACFC71B9BE9C}" type="datetimeFigureOut">
               <a:rPr lang="ru-RU" smtClean="0"/>
-              <a:t>05.06.2021</a:t>
+              <a:t>09.06.2021</a:t>
             </a:fld>
             <a:endParaRPr lang="ru-RU"/>
           </a:p>
@@ -4485,7 +4495,7 @@
           <a:p>
             <a:fld id="{12FDE44A-B5A5-422E-A044-ACFC71B9BE9C}" type="datetimeFigureOut">
               <a:rPr lang="ru-RU" smtClean="0"/>
-              <a:t>05.06.2021</a:t>
+              <a:t>09.06.2021</a:t>
             </a:fld>
             <a:endParaRPr lang="ru-RU"/>
           </a:p>
@@ -4580,7 +4590,7 @@
           <a:p>
             <a:fld id="{12FDE44A-B5A5-422E-A044-ACFC71B9BE9C}" type="datetimeFigureOut">
               <a:rPr lang="ru-RU" smtClean="0"/>
-              <a:t>05.06.2021</a:t>
+              <a:t>09.06.2021</a:t>
             </a:fld>
             <a:endParaRPr lang="ru-RU"/>
           </a:p>
@@ -4859,7 +4869,7 @@
           <a:p>
             <a:fld id="{12FDE44A-B5A5-422E-A044-ACFC71B9BE9C}" type="datetimeFigureOut">
               <a:rPr lang="ru-RU" smtClean="0"/>
-              <a:t>05.06.2021</a:t>
+              <a:t>09.06.2021</a:t>
             </a:fld>
             <a:endParaRPr lang="ru-RU"/>
           </a:p>
@@ -5134,7 +5144,7 @@
           <a:p>
             <a:fld id="{12FDE44A-B5A5-422E-A044-ACFC71B9BE9C}" type="datetimeFigureOut">
               <a:rPr lang="ru-RU" smtClean="0"/>
-              <a:t>05.06.2021</a:t>
+              <a:t>09.06.2021</a:t>
             </a:fld>
             <a:endParaRPr lang="ru-RU"/>
           </a:p>
@@ -5563,7 +5573,7 @@
           <a:p>
             <a:fld id="{12FDE44A-B5A5-422E-A044-ACFC71B9BE9C}" type="datetimeFigureOut">
               <a:rPr lang="ru-RU" smtClean="0"/>
-              <a:t>05.06.2021</a:t>
+              <a:t>09.06.2021</a:t>
             </a:fld>
             <a:endParaRPr lang="ru-RU"/>
           </a:p>
@@ -6193,7 +6203,23 @@
           <a:p>
             <a:r>
               <a:rPr lang="en-US" dirty="0" smtClean="0"/>
-              <a:t>Kubernetes / Docker</a:t>
+              <a:t>Kubernetes </a:t>
+            </a:r>
+            <a:r>
+              <a:rPr lang="en-US" dirty="0" smtClean="0"/>
+              <a:t>(Windows </a:t>
+            </a:r>
+            <a:r>
+              <a:rPr lang="en-US" dirty="0" err="1" smtClean="0"/>
+              <a:t>Minikube</a:t>
+            </a:r>
+            <a:r>
+              <a:rPr lang="en-US" dirty="0" smtClean="0"/>
+              <a:t>) / </a:t>
+            </a:r>
+            <a:r>
+              <a:rPr lang="en-US" dirty="0" smtClean="0"/>
+              <a:t>Docker</a:t>
             </a:r>
           </a:p>
           <a:p>
@@ -6239,6 +6265,182 @@
       </p:par>
     </p:tnLst>
   </p:timing>
+</p:sld>
+</file>
+
+<file path=ppt/slides/slide10.xml><?xml version="1.0" encoding="utf-8"?>
+<p:sld xmlns:a="http://schemas.openxmlformats.org/drawingml/2006/main" xmlns:r="http://schemas.openxmlformats.org/officeDocument/2006/relationships" xmlns:p="http://schemas.openxmlformats.org/presentationml/2006/main">
+  <p:cSld>
+    <p:spTree>
+      <p:nvGrpSpPr>
+        <p:cNvPr id="1" name=""/>
+        <p:cNvGrpSpPr/>
+        <p:nvPr/>
+      </p:nvGrpSpPr>
+      <p:grpSpPr>
+        <a:xfrm>
+          <a:off x="0" y="0"/>
+          <a:ext cx="0" cy="0"/>
+          <a:chOff x="0" y="0"/>
+          <a:chExt cx="0" cy="0"/>
+        </a:xfrm>
+      </p:grpSpPr>
+      <p:sp>
+        <p:nvSpPr>
+          <p:cNvPr id="2" name="Title 1"/>
+          <p:cNvSpPr>
+            <a:spLocks noGrp="1"/>
+          </p:cNvSpPr>
+          <p:nvPr>
+            <p:ph type="title"/>
+          </p:nvPr>
+        </p:nvSpPr>
+        <p:spPr/>
+        <p:txBody>
+          <a:bodyPr/>
+          <a:lstStyle/>
+          <a:p>
+            <a:r>
+              <a:rPr lang="en-US" dirty="0" smtClean="0"/>
+              <a:t>Booking Saga State Machine</a:t>
+            </a:r>
+            <a:endParaRPr lang="ru-RU" dirty="0"/>
+          </a:p>
+        </p:txBody>
+      </p:sp>
+      <p:pic>
+        <p:nvPicPr>
+          <p:cNvPr id="6" name="Content Placeholder 5"/>
+          <p:cNvPicPr>
+            <a:picLocks noGrp="1" noChangeAspect="1"/>
+          </p:cNvPicPr>
+          <p:nvPr>
+            <p:ph idx="1"/>
+          </p:nvPr>
+        </p:nvPicPr>
+        <p:blipFill>
+          <a:blip r:embed="rId2">
+            <a:extLst>
+              <a:ext uri="{28A0092B-C50C-407E-A947-70E740481C1C}">
+                <a14:useLocalDpi xmlns:a14="http://schemas.microsoft.com/office/drawing/2010/main" val="0"/>
+              </a:ext>
+            </a:extLst>
+          </a:blip>
+          <a:stretch>
+            <a:fillRect/>
+          </a:stretch>
+        </p:blipFill>
+        <p:spPr>
+          <a:xfrm>
+            <a:off x="2071218" y="2052638"/>
+            <a:ext cx="7011339" cy="4195762"/>
+          </a:xfrm>
+        </p:spPr>
+      </p:pic>
+    </p:spTree>
+    <p:extLst>
+      <p:ext uri="{BB962C8B-B14F-4D97-AF65-F5344CB8AC3E}">
+        <p14:creationId xmlns:p14="http://schemas.microsoft.com/office/powerpoint/2010/main" val="3668730716"/>
+      </p:ext>
+    </p:extLst>
+  </p:cSld>
+  <p:clrMapOvr>
+    <a:masterClrMapping/>
+  </p:clrMapOvr>
+  <p:timing>
+    <p:tnLst>
+      <p:par>
+        <p:cTn id="1" dur="indefinite" restart="never" nodeType="tmRoot"/>
+      </p:par>
+    </p:tnLst>
+  </p:timing>
+</p:sld>
+</file>
+
+<file path=ppt/slides/slide11.xml><?xml version="1.0" encoding="utf-8"?>
+<p:sld xmlns:a="http://schemas.openxmlformats.org/drawingml/2006/main" xmlns:r="http://schemas.openxmlformats.org/officeDocument/2006/relationships" xmlns:p="http://schemas.openxmlformats.org/presentationml/2006/main">
+  <p:cSld>
+    <p:spTree>
+      <p:nvGrpSpPr>
+        <p:cNvPr id="1" name=""/>
+        <p:cNvGrpSpPr/>
+        <p:nvPr/>
+      </p:nvGrpSpPr>
+      <p:grpSpPr>
+        <a:xfrm>
+          <a:off x="0" y="0"/>
+          <a:ext cx="0" cy="0"/>
+          <a:chOff x="0" y="0"/>
+          <a:chExt cx="0" cy="0"/>
+        </a:xfrm>
+      </p:grpSpPr>
+      <p:sp>
+        <p:nvSpPr>
+          <p:cNvPr id="2" name="Title 1"/>
+          <p:cNvSpPr>
+            <a:spLocks noGrp="1"/>
+          </p:cNvSpPr>
+          <p:nvPr>
+            <p:ph type="title"/>
+          </p:nvPr>
+        </p:nvSpPr>
+        <p:spPr>
+          <a:xfrm>
+            <a:off x="646111" y="452718"/>
+            <a:ext cx="9404723" cy="812202"/>
+          </a:xfrm>
+        </p:spPr>
+        <p:txBody>
+          <a:bodyPr/>
+          <a:lstStyle/>
+          <a:p>
+            <a:r>
+              <a:rPr lang="en-US" dirty="0" smtClean="0"/>
+              <a:t>API Gateway</a:t>
+            </a:r>
+            <a:endParaRPr lang="ru-RU" dirty="0"/>
+          </a:p>
+        </p:txBody>
+      </p:sp>
+      <p:pic>
+        <p:nvPicPr>
+          <p:cNvPr id="4" name="Content Placeholder 3"/>
+          <p:cNvPicPr>
+            <a:picLocks noGrp="1" noChangeAspect="1"/>
+          </p:cNvPicPr>
+          <p:nvPr>
+            <p:ph idx="1"/>
+          </p:nvPr>
+        </p:nvPicPr>
+        <p:blipFill>
+          <a:blip r:embed="rId2">
+            <a:extLst>
+              <a:ext uri="{28A0092B-C50C-407E-A947-70E740481C1C}">
+                <a14:useLocalDpi xmlns:a14="http://schemas.microsoft.com/office/drawing/2010/main" val="0"/>
+              </a:ext>
+            </a:extLst>
+          </a:blip>
+          <a:stretch>
+            <a:fillRect/>
+          </a:stretch>
+        </p:blipFill>
+        <p:spPr>
+          <a:xfrm>
+            <a:off x="1333800" y="1265238"/>
+            <a:ext cx="8486176" cy="4983162"/>
+          </a:xfrm>
+        </p:spPr>
+      </p:pic>
+    </p:spTree>
+    <p:extLst>
+      <p:ext uri="{BB962C8B-B14F-4D97-AF65-F5344CB8AC3E}">
+        <p14:creationId xmlns:p14="http://schemas.microsoft.com/office/powerpoint/2010/main" val="1691619045"/>
+      </p:ext>
+    </p:extLst>
+  </p:cSld>
+  <p:clrMapOvr>
+    <a:masterClrMapping/>
+  </p:clrMapOvr>
 </p:sld>
 </file>
 
@@ -6807,6 +7009,95 @@
           <a:p>
             <a:r>
               <a:rPr lang="en-US" dirty="0" smtClean="0"/>
+              <a:t>REST Connectors</a:t>
+            </a:r>
+            <a:endParaRPr lang="ru-RU" dirty="0"/>
+          </a:p>
+        </p:txBody>
+      </p:sp>
+      <p:pic>
+        <p:nvPicPr>
+          <p:cNvPr id="9" name="Content Placeholder 8"/>
+          <p:cNvPicPr>
+            <a:picLocks noGrp="1" noChangeAspect="1"/>
+          </p:cNvPicPr>
+          <p:nvPr>
+            <p:ph idx="1"/>
+          </p:nvPr>
+        </p:nvPicPr>
+        <p:blipFill>
+          <a:blip r:embed="rId2">
+            <a:extLst>
+              <a:ext uri="{28A0092B-C50C-407E-A947-70E740481C1C}">
+                <a14:useLocalDpi xmlns:a14="http://schemas.microsoft.com/office/drawing/2010/main" val="0"/>
+              </a:ext>
+            </a:extLst>
+          </a:blip>
+          <a:stretch>
+            <a:fillRect/>
+          </a:stretch>
+        </p:blipFill>
+        <p:spPr>
+          <a:xfrm>
+            <a:off x="2247900" y="1776412"/>
+            <a:ext cx="6657975" cy="4219575"/>
+          </a:xfrm>
+        </p:spPr>
+      </p:pic>
+    </p:spTree>
+    <p:extLst>
+      <p:ext uri="{BB962C8B-B14F-4D97-AF65-F5344CB8AC3E}">
+        <p14:creationId xmlns:p14="http://schemas.microsoft.com/office/powerpoint/2010/main" val="683105920"/>
+      </p:ext>
+    </p:extLst>
+  </p:cSld>
+  <p:clrMapOvr>
+    <a:masterClrMapping/>
+  </p:clrMapOvr>
+  <p:timing>
+    <p:tnLst>
+      <p:par>
+        <p:cTn id="1" dur="indefinite" restart="never" nodeType="tmRoot"/>
+      </p:par>
+    </p:tnLst>
+  </p:timing>
+</p:sld>
+</file>
+
+<file path=ppt/slides/slide7.xml><?xml version="1.0" encoding="utf-8"?>
+<p:sld xmlns:a="http://schemas.openxmlformats.org/drawingml/2006/main" xmlns:r="http://schemas.openxmlformats.org/officeDocument/2006/relationships" xmlns:p="http://schemas.openxmlformats.org/presentationml/2006/main">
+  <p:cSld>
+    <p:spTree>
+      <p:nvGrpSpPr>
+        <p:cNvPr id="1" name=""/>
+        <p:cNvGrpSpPr/>
+        <p:nvPr/>
+      </p:nvGrpSpPr>
+      <p:grpSpPr>
+        <a:xfrm>
+          <a:off x="0" y="0"/>
+          <a:ext cx="0" cy="0"/>
+          <a:chOff x="0" y="0"/>
+          <a:chExt cx="0" cy="0"/>
+        </a:xfrm>
+      </p:grpSpPr>
+      <p:sp>
+        <p:nvSpPr>
+          <p:cNvPr id="2" name="Title 1"/>
+          <p:cNvSpPr>
+            <a:spLocks noGrp="1"/>
+          </p:cNvSpPr>
+          <p:nvPr>
+            <p:ph type="title"/>
+          </p:nvPr>
+        </p:nvSpPr>
+        <p:spPr/>
+        <p:txBody>
+          <a:bodyPr/>
+          <a:lstStyle/>
+          <a:p>
+            <a:r>
+              <a:rPr lang="en-US" dirty="0" smtClean="0"/>
               <a:t>Messaging</a:t>
             </a:r>
             <a:endParaRPr lang="ru-RU" dirty="0"/>
@@ -6916,6 +7207,196 @@
   <p:clrMapOvr>
     <a:masterClrMapping/>
   </p:clrMapOvr>
+  <p:timing>
+    <p:tnLst>
+      <p:par>
+        <p:cTn id="1" dur="indefinite" restart="never" nodeType="tmRoot"/>
+      </p:par>
+    </p:tnLst>
+  </p:timing>
+</p:sld>
+</file>
+
+<file path=ppt/slides/slide8.xml><?xml version="1.0" encoding="utf-8"?>
+<p:sld xmlns:a="http://schemas.openxmlformats.org/drawingml/2006/main" xmlns:r="http://schemas.openxmlformats.org/officeDocument/2006/relationships" xmlns:p="http://schemas.openxmlformats.org/presentationml/2006/main">
+  <p:cSld>
+    <p:spTree>
+      <p:nvGrpSpPr>
+        <p:cNvPr id="1" name=""/>
+        <p:cNvGrpSpPr/>
+        <p:nvPr/>
+      </p:nvGrpSpPr>
+      <p:grpSpPr>
+        <a:xfrm>
+          <a:off x="0" y="0"/>
+          <a:ext cx="0" cy="0"/>
+          <a:chOff x="0" y="0"/>
+          <a:chExt cx="0" cy="0"/>
+        </a:xfrm>
+      </p:grpSpPr>
+      <p:sp>
+        <p:nvSpPr>
+          <p:cNvPr id="2" name="Title 1"/>
+          <p:cNvSpPr>
+            <a:spLocks noGrp="1"/>
+          </p:cNvSpPr>
+          <p:nvPr>
+            <p:ph type="title"/>
+          </p:nvPr>
+        </p:nvSpPr>
+        <p:spPr>
+          <a:xfrm>
+            <a:off x="646111" y="452718"/>
+            <a:ext cx="9404723" cy="829327"/>
+          </a:xfrm>
+        </p:spPr>
+        <p:txBody>
+          <a:bodyPr/>
+          <a:lstStyle/>
+          <a:p>
+            <a:r>
+              <a:rPr lang="en-US" dirty="0" smtClean="0"/>
+              <a:t>Service Interaction</a:t>
+            </a:r>
+            <a:endParaRPr lang="ru-RU" dirty="0"/>
+          </a:p>
+        </p:txBody>
+      </p:sp>
+      <p:pic>
+        <p:nvPicPr>
+          <p:cNvPr id="4" name="Content Placeholder 3"/>
+          <p:cNvPicPr>
+            <a:picLocks noGrp="1" noChangeAspect="1"/>
+          </p:cNvPicPr>
+          <p:nvPr>
+            <p:ph idx="1"/>
+          </p:nvPr>
+        </p:nvPicPr>
+        <p:blipFill>
+          <a:blip r:embed="rId2">
+            <a:extLst>
+              <a:ext uri="{28A0092B-C50C-407E-A947-70E740481C1C}">
+                <a14:useLocalDpi xmlns:a14="http://schemas.microsoft.com/office/drawing/2010/main" val="0"/>
+              </a:ext>
+            </a:extLst>
+          </a:blip>
+          <a:stretch>
+            <a:fillRect/>
+          </a:stretch>
+        </p:blipFill>
+        <p:spPr>
+          <a:xfrm>
+            <a:off x="2336666" y="1282045"/>
+            <a:ext cx="7137272" cy="5470441"/>
+          </a:xfrm>
+        </p:spPr>
+      </p:pic>
+    </p:spTree>
+    <p:extLst>
+      <p:ext uri="{BB962C8B-B14F-4D97-AF65-F5344CB8AC3E}">
+        <p14:creationId xmlns:p14="http://schemas.microsoft.com/office/powerpoint/2010/main" val="4042813364"/>
+      </p:ext>
+    </p:extLst>
+  </p:cSld>
+  <p:clrMapOvr>
+    <a:masterClrMapping/>
+  </p:clrMapOvr>
+  <p:timing>
+    <p:tnLst>
+      <p:par>
+        <p:cTn id="1" dur="indefinite" restart="never" nodeType="tmRoot"/>
+      </p:par>
+    </p:tnLst>
+  </p:timing>
+</p:sld>
+</file>
+
+<file path=ppt/slides/slide9.xml><?xml version="1.0" encoding="utf-8"?>
+<p:sld xmlns:a="http://schemas.openxmlformats.org/drawingml/2006/main" xmlns:r="http://schemas.openxmlformats.org/officeDocument/2006/relationships" xmlns:p="http://schemas.openxmlformats.org/presentationml/2006/main">
+  <p:cSld>
+    <p:spTree>
+      <p:nvGrpSpPr>
+        <p:cNvPr id="1" name=""/>
+        <p:cNvGrpSpPr/>
+        <p:nvPr/>
+      </p:nvGrpSpPr>
+      <p:grpSpPr>
+        <a:xfrm>
+          <a:off x="0" y="0"/>
+          <a:ext cx="0" cy="0"/>
+          <a:chOff x="0" y="0"/>
+          <a:chExt cx="0" cy="0"/>
+        </a:xfrm>
+      </p:grpSpPr>
+      <p:sp>
+        <p:nvSpPr>
+          <p:cNvPr id="2" name="Title 1"/>
+          <p:cNvSpPr>
+            <a:spLocks noGrp="1"/>
+          </p:cNvSpPr>
+          <p:nvPr>
+            <p:ph type="title"/>
+          </p:nvPr>
+        </p:nvSpPr>
+        <p:spPr/>
+        <p:txBody>
+          <a:bodyPr/>
+          <a:lstStyle/>
+          <a:p>
+            <a:r>
+              <a:rPr lang="en-US" dirty="0" smtClean="0"/>
+              <a:t>Booking Saga / Orchestrator</a:t>
+            </a:r>
+            <a:endParaRPr lang="ru-RU" dirty="0"/>
+          </a:p>
+        </p:txBody>
+      </p:sp>
+      <p:pic>
+        <p:nvPicPr>
+          <p:cNvPr id="6" name="Content Placeholder 5"/>
+          <p:cNvPicPr>
+            <a:picLocks noGrp="1" noChangeAspect="1"/>
+          </p:cNvPicPr>
+          <p:nvPr>
+            <p:ph idx="1"/>
+          </p:nvPr>
+        </p:nvPicPr>
+        <p:blipFill>
+          <a:blip r:embed="rId2">
+            <a:extLst>
+              <a:ext uri="{28A0092B-C50C-407E-A947-70E740481C1C}">
+                <a14:useLocalDpi xmlns:a14="http://schemas.microsoft.com/office/drawing/2010/main" val="0"/>
+              </a:ext>
+            </a:extLst>
+          </a:blip>
+          <a:stretch>
+            <a:fillRect/>
+          </a:stretch>
+        </p:blipFill>
+        <p:spPr>
+          <a:xfrm>
+            <a:off x="571500" y="1649863"/>
+            <a:ext cx="11012281" cy="4211526"/>
+          </a:xfrm>
+        </p:spPr>
+      </p:pic>
+    </p:spTree>
+    <p:extLst>
+      <p:ext uri="{BB962C8B-B14F-4D97-AF65-F5344CB8AC3E}">
+        <p14:creationId xmlns:p14="http://schemas.microsoft.com/office/powerpoint/2010/main" val="2531134955"/>
+      </p:ext>
+    </p:extLst>
+  </p:cSld>
+  <p:clrMapOvr>
+    <a:masterClrMapping/>
+  </p:clrMapOvr>
+  <p:timing>
+    <p:tnLst>
+      <p:par>
+        <p:cTn id="1" dur="indefinite" restart="never" nodeType="tmRoot"/>
+      </p:par>
+    </p:tnLst>
+  </p:timing>
 </p:sld>
 </file>
 

</xml_diff>

<commit_message>
CourseWork - API Gateway scheme.
</commit_message>
<xml_diff>
--- a/course-work/Presentation/Circus - Presentation.pptx
+++ b/course-work/Presentation/Circus - Presentation.pptx
@@ -5,17 +5,19 @@
     <p:sldMasterId id="2147484115" r:id="rId1"/>
   </p:sldMasterIdLst>
   <p:sldIdLst>
-    <p:sldId id="258" r:id="rId2"/>
-    <p:sldId id="257" r:id="rId3"/>
-    <p:sldId id="259" r:id="rId4"/>
-    <p:sldId id="260" r:id="rId5"/>
-    <p:sldId id="261" r:id="rId6"/>
-    <p:sldId id="264" r:id="rId7"/>
-    <p:sldId id="262" r:id="rId8"/>
-    <p:sldId id="267" r:id="rId9"/>
-    <p:sldId id="265" r:id="rId10"/>
-    <p:sldId id="266" r:id="rId11"/>
-    <p:sldId id="268" r:id="rId12"/>
+    <p:sldId id="269" r:id="rId2"/>
+    <p:sldId id="258" r:id="rId3"/>
+    <p:sldId id="257" r:id="rId4"/>
+    <p:sldId id="271" r:id="rId5"/>
+    <p:sldId id="260" r:id="rId6"/>
+    <p:sldId id="261" r:id="rId7"/>
+    <p:sldId id="264" r:id="rId8"/>
+    <p:sldId id="262" r:id="rId9"/>
+    <p:sldId id="267" r:id="rId10"/>
+    <p:sldId id="268" r:id="rId11"/>
+    <p:sldId id="265" r:id="rId12"/>
+    <p:sldId id="266" r:id="rId13"/>
+    <p:sldId id="270" r:id="rId14"/>
   </p:sldIdLst>
   <p:sldSz cx="12192000" cy="6858000"/>
   <p:notesSz cx="6858000" cy="9144000"/>
@@ -308,7 +310,7 @@
           <a:p>
             <a:fld id="{12FDE44A-B5A5-422E-A044-ACFC71B9BE9C}" type="datetimeFigureOut">
               <a:rPr lang="ru-RU" smtClean="0"/>
-              <a:t>09.06.2021</a:t>
+              <a:t>10.06.2021</a:t>
             </a:fld>
             <a:endParaRPr lang="ru-RU"/>
           </a:p>
@@ -583,7 +585,7 @@
           <a:p>
             <a:fld id="{12FDE44A-B5A5-422E-A044-ACFC71B9BE9C}" type="datetimeFigureOut">
               <a:rPr lang="ru-RU" smtClean="0"/>
-              <a:t>09.06.2021</a:t>
+              <a:t>10.06.2021</a:t>
             </a:fld>
             <a:endParaRPr lang="ru-RU"/>
           </a:p>
@@ -777,7 +779,7 @@
           <a:p>
             <a:fld id="{12FDE44A-B5A5-422E-A044-ACFC71B9BE9C}" type="datetimeFigureOut">
               <a:rPr lang="ru-RU" smtClean="0"/>
-              <a:t>09.06.2021</a:t>
+              <a:t>10.06.2021</a:t>
             </a:fld>
             <a:endParaRPr lang="ru-RU"/>
           </a:p>
@@ -1050,7 +1052,7 @@
           <a:p>
             <a:fld id="{12FDE44A-B5A5-422E-A044-ACFC71B9BE9C}" type="datetimeFigureOut">
               <a:rPr lang="ru-RU" smtClean="0"/>
-              <a:t>09.06.2021</a:t>
+              <a:t>10.06.2021</a:t>
             </a:fld>
             <a:endParaRPr lang="ru-RU"/>
           </a:p>
@@ -1391,7 +1393,7 @@
           <a:p>
             <a:fld id="{12FDE44A-B5A5-422E-A044-ACFC71B9BE9C}" type="datetimeFigureOut">
               <a:rPr lang="ru-RU" smtClean="0"/>
-              <a:t>09.06.2021</a:t>
+              <a:t>10.06.2021</a:t>
             </a:fld>
             <a:endParaRPr lang="ru-RU"/>
           </a:p>
@@ -2014,7 +2016,7 @@
           <a:p>
             <a:fld id="{12FDE44A-B5A5-422E-A044-ACFC71B9BE9C}" type="datetimeFigureOut">
               <a:rPr lang="ru-RU" smtClean="0"/>
-              <a:t>09.06.2021</a:t>
+              <a:t>10.06.2021</a:t>
             </a:fld>
             <a:endParaRPr lang="ru-RU"/>
           </a:p>
@@ -2874,7 +2876,7 @@
           <a:p>
             <a:fld id="{12FDE44A-B5A5-422E-A044-ACFC71B9BE9C}" type="datetimeFigureOut">
               <a:rPr lang="ru-RU" smtClean="0"/>
-              <a:t>09.06.2021</a:t>
+              <a:t>10.06.2021</a:t>
             </a:fld>
             <a:endParaRPr lang="ru-RU"/>
           </a:p>
@@ -3044,7 +3046,7 @@
           <a:p>
             <a:fld id="{12FDE44A-B5A5-422E-A044-ACFC71B9BE9C}" type="datetimeFigureOut">
               <a:rPr lang="ru-RU" smtClean="0"/>
-              <a:t>09.06.2021</a:t>
+              <a:t>10.06.2021</a:t>
             </a:fld>
             <a:endParaRPr lang="ru-RU"/>
           </a:p>
@@ -3224,7 +3226,7 @@
           <a:p>
             <a:fld id="{12FDE44A-B5A5-422E-A044-ACFC71B9BE9C}" type="datetimeFigureOut">
               <a:rPr lang="ru-RU" smtClean="0"/>
-              <a:t>09.06.2021</a:t>
+              <a:t>10.06.2021</a:t>
             </a:fld>
             <a:endParaRPr lang="ru-RU"/>
           </a:p>
@@ -3394,7 +3396,7 @@
           <a:p>
             <a:fld id="{12FDE44A-B5A5-422E-A044-ACFC71B9BE9C}" type="datetimeFigureOut">
               <a:rPr lang="ru-RU" smtClean="0"/>
-              <a:t>09.06.2021</a:t>
+              <a:t>10.06.2021</a:t>
             </a:fld>
             <a:endParaRPr lang="ru-RU"/>
           </a:p>
@@ -3641,7 +3643,7 @@
           <a:p>
             <a:fld id="{12FDE44A-B5A5-422E-A044-ACFC71B9BE9C}" type="datetimeFigureOut">
               <a:rPr lang="ru-RU" smtClean="0"/>
-              <a:t>09.06.2021</a:t>
+              <a:t>10.06.2021</a:t>
             </a:fld>
             <a:endParaRPr lang="ru-RU"/>
           </a:p>
@@ -3933,7 +3935,7 @@
           <a:p>
             <a:fld id="{12FDE44A-B5A5-422E-A044-ACFC71B9BE9C}" type="datetimeFigureOut">
               <a:rPr lang="ru-RU" smtClean="0"/>
-              <a:t>09.06.2021</a:t>
+              <a:t>10.06.2021</a:t>
             </a:fld>
             <a:endParaRPr lang="ru-RU"/>
           </a:p>
@@ -4377,7 +4379,7 @@
           <a:p>
             <a:fld id="{12FDE44A-B5A5-422E-A044-ACFC71B9BE9C}" type="datetimeFigureOut">
               <a:rPr lang="ru-RU" smtClean="0"/>
-              <a:t>09.06.2021</a:t>
+              <a:t>10.06.2021</a:t>
             </a:fld>
             <a:endParaRPr lang="ru-RU"/>
           </a:p>
@@ -4495,7 +4497,7 @@
           <a:p>
             <a:fld id="{12FDE44A-B5A5-422E-A044-ACFC71B9BE9C}" type="datetimeFigureOut">
               <a:rPr lang="ru-RU" smtClean="0"/>
-              <a:t>09.06.2021</a:t>
+              <a:t>10.06.2021</a:t>
             </a:fld>
             <a:endParaRPr lang="ru-RU"/>
           </a:p>
@@ -4590,7 +4592,7 @@
           <a:p>
             <a:fld id="{12FDE44A-B5A5-422E-A044-ACFC71B9BE9C}" type="datetimeFigureOut">
               <a:rPr lang="ru-RU" smtClean="0"/>
-              <a:t>09.06.2021</a:t>
+              <a:t>10.06.2021</a:t>
             </a:fld>
             <a:endParaRPr lang="ru-RU"/>
           </a:p>
@@ -4869,7 +4871,7 @@
           <a:p>
             <a:fld id="{12FDE44A-B5A5-422E-A044-ACFC71B9BE9C}" type="datetimeFigureOut">
               <a:rPr lang="ru-RU" smtClean="0"/>
-              <a:t>09.06.2021</a:t>
+              <a:t>10.06.2021</a:t>
             </a:fld>
             <a:endParaRPr lang="ru-RU"/>
           </a:p>
@@ -5144,7 +5146,7 @@
           <a:p>
             <a:fld id="{12FDE44A-B5A5-422E-A044-ACFC71B9BE9C}" type="datetimeFigureOut">
               <a:rPr lang="ru-RU" smtClean="0"/>
-              <a:t>09.06.2021</a:t>
+              <a:t>10.06.2021</a:t>
             </a:fld>
             <a:endParaRPr lang="ru-RU"/>
           </a:p>
@@ -5573,7 +5575,7 @@
           <a:p>
             <a:fld id="{12FDE44A-B5A5-422E-A044-ACFC71B9BE9C}" type="datetimeFigureOut">
               <a:rPr lang="ru-RU" smtClean="0"/>
-              <a:t>09.06.2021</a:t>
+              <a:t>10.06.2021</a:t>
             </a:fld>
             <a:endParaRPr lang="ru-RU"/>
           </a:p>
@@ -6111,16 +6113,101 @@
             <p:ph type="title"/>
           </p:nvPr>
         </p:nvSpPr>
-        <p:spPr/>
+        <p:spPr>
+          <a:xfrm>
+            <a:off x="0" y="1300616"/>
+            <a:ext cx="12192000" cy="1400530"/>
+          </a:xfrm>
+        </p:spPr>
         <p:txBody>
           <a:bodyPr/>
           <a:lstStyle/>
           <a:p>
+            <a:pPr algn="ctr"/>
             <a:r>
               <a:rPr lang="ru-RU" dirty="0" smtClean="0"/>
-              <a:t>Технологии и компоненты</a:t>
-            </a:r>
-            <a:endParaRPr lang="ru-RU" dirty="0"/>
+              <a:t>Защита проекта</a:t>
+            </a:r>
+            <a:br>
+              <a:rPr lang="ru-RU" dirty="0" smtClean="0"/>
+            </a:br>
+            <a:r>
+              <a:rPr lang="en-US" dirty="0" smtClean="0">
+                <a:solidFill>
+                  <a:srgbClr val="FFFF00"/>
+                </a:solidFill>
+              </a:rPr>
+              <a:t>“</a:t>
+            </a:r>
+            <a:r>
+              <a:rPr lang="ru-RU" dirty="0" smtClean="0">
+                <a:solidFill>
+                  <a:srgbClr val="FFFF00"/>
+                </a:solidFill>
+              </a:rPr>
+              <a:t>Система онлайн</a:t>
+            </a:r>
+            <a:r>
+              <a:rPr lang="en-US" dirty="0" smtClean="0">
+                <a:solidFill>
+                  <a:srgbClr val="FFFF00"/>
+                </a:solidFill>
+              </a:rPr>
+              <a:t> </a:t>
+            </a:r>
+            <a:r>
+              <a:rPr lang="ru-RU" dirty="0" smtClean="0">
+                <a:solidFill>
+                  <a:srgbClr val="FFFF00"/>
+                </a:solidFill>
+              </a:rPr>
+              <a:t>бронирования</a:t>
+            </a:r>
+            <a:r>
+              <a:rPr lang="ru-RU" dirty="0">
+                <a:solidFill>
+                  <a:srgbClr val="FFFF00"/>
+                </a:solidFill>
+              </a:rPr>
+              <a:t> </a:t>
+            </a:r>
+            <a:r>
+              <a:rPr lang="ru-RU" dirty="0" smtClean="0">
+                <a:solidFill>
+                  <a:srgbClr val="FFFF00"/>
+                </a:solidFill>
+              </a:rPr>
+              <a:t>на </a:t>
+            </a:r>
+            <a:r>
+              <a:rPr lang="ru-RU" dirty="0" err="1" smtClean="0">
+                <a:solidFill>
+                  <a:srgbClr val="FFFF00"/>
+                </a:solidFill>
+              </a:rPr>
+              <a:t>микросервисной</a:t>
+            </a:r>
+            <a:r>
+              <a:rPr lang="ru-RU" dirty="0" smtClean="0">
+                <a:solidFill>
+                  <a:srgbClr val="FFFF00"/>
+                </a:solidFill>
+              </a:rPr>
+              <a:t> архитектуре</a:t>
+            </a:r>
+            <a:r>
+              <a:rPr lang="en-US" dirty="0" smtClean="0">
+                <a:solidFill>
+                  <a:srgbClr val="FFFF00"/>
+                </a:solidFill>
+              </a:rPr>
+              <a:t>”</a:t>
+            </a:r>
+            <a:endParaRPr lang="ru-RU" dirty="0">
+              <a:solidFill>
+                <a:srgbClr val="FFFF00"/>
+              </a:solidFill>
+            </a:endParaRPr>
           </a:p>
         </p:txBody>
       </p:sp>
@@ -6134,116 +6221,59 @@
             <p:ph idx="1"/>
           </p:nvPr>
         </p:nvSpPr>
-        <p:spPr/>
+        <p:spPr>
+          <a:xfrm>
+            <a:off x="1103312" y="4397433"/>
+            <a:ext cx="8946541" cy="1850966"/>
+          </a:xfrm>
+        </p:spPr>
         <p:txBody>
           <a:bodyPr/>
           <a:lstStyle/>
           <a:p>
+            <a:pPr marL="0" indent="0">
+              <a:buNone/>
+            </a:pPr>
+            <a:r>
+              <a:rPr lang="ru-RU" b="1" dirty="0" smtClean="0"/>
+              <a:t>Тиунов Геннадий</a:t>
+            </a:r>
+          </a:p>
+          <a:p>
+            <a:pPr marL="0" indent="0">
+              <a:buNone/>
+            </a:pPr>
+            <a:r>
+              <a:rPr lang="ru-RU" dirty="0" smtClean="0"/>
+              <a:t>Ведущий разработчик </a:t>
+            </a:r>
             <a:r>
               <a:rPr lang="en-US" dirty="0" smtClean="0"/>
-              <a:t>Framework: </a:t>
-            </a:r>
-            <a:r>
-              <a:rPr lang="en-US" dirty="0" err="1" smtClean="0"/>
-              <a:t>.Net</a:t>
-            </a:r>
-            <a:r>
-              <a:rPr lang="en-US" dirty="0" smtClean="0"/>
-              <a:t> Core 3.1</a:t>
-            </a:r>
-          </a:p>
-          <a:p>
-            <a:r>
-              <a:rPr lang="en-US" dirty="0" smtClean="0"/>
-              <a:t>DB</a:t>
+              <a:t>/</a:t>
             </a:r>
             <a:r>
               <a:rPr lang="ru-RU" dirty="0" smtClean="0"/>
-              <a:t> – </a:t>
-            </a:r>
-            <a:r>
-              <a:rPr lang="en-US" dirty="0" smtClean="0"/>
-              <a:t>MS SQL (Express Edition)</a:t>
-            </a:r>
-          </a:p>
-          <a:p>
-            <a:r>
-              <a:rPr lang="en-US" dirty="0" smtClean="0"/>
-              <a:t>ORM: LINQ 2 DB</a:t>
-            </a:r>
-          </a:p>
-          <a:p>
-            <a:r>
-              <a:rPr lang="en-US" dirty="0" smtClean="0"/>
-              <a:t>Message Broker – Kafka (Confluent)</a:t>
-            </a:r>
-          </a:p>
-          <a:p>
-            <a:r>
-              <a:rPr lang="en-US" dirty="0" smtClean="0"/>
-              <a:t>Saga State Machine: </a:t>
-            </a:r>
-            <a:r>
-              <a:rPr lang="en-US" dirty="0" err="1" smtClean="0"/>
-              <a:t>MassTransit</a:t>
-            </a:r>
-            <a:r>
-              <a:rPr lang="en-US" dirty="0" smtClean="0"/>
-              <a:t> (</a:t>
-            </a:r>
-            <a:r>
-              <a:rPr lang="en-US" dirty="0" err="1" smtClean="0"/>
-              <a:t>Automatonymous</a:t>
-            </a:r>
-            <a:r>
-              <a:rPr lang="en-US" dirty="0" smtClean="0"/>
-              <a:t>)</a:t>
-            </a:r>
-          </a:p>
-          <a:p>
-            <a:r>
-              <a:rPr lang="en-US" dirty="0" smtClean="0"/>
-              <a:t>Kubernetes </a:t>
-            </a:r>
-            <a:r>
-              <a:rPr lang="en-US" dirty="0" smtClean="0"/>
-              <a:t>(Windows </a:t>
-            </a:r>
-            <a:r>
-              <a:rPr lang="en-US" dirty="0" err="1" smtClean="0"/>
-              <a:t>Minikube</a:t>
-            </a:r>
-            <a:r>
-              <a:rPr lang="en-US" dirty="0" smtClean="0"/>
-              <a:t>) / </a:t>
-            </a:r>
-            <a:r>
-              <a:rPr lang="en-US" dirty="0" smtClean="0"/>
-              <a:t>Docker</a:t>
-            </a:r>
-          </a:p>
-          <a:p>
-            <a:r>
-              <a:rPr lang="en-US" dirty="0" smtClean="0"/>
-              <a:t>Helm</a:t>
-            </a:r>
-          </a:p>
-          <a:p>
-            <a:r>
-              <a:rPr lang="en-US" dirty="0" smtClean="0"/>
-              <a:t>Front-end: Postman Collection</a:t>
-            </a:r>
-          </a:p>
-          <a:p>
-            <a:endParaRPr lang="en-US" dirty="0" smtClean="0"/>
+              <a:t> </a:t>
+            </a:r>
+            <a:r>
+              <a:rPr lang="ru-RU" dirty="0" err="1" smtClean="0"/>
+              <a:t>тимлид</a:t>
+            </a:r>
+            <a:endParaRPr lang="ru-RU" dirty="0" smtClean="0"/>
           </a:p>
           <a:p>
             <a:pPr marL="0" indent="0">
               <a:buNone/>
             </a:pPr>
-            <a:endParaRPr lang="en-US" dirty="0" smtClean="0"/>
-          </a:p>
-          <a:p>
+            <a:r>
+              <a:rPr lang="ru-RU" dirty="0" smtClean="0"/>
+              <a:t>Лаборатория Касперского</a:t>
+            </a:r>
+          </a:p>
+          <a:p>
+            <a:pPr marL="0" indent="0">
+              <a:buNone/>
+            </a:pPr>
             <a:endParaRPr lang="ru-RU" dirty="0"/>
           </a:p>
         </p:txBody>
@@ -6251,20 +6281,13 @@
     </p:spTree>
     <p:extLst>
       <p:ext uri="{BB962C8B-B14F-4D97-AF65-F5344CB8AC3E}">
-        <p14:creationId xmlns:p14="http://schemas.microsoft.com/office/powerpoint/2010/main" val="1278317033"/>
+        <p14:creationId xmlns:p14="http://schemas.microsoft.com/office/powerpoint/2010/main" val="3712654356"/>
       </p:ext>
     </p:extLst>
   </p:cSld>
   <p:clrMapOvr>
     <a:masterClrMapping/>
   </p:clrMapOvr>
-  <p:timing>
-    <p:tnLst>
-      <p:par>
-        <p:cTn id="1" dur="indefinite" restart="never" nodeType="tmRoot"/>
-      </p:par>
-    </p:tnLst>
-  </p:timing>
 </p:sld>
 </file>
 
@@ -6295,16 +6318,216 @@
             <p:ph type="title"/>
           </p:nvPr>
         </p:nvSpPr>
-        <p:spPr/>
+        <p:spPr>
+          <a:xfrm>
+            <a:off x="646111" y="452718"/>
+            <a:ext cx="9404723" cy="812202"/>
+          </a:xfrm>
+        </p:spPr>
         <p:txBody>
           <a:bodyPr/>
           <a:lstStyle/>
           <a:p>
             <a:r>
-              <a:rPr lang="en-US" dirty="0" smtClean="0"/>
+              <a:rPr lang="en-US" dirty="0" smtClean="0">
+                <a:solidFill>
+                  <a:srgbClr val="FFFF00"/>
+                </a:solidFill>
+              </a:rPr>
+              <a:t>API Gateway</a:t>
+            </a:r>
+            <a:endParaRPr lang="ru-RU" dirty="0">
+              <a:solidFill>
+                <a:srgbClr val="FFFF00"/>
+              </a:solidFill>
+            </a:endParaRPr>
+          </a:p>
+        </p:txBody>
+      </p:sp>
+      <p:pic>
+        <p:nvPicPr>
+          <p:cNvPr id="10" name="Content Placeholder 9"/>
+          <p:cNvPicPr>
+            <a:picLocks noGrp="1" noChangeAspect="1"/>
+          </p:cNvPicPr>
+          <p:nvPr>
+            <p:ph idx="1"/>
+          </p:nvPr>
+        </p:nvPicPr>
+        <p:blipFill>
+          <a:blip r:embed="rId2">
+            <a:extLst>
+              <a:ext uri="{28A0092B-C50C-407E-A947-70E740481C1C}">
+                <a14:useLocalDpi xmlns:a14="http://schemas.microsoft.com/office/drawing/2010/main" val="0"/>
+              </a:ext>
+            </a:extLst>
+          </a:blip>
+          <a:stretch>
+            <a:fillRect/>
+          </a:stretch>
+        </p:blipFill>
+        <p:spPr>
+          <a:xfrm>
+            <a:off x="3183775" y="1450856"/>
+            <a:ext cx="5045825" cy="5135132"/>
+          </a:xfrm>
+        </p:spPr>
+      </p:pic>
+    </p:spTree>
+    <p:extLst>
+      <p:ext uri="{BB962C8B-B14F-4D97-AF65-F5344CB8AC3E}">
+        <p14:creationId xmlns:p14="http://schemas.microsoft.com/office/powerpoint/2010/main" val="1691619045"/>
+      </p:ext>
+    </p:extLst>
+  </p:cSld>
+  <p:clrMapOvr>
+    <a:masterClrMapping/>
+  </p:clrMapOvr>
+</p:sld>
+</file>
+
+<file path=ppt/slides/slide11.xml><?xml version="1.0" encoding="utf-8"?>
+<p:sld xmlns:a="http://schemas.openxmlformats.org/drawingml/2006/main" xmlns:r="http://schemas.openxmlformats.org/officeDocument/2006/relationships" xmlns:p="http://schemas.openxmlformats.org/presentationml/2006/main">
+  <p:cSld>
+    <p:spTree>
+      <p:nvGrpSpPr>
+        <p:cNvPr id="1" name=""/>
+        <p:cNvGrpSpPr/>
+        <p:nvPr/>
+      </p:nvGrpSpPr>
+      <p:grpSpPr>
+        <a:xfrm>
+          <a:off x="0" y="0"/>
+          <a:ext cx="0" cy="0"/>
+          <a:chOff x="0" y="0"/>
+          <a:chExt cx="0" cy="0"/>
+        </a:xfrm>
+      </p:grpSpPr>
+      <p:sp>
+        <p:nvSpPr>
+          <p:cNvPr id="2" name="Title 1"/>
+          <p:cNvSpPr>
+            <a:spLocks noGrp="1"/>
+          </p:cNvSpPr>
+          <p:nvPr>
+            <p:ph type="title"/>
+          </p:nvPr>
+        </p:nvSpPr>
+        <p:spPr/>
+        <p:txBody>
+          <a:bodyPr/>
+          <a:lstStyle/>
+          <a:p>
+            <a:r>
+              <a:rPr lang="en-US" dirty="0" smtClean="0">
+                <a:solidFill>
+                  <a:srgbClr val="FFFF00"/>
+                </a:solidFill>
+              </a:rPr>
+              <a:t>Booking Saga / Orchestrator</a:t>
+            </a:r>
+            <a:endParaRPr lang="ru-RU" dirty="0">
+              <a:solidFill>
+                <a:srgbClr val="FFFF00"/>
+              </a:solidFill>
+            </a:endParaRPr>
+          </a:p>
+        </p:txBody>
+      </p:sp>
+      <p:pic>
+        <p:nvPicPr>
+          <p:cNvPr id="6" name="Content Placeholder 5"/>
+          <p:cNvPicPr>
+            <a:picLocks noGrp="1" noChangeAspect="1"/>
+          </p:cNvPicPr>
+          <p:nvPr>
+            <p:ph idx="1"/>
+          </p:nvPr>
+        </p:nvPicPr>
+        <p:blipFill>
+          <a:blip r:embed="rId2">
+            <a:extLst>
+              <a:ext uri="{28A0092B-C50C-407E-A947-70E740481C1C}">
+                <a14:useLocalDpi xmlns:a14="http://schemas.microsoft.com/office/drawing/2010/main" val="0"/>
+              </a:ext>
+            </a:extLst>
+          </a:blip>
+          <a:stretch>
+            <a:fillRect/>
+          </a:stretch>
+        </p:blipFill>
+        <p:spPr>
+          <a:xfrm>
+            <a:off x="571500" y="1649863"/>
+            <a:ext cx="11012281" cy="4211526"/>
+          </a:xfrm>
+        </p:spPr>
+      </p:pic>
+    </p:spTree>
+    <p:extLst>
+      <p:ext uri="{BB962C8B-B14F-4D97-AF65-F5344CB8AC3E}">
+        <p14:creationId xmlns:p14="http://schemas.microsoft.com/office/powerpoint/2010/main" val="2531134955"/>
+      </p:ext>
+    </p:extLst>
+  </p:cSld>
+  <p:clrMapOvr>
+    <a:masterClrMapping/>
+  </p:clrMapOvr>
+  <p:timing>
+    <p:tnLst>
+      <p:par>
+        <p:cTn id="1" dur="indefinite" restart="never" nodeType="tmRoot"/>
+      </p:par>
+    </p:tnLst>
+  </p:timing>
+</p:sld>
+</file>
+
+<file path=ppt/slides/slide12.xml><?xml version="1.0" encoding="utf-8"?>
+<p:sld xmlns:a="http://schemas.openxmlformats.org/drawingml/2006/main" xmlns:r="http://schemas.openxmlformats.org/officeDocument/2006/relationships" xmlns:p="http://schemas.openxmlformats.org/presentationml/2006/main">
+  <p:cSld>
+    <p:spTree>
+      <p:nvGrpSpPr>
+        <p:cNvPr id="1" name=""/>
+        <p:cNvGrpSpPr/>
+        <p:nvPr/>
+      </p:nvGrpSpPr>
+      <p:grpSpPr>
+        <a:xfrm>
+          <a:off x="0" y="0"/>
+          <a:ext cx="0" cy="0"/>
+          <a:chOff x="0" y="0"/>
+          <a:chExt cx="0" cy="0"/>
+        </a:xfrm>
+      </p:grpSpPr>
+      <p:sp>
+        <p:nvSpPr>
+          <p:cNvPr id="2" name="Title 1"/>
+          <p:cNvSpPr>
+            <a:spLocks noGrp="1"/>
+          </p:cNvSpPr>
+          <p:nvPr>
+            <p:ph type="title"/>
+          </p:nvPr>
+        </p:nvSpPr>
+        <p:spPr/>
+        <p:txBody>
+          <a:bodyPr/>
+          <a:lstStyle/>
+          <a:p>
+            <a:r>
+              <a:rPr lang="en-US" dirty="0" smtClean="0">
+                <a:solidFill>
+                  <a:srgbClr val="FFFF00"/>
+                </a:solidFill>
+              </a:rPr>
               <a:t>Booking Saga State Machine</a:t>
             </a:r>
-            <a:endParaRPr lang="ru-RU" dirty="0"/>
+            <a:endParaRPr lang="ru-RU" dirty="0">
+              <a:solidFill>
+                <a:srgbClr val="FFFF00"/>
+              </a:solidFill>
+            </a:endParaRPr>
           </a:p>
         </p:txBody>
       </p:sp>
@@ -6357,7 +6580,7 @@
 </p:sld>
 </file>
 
-<file path=ppt/slides/slide11.xml><?xml version="1.0" encoding="utf-8"?>
+<file path=ppt/slides/slide13.xml><?xml version="1.0" encoding="utf-8"?>
 <p:sld xmlns:a="http://schemas.openxmlformats.org/drawingml/2006/main" xmlns:r="http://schemas.openxmlformats.org/officeDocument/2006/relationships" xmlns:p="http://schemas.openxmlformats.org/presentationml/2006/main">
   <p:cSld>
     <p:spTree>
@@ -6386,55 +6609,112 @@
         </p:nvSpPr>
         <p:spPr>
           <a:xfrm>
-            <a:off x="646111" y="452718"/>
-            <a:ext cx="9404723" cy="812202"/>
+            <a:off x="-66502" y="2140202"/>
+            <a:ext cx="12258501" cy="1400530"/>
           </a:xfrm>
         </p:spPr>
         <p:txBody>
           <a:bodyPr/>
           <a:lstStyle/>
           <a:p>
-            <a:r>
-              <a:rPr lang="en-US" dirty="0" smtClean="0"/>
-              <a:t>API Gateway</a:t>
-            </a:r>
-            <a:endParaRPr lang="ru-RU" dirty="0"/>
-          </a:p>
-        </p:txBody>
-      </p:sp>
-      <p:pic>
-        <p:nvPicPr>
-          <p:cNvPr id="4" name="Content Placeholder 3"/>
-          <p:cNvPicPr>
-            <a:picLocks noGrp="1" noChangeAspect="1"/>
-          </p:cNvPicPr>
+            <a:pPr algn="ctr"/>
+            <a:r>
+              <a:rPr lang="ru-RU" dirty="0" smtClean="0">
+                <a:solidFill>
+                  <a:srgbClr val="FFFF00"/>
+                </a:solidFill>
+              </a:rPr>
+              <a:t>Спасибо за внимание!</a:t>
+            </a:r>
+            <a:endParaRPr lang="ru-RU" dirty="0">
+              <a:solidFill>
+                <a:srgbClr val="FFFF00"/>
+              </a:solidFill>
+            </a:endParaRPr>
+          </a:p>
+        </p:txBody>
+      </p:sp>
+      <p:sp>
+        <p:nvSpPr>
+          <p:cNvPr id="3" name="Content Placeholder 2"/>
+          <p:cNvSpPr>
+            <a:spLocks noGrp="1"/>
+          </p:cNvSpPr>
           <p:nvPr>
             <p:ph idx="1"/>
           </p:nvPr>
-        </p:nvPicPr>
-        <p:blipFill>
-          <a:blip r:embed="rId2">
-            <a:extLst>
-              <a:ext uri="{28A0092B-C50C-407E-A947-70E740481C1C}">
-                <a14:useLocalDpi xmlns:a14="http://schemas.microsoft.com/office/drawing/2010/main" val="0"/>
-              </a:ext>
-            </a:extLst>
-          </a:blip>
-          <a:stretch>
-            <a:fillRect/>
-          </a:stretch>
-        </p:blipFill>
+        </p:nvSpPr>
         <p:spPr>
           <a:xfrm>
-            <a:off x="1333800" y="1265238"/>
-            <a:ext cx="8486176" cy="4983162"/>
+            <a:off x="4039985" y="4364182"/>
+            <a:ext cx="4397433" cy="2000595"/>
           </a:xfrm>
         </p:spPr>
-      </p:pic>
+        <p:txBody>
+          <a:bodyPr/>
+          <a:lstStyle/>
+          <a:p>
+            <a:pPr marL="0" indent="0">
+              <a:buNone/>
+            </a:pPr>
+            <a:r>
+              <a:rPr lang="ru-RU" b="1" dirty="0" smtClean="0"/>
+              <a:t>Тиунов Геннадий</a:t>
+            </a:r>
+          </a:p>
+          <a:p>
+            <a:pPr marL="0" indent="0">
+              <a:buNone/>
+            </a:pPr>
+            <a:r>
+              <a:rPr lang="ru-RU" dirty="0" smtClean="0"/>
+              <a:t>Ведущий разработчик </a:t>
+            </a:r>
+            <a:r>
+              <a:rPr lang="en-US" dirty="0" smtClean="0"/>
+              <a:t>/</a:t>
+            </a:r>
+            <a:r>
+              <a:rPr lang="ru-RU" dirty="0" smtClean="0"/>
+              <a:t> </a:t>
+            </a:r>
+            <a:r>
+              <a:rPr lang="ru-RU" dirty="0" err="1" smtClean="0"/>
+              <a:t>тимлид</a:t>
+            </a:r>
+            <a:endParaRPr lang="ru-RU" dirty="0" smtClean="0"/>
+          </a:p>
+          <a:p>
+            <a:pPr marL="0" indent="0">
+              <a:buNone/>
+            </a:pPr>
+            <a:r>
+              <a:rPr lang="ru-RU" dirty="0" smtClean="0"/>
+              <a:t>Лаборатория Касперского</a:t>
+            </a:r>
+          </a:p>
+          <a:p>
+            <a:pPr marL="0" indent="0">
+              <a:buNone/>
+            </a:pPr>
+            <a:r>
+              <a:rPr lang="en-US" dirty="0" smtClean="0"/>
+              <a:t>gennady.tiunov@gmail.com</a:t>
+            </a:r>
+            <a:endParaRPr lang="ru-RU" dirty="0" smtClean="0"/>
+          </a:p>
+          <a:p>
+            <a:pPr marL="0" indent="0">
+              <a:buNone/>
+            </a:pPr>
+            <a:endParaRPr lang="ru-RU" dirty="0" smtClean="0"/>
+          </a:p>
+        </p:txBody>
+      </p:sp>
     </p:spTree>
     <p:extLst>
       <p:ext uri="{BB962C8B-B14F-4D97-AF65-F5344CB8AC3E}">
-        <p14:creationId xmlns:p14="http://schemas.microsoft.com/office/powerpoint/2010/main" val="1691619045"/>
+        <p14:creationId xmlns:p14="http://schemas.microsoft.com/office/powerpoint/2010/main" val="561744723"/>
       </p:ext>
     </p:extLst>
   </p:cSld>
@@ -6477,94 +6757,165 @@
           <a:lstStyle/>
           <a:p>
             <a:r>
+              <a:rPr lang="ru-RU" dirty="0" smtClean="0">
+                <a:solidFill>
+                  <a:srgbClr val="FFFF00"/>
+                </a:solidFill>
+              </a:rPr>
+              <a:t>Технологии и компоненты</a:t>
+            </a:r>
+            <a:endParaRPr lang="ru-RU" dirty="0">
+              <a:solidFill>
+                <a:srgbClr val="FFFF00"/>
+              </a:solidFill>
+            </a:endParaRPr>
+          </a:p>
+        </p:txBody>
+      </p:sp>
+      <p:sp>
+        <p:nvSpPr>
+          <p:cNvPr id="3" name="Content Placeholder 2"/>
+          <p:cNvSpPr>
+            <a:spLocks noGrp="1"/>
+          </p:cNvSpPr>
+          <p:nvPr>
+            <p:ph idx="1"/>
+          </p:nvPr>
+        </p:nvSpPr>
+        <p:spPr/>
+        <p:txBody>
+          <a:bodyPr>
+            <a:normAutofit lnSpcReduction="10000"/>
+          </a:bodyPr>
+          <a:lstStyle/>
+          <a:p>
+            <a:r>
+              <a:rPr lang="en-US" dirty="0" smtClean="0"/>
+              <a:t>Framework: </a:t>
+            </a:r>
+            <a:r>
+              <a:rPr lang="en-US" dirty="0" err="1" smtClean="0"/>
+              <a:t>.Net</a:t>
+            </a:r>
+            <a:r>
+              <a:rPr lang="en-US" dirty="0" smtClean="0"/>
+              <a:t> Core 3.1</a:t>
+            </a:r>
+          </a:p>
+          <a:p>
+            <a:r>
+              <a:rPr lang="en-US" dirty="0" smtClean="0"/>
+              <a:t>DB</a:t>
+            </a:r>
+            <a:r>
               <a:rPr lang="ru-RU" dirty="0" smtClean="0"/>
-              <a:t>Паттерны и подходы</a:t>
-            </a:r>
+              <a:t> – </a:t>
+            </a:r>
+            <a:r>
+              <a:rPr lang="en-US" dirty="0" smtClean="0"/>
+              <a:t>MS SQL (Express Edition)</a:t>
+            </a:r>
+          </a:p>
+          <a:p>
+            <a:r>
+              <a:rPr lang="en-US" dirty="0" smtClean="0"/>
+              <a:t>ORM: LINQ 2 DB</a:t>
+            </a:r>
+          </a:p>
+          <a:p>
+            <a:r>
+              <a:rPr lang="en-US" dirty="0" smtClean="0"/>
+              <a:t>Message Broker – Kafka (Confluent)</a:t>
+            </a:r>
+          </a:p>
+          <a:p>
+            <a:r>
+              <a:rPr lang="en-US" dirty="0" smtClean="0"/>
+              <a:t>Saga State Machine: </a:t>
+            </a:r>
+            <a:r>
+              <a:rPr lang="en-US" dirty="0" err="1" smtClean="0"/>
+              <a:t>MassTransit</a:t>
+            </a:r>
+            <a:r>
+              <a:rPr lang="en-US" dirty="0" smtClean="0"/>
+              <a:t> (</a:t>
+            </a:r>
+            <a:r>
+              <a:rPr lang="en-US" dirty="0" err="1" smtClean="0"/>
+              <a:t>Automatonymous</a:t>
+            </a:r>
+            <a:r>
+              <a:rPr lang="en-US" dirty="0" smtClean="0"/>
+              <a:t>)</a:t>
+            </a:r>
+          </a:p>
+          <a:p>
+            <a:r>
+              <a:rPr lang="en-US" dirty="0" smtClean="0"/>
+              <a:t>Kubernetes (Windows </a:t>
+            </a:r>
+            <a:r>
+              <a:rPr lang="en-US" dirty="0" err="1" smtClean="0"/>
+              <a:t>Minikube</a:t>
+            </a:r>
+            <a:r>
+              <a:rPr lang="en-US" dirty="0" smtClean="0"/>
+              <a:t>) / Docker</a:t>
+            </a:r>
+          </a:p>
+          <a:p>
+            <a:r>
+              <a:rPr lang="en-US" dirty="0" smtClean="0"/>
+              <a:t>Helm</a:t>
+            </a:r>
+            <a:endParaRPr lang="ru-RU" dirty="0" smtClean="0"/>
+          </a:p>
+          <a:p>
+            <a:r>
+              <a:rPr lang="en-US" dirty="0" smtClean="0"/>
+              <a:t>Logging (</a:t>
+            </a:r>
+            <a:r>
+              <a:rPr lang="en-US" dirty="0" err="1" smtClean="0"/>
+              <a:t>Serilog</a:t>
+            </a:r>
+            <a:r>
+              <a:rPr lang="en-US" dirty="0" smtClean="0"/>
+              <a:t>)</a:t>
+            </a:r>
+          </a:p>
+          <a:p>
+            <a:r>
+              <a:rPr lang="en-US" dirty="0" err="1" smtClean="0"/>
+              <a:t>Automapper</a:t>
+            </a:r>
+            <a:endParaRPr lang="en-US" dirty="0" smtClean="0"/>
+          </a:p>
+          <a:p>
+            <a:r>
+              <a:rPr lang="en-US" dirty="0" smtClean="0"/>
+              <a:t>Front-end: Postman Collection</a:t>
+            </a:r>
+          </a:p>
+          <a:p>
+            <a:endParaRPr lang="en-US" dirty="0" smtClean="0"/>
+          </a:p>
+          <a:p>
+            <a:pPr marL="0" indent="0">
+              <a:buNone/>
+            </a:pPr>
+            <a:endParaRPr lang="en-US" dirty="0" smtClean="0"/>
+          </a:p>
+          <a:p>
             <a:endParaRPr lang="ru-RU" dirty="0"/>
-          </a:p>
-        </p:txBody>
-      </p:sp>
-      <p:sp>
-        <p:nvSpPr>
-          <p:cNvPr id="3" name="Content Placeholder 2"/>
-          <p:cNvSpPr>
-            <a:spLocks noGrp="1"/>
-          </p:cNvSpPr>
-          <p:nvPr>
-            <p:ph idx="1"/>
-          </p:nvPr>
-        </p:nvSpPr>
-        <p:spPr/>
-        <p:txBody>
-          <a:bodyPr/>
-          <a:lstStyle/>
-          <a:p>
-            <a:r>
-              <a:rPr lang="en-US" dirty="0" smtClean="0"/>
-              <a:t>API Gateway (Nginx)</a:t>
-            </a:r>
-          </a:p>
-          <a:p>
-            <a:r>
-              <a:rPr lang="en-US" dirty="0" smtClean="0"/>
-              <a:t>REST </a:t>
-            </a:r>
-            <a:r>
-              <a:rPr lang="en-US" smtClean="0"/>
-              <a:t>&amp; EDA</a:t>
-            </a:r>
-            <a:endParaRPr lang="en-US" dirty="0" smtClean="0"/>
-          </a:p>
-          <a:p>
-            <a:r>
-              <a:rPr lang="en-US" dirty="0"/>
-              <a:t>REST Endpoint Connectors</a:t>
-            </a:r>
-          </a:p>
-          <a:p>
-            <a:r>
-              <a:rPr lang="en-US" dirty="0" smtClean="0"/>
-              <a:t>S2S Authorization (X-Service-Token, GUID) for REST interaction</a:t>
-            </a:r>
-          </a:p>
-          <a:p>
-            <a:r>
-              <a:rPr lang="en-US" dirty="0" smtClean="0"/>
-              <a:t>Booking: </a:t>
-            </a:r>
-            <a:r>
-              <a:rPr lang="en-US" dirty="0" err="1" smtClean="0"/>
-              <a:t>idempotency</a:t>
-            </a:r>
-            <a:r>
-              <a:rPr lang="en-US" dirty="0" smtClean="0"/>
-              <a:t> keys (client generated natural key – Booking Id)</a:t>
-            </a:r>
-          </a:p>
-          <a:p>
-            <a:r>
-              <a:rPr lang="en-US" dirty="0" smtClean="0"/>
-              <a:t>Booking: concurrency resolution (available seat check) based on transactions with serializable isolation level</a:t>
-            </a:r>
-          </a:p>
-          <a:p>
-            <a:r>
-              <a:rPr lang="en-US" dirty="0" smtClean="0"/>
-              <a:t>Saga with orchestration</a:t>
-            </a:r>
-          </a:p>
-          <a:p>
-            <a:endParaRPr lang="en-US" dirty="0" smtClean="0"/>
-          </a:p>
-          <a:p>
-            <a:endParaRPr lang="en-US" dirty="0" smtClean="0"/>
           </a:p>
         </p:txBody>
       </p:sp>
     </p:spTree>
     <p:extLst>
       <p:ext uri="{BB962C8B-B14F-4D97-AF65-F5344CB8AC3E}">
-        <p14:creationId xmlns:p14="http://schemas.microsoft.com/office/powerpoint/2010/main" val="469862735"/>
+        <p14:creationId xmlns:p14="http://schemas.microsoft.com/office/powerpoint/2010/main" val="1278317033"/>
       </p:ext>
     </p:extLst>
   </p:cSld>
@@ -6614,46 +6965,97 @@
           <a:lstStyle/>
           <a:p>
             <a:r>
-              <a:rPr lang="ru-RU" dirty="0" smtClean="0"/>
-              <a:t>Внутренняя структура решения</a:t>
-            </a:r>
-            <a:endParaRPr lang="ru-RU" dirty="0"/>
-          </a:p>
-        </p:txBody>
-      </p:sp>
-      <p:pic>
-        <p:nvPicPr>
-          <p:cNvPr id="11" name="Content Placeholder 10"/>
-          <p:cNvPicPr>
-            <a:picLocks noGrp="1" noChangeAspect="1"/>
-          </p:cNvPicPr>
+              <a:rPr lang="ru-RU" dirty="0" smtClean="0">
+                <a:solidFill>
+                  <a:srgbClr val="FFFF00"/>
+                </a:solidFill>
+              </a:rPr>
+              <a:t>Паттерны и подходы</a:t>
+            </a:r>
+            <a:endParaRPr lang="ru-RU" dirty="0">
+              <a:solidFill>
+                <a:srgbClr val="FFFF00"/>
+              </a:solidFill>
+            </a:endParaRPr>
+          </a:p>
+        </p:txBody>
+      </p:sp>
+      <p:sp>
+        <p:nvSpPr>
+          <p:cNvPr id="3" name="Content Placeholder 2"/>
+          <p:cNvSpPr>
+            <a:spLocks noGrp="1"/>
+          </p:cNvSpPr>
           <p:nvPr>
             <p:ph idx="1"/>
           </p:nvPr>
-        </p:nvPicPr>
-        <p:blipFill>
-          <a:blip r:embed="rId2">
-            <a:extLst>
-              <a:ext uri="{28A0092B-C50C-407E-A947-70E740481C1C}">
-                <a14:useLocalDpi xmlns:a14="http://schemas.microsoft.com/office/drawing/2010/main" val="0"/>
-              </a:ext>
-            </a:extLst>
-          </a:blip>
-          <a:stretch>
-            <a:fillRect/>
-          </a:stretch>
-        </p:blipFill>
-        <p:spPr>
-          <a:xfrm>
-            <a:off x="4362280" y="1581150"/>
-            <a:ext cx="3106423" cy="4836275"/>
-          </a:xfrm>
-        </p:spPr>
-      </p:pic>
+        </p:nvSpPr>
+        <p:spPr/>
+        <p:txBody>
+          <a:bodyPr/>
+          <a:lstStyle/>
+          <a:p>
+            <a:r>
+              <a:rPr lang="en-US" dirty="0" smtClean="0"/>
+              <a:t>API Gateway (Nginx)</a:t>
+            </a:r>
+          </a:p>
+          <a:p>
+            <a:r>
+              <a:rPr lang="en-US" dirty="0" smtClean="0"/>
+              <a:t>REST &amp; EDA</a:t>
+            </a:r>
+          </a:p>
+          <a:p>
+            <a:r>
+              <a:rPr lang="en-US" dirty="0"/>
+              <a:t>REST Endpoint Connectors</a:t>
+            </a:r>
+          </a:p>
+          <a:p>
+            <a:r>
+              <a:rPr lang="en-US" dirty="0" smtClean="0"/>
+              <a:t>S2S Authorization (X-Service-Token, GUID) for REST interaction</a:t>
+            </a:r>
+          </a:p>
+          <a:p>
+            <a:r>
+              <a:rPr lang="en-US" dirty="0" smtClean="0"/>
+              <a:t>Booking: </a:t>
+            </a:r>
+            <a:r>
+              <a:rPr lang="en-US" dirty="0" err="1" smtClean="0"/>
+              <a:t>idempotency</a:t>
+            </a:r>
+            <a:r>
+              <a:rPr lang="en-US" dirty="0" smtClean="0"/>
+              <a:t> keys (client generated natural key – Booking Id)</a:t>
+            </a:r>
+          </a:p>
+          <a:p>
+            <a:r>
+              <a:rPr lang="en-US" dirty="0" smtClean="0"/>
+              <a:t>Booking: concurrency resolution (available seat check) based on transactions with serializable isolation level</a:t>
+            </a:r>
+          </a:p>
+          <a:p>
+            <a:r>
+              <a:rPr lang="en-US" dirty="0" smtClean="0"/>
+              <a:t>Saga with orchestration</a:t>
+            </a:r>
+          </a:p>
+          <a:p>
+            <a:endParaRPr lang="en-US" dirty="0" smtClean="0"/>
+          </a:p>
+          <a:p>
+            <a:endParaRPr lang="en-US" dirty="0" smtClean="0"/>
+          </a:p>
+        </p:txBody>
+      </p:sp>
     </p:spTree>
     <p:extLst>
       <p:ext uri="{BB962C8B-B14F-4D97-AF65-F5344CB8AC3E}">
-        <p14:creationId xmlns:p14="http://schemas.microsoft.com/office/powerpoint/2010/main" val="3739165774"/>
+        <p14:creationId xmlns:p14="http://schemas.microsoft.com/office/powerpoint/2010/main" val="469862735"/>
       </p:ext>
     </p:extLst>
   </p:cSld>
@@ -6703,18 +7105,236 @@
           <a:lstStyle/>
           <a:p>
             <a:r>
+              <a:rPr lang="ru-RU" dirty="0">
+                <a:solidFill>
+                  <a:srgbClr val="FFFF00"/>
+                </a:solidFill>
+              </a:rPr>
+              <a:t>Внутренняя структура решения</a:t>
+            </a:r>
+            <a:endParaRPr lang="ru-RU" dirty="0"/>
+          </a:p>
+        </p:txBody>
+      </p:sp>
+      <p:sp>
+        <p:nvSpPr>
+          <p:cNvPr id="6" name="Content Placeholder 5"/>
+          <p:cNvSpPr>
+            <a:spLocks noGrp="1"/>
+          </p:cNvSpPr>
+          <p:nvPr>
+            <p:ph sz="quarter" idx="4"/>
+          </p:nvPr>
+        </p:nvSpPr>
+        <p:spPr>
+          <a:xfrm>
+            <a:off x="5139106" y="1847240"/>
+            <a:ext cx="4396339" cy="4409098"/>
+          </a:xfrm>
+        </p:spPr>
+        <p:txBody>
+          <a:bodyPr/>
+          <a:lstStyle/>
+          <a:p>
+            <a:r>
+              <a:rPr lang="en-US" dirty="0" smtClean="0"/>
+              <a:t>8 </a:t>
+            </a:r>
+            <a:r>
               <a:rPr lang="ru-RU" dirty="0" smtClean="0"/>
+              <a:t>сервисов</a:t>
+            </a:r>
+          </a:p>
+          <a:p>
+            <a:r>
+              <a:rPr lang="ru-RU" dirty="0" smtClean="0"/>
+              <a:t>4 сервиса используются для аутентификации </a:t>
+            </a:r>
+            <a:r>
+              <a:rPr lang="en-US" dirty="0" smtClean="0"/>
+              <a:t>/</a:t>
+            </a:r>
+            <a:r>
+              <a:rPr lang="ru-RU" dirty="0" smtClean="0"/>
+              <a:t> идентификации</a:t>
+            </a:r>
+          </a:p>
+          <a:p>
+            <a:r>
+              <a:rPr lang="ru-RU" dirty="0" smtClean="0"/>
+              <a:t>каждый сервис может включать в себя</a:t>
+            </a:r>
+            <a:r>
+              <a:rPr lang="en-US" dirty="0" smtClean="0"/>
+              <a:t>:</a:t>
+            </a:r>
+          </a:p>
+          <a:p>
+            <a:pPr lvl="1">
+              <a:buFont typeface="Arial" panose="020B0604020202020204" pitchFamily="34" charset="0"/>
+              <a:buChar char="•"/>
+            </a:pPr>
+            <a:r>
+              <a:rPr lang="en-US" dirty="0" smtClean="0"/>
+              <a:t>REST Endpoint</a:t>
+            </a:r>
+          </a:p>
+          <a:p>
+            <a:pPr lvl="1">
+              <a:buFont typeface="Arial" panose="020B0604020202020204" pitchFamily="34" charset="0"/>
+              <a:buChar char="•"/>
+            </a:pPr>
+            <a:r>
+              <a:rPr lang="en-US" dirty="0" smtClean="0"/>
+              <a:t>REST Endpoint Connector</a:t>
+            </a:r>
+          </a:p>
+          <a:p>
+            <a:pPr lvl="1">
+              <a:buFont typeface="Arial" panose="020B0604020202020204" pitchFamily="34" charset="0"/>
+              <a:buChar char="•"/>
+            </a:pPr>
+            <a:r>
+              <a:rPr lang="en-US" dirty="0" smtClean="0"/>
+              <a:t>Contract (REST / EDA)</a:t>
+            </a:r>
+          </a:p>
+          <a:p>
+            <a:pPr lvl="1">
+              <a:buFont typeface="Arial" panose="020B0604020202020204" pitchFamily="34" charset="0"/>
+              <a:buChar char="•"/>
+            </a:pPr>
+            <a:r>
+              <a:rPr lang="en-US" dirty="0" smtClean="0"/>
+              <a:t>Data Access</a:t>
+            </a:r>
+          </a:p>
+          <a:p>
+            <a:pPr lvl="1">
+              <a:buFont typeface="Arial" panose="020B0604020202020204" pitchFamily="34" charset="0"/>
+              <a:buChar char="•"/>
+            </a:pPr>
+            <a:r>
+              <a:rPr lang="en-US" dirty="0" smtClean="0"/>
+              <a:t>Domain (Entities / Repositories)</a:t>
+            </a:r>
+          </a:p>
+          <a:p>
+            <a:pPr lvl="1">
+              <a:buFont typeface="Arial" panose="020B0604020202020204" pitchFamily="34" charset="0"/>
+              <a:buChar char="•"/>
+            </a:pPr>
+            <a:r>
+              <a:rPr lang="en-US" dirty="0" smtClean="0"/>
+              <a:t>Message Listeners / Handlers</a:t>
+            </a:r>
+            <a:endParaRPr lang="ru-RU" dirty="0"/>
+          </a:p>
+        </p:txBody>
+      </p:sp>
+      <p:pic>
+        <p:nvPicPr>
+          <p:cNvPr id="7" name="Content Placeholder 10"/>
+          <p:cNvPicPr>
+            <a:picLocks noGrp="1" noChangeAspect="1"/>
+          </p:cNvPicPr>
+          <p:nvPr>
+            <p:ph sz="half" idx="2"/>
+          </p:nvPr>
+        </p:nvPicPr>
+        <p:blipFill>
+          <a:blip r:embed="rId2">
+            <a:extLst>
+              <a:ext uri="{28A0092B-C50C-407E-A947-70E740481C1C}">
+                <a14:useLocalDpi xmlns:a14="http://schemas.microsoft.com/office/drawing/2010/main" val="0"/>
+              </a:ext>
+            </a:extLst>
+          </a:blip>
+          <a:stretch>
+            <a:fillRect/>
+          </a:stretch>
+        </p:blipFill>
+        <p:spPr>
+          <a:xfrm>
+            <a:off x="1670859" y="1847240"/>
+            <a:ext cx="2832040" cy="4409098"/>
+          </a:xfrm>
+        </p:spPr>
+      </p:pic>
+    </p:spTree>
+    <p:extLst>
+      <p:ext uri="{BB962C8B-B14F-4D97-AF65-F5344CB8AC3E}">
+        <p14:creationId xmlns:p14="http://schemas.microsoft.com/office/powerpoint/2010/main" val="2176064541"/>
+      </p:ext>
+    </p:extLst>
+  </p:cSld>
+  <p:clrMapOvr>
+    <a:masterClrMapping/>
+  </p:clrMapOvr>
+</p:sld>
+</file>
+
+<file path=ppt/slides/slide5.xml><?xml version="1.0" encoding="utf-8"?>
+<p:sld xmlns:a="http://schemas.openxmlformats.org/drawingml/2006/main" xmlns:r="http://schemas.openxmlformats.org/officeDocument/2006/relationships" xmlns:p="http://schemas.openxmlformats.org/presentationml/2006/main">
+  <p:cSld>
+    <p:spTree>
+      <p:nvGrpSpPr>
+        <p:cNvPr id="1" name=""/>
+        <p:cNvGrpSpPr/>
+        <p:nvPr/>
+      </p:nvGrpSpPr>
+      <p:grpSpPr>
+        <a:xfrm>
+          <a:off x="0" y="0"/>
+          <a:ext cx="0" cy="0"/>
+          <a:chOff x="0" y="0"/>
+          <a:chExt cx="0" cy="0"/>
+        </a:xfrm>
+      </p:grpSpPr>
+      <p:sp>
+        <p:nvSpPr>
+          <p:cNvPr id="2" name="Title 1"/>
+          <p:cNvSpPr>
+            <a:spLocks noGrp="1"/>
+          </p:cNvSpPr>
+          <p:nvPr>
+            <p:ph type="title"/>
+          </p:nvPr>
+        </p:nvSpPr>
+        <p:spPr/>
+        <p:txBody>
+          <a:bodyPr/>
+          <a:lstStyle/>
+          <a:p>
+            <a:r>
+              <a:rPr lang="ru-RU" dirty="0" smtClean="0">
+                <a:solidFill>
+                  <a:srgbClr val="FFFF00"/>
+                </a:solidFill>
+              </a:rPr>
               <a:t>Структура сервиса (</a:t>
             </a:r>
             <a:r>
-              <a:rPr lang="en-US" dirty="0" smtClean="0"/>
+              <a:rPr lang="en-US" dirty="0" smtClean="0">
+                <a:solidFill>
+                  <a:srgbClr val="FFFF00"/>
+                </a:solidFill>
+              </a:rPr>
               <a:t>User Service</a:t>
             </a:r>
             <a:r>
-              <a:rPr lang="ru-RU" dirty="0" smtClean="0"/>
+              <a:rPr lang="ru-RU" dirty="0" smtClean="0">
+                <a:solidFill>
+                  <a:srgbClr val="FFFF00"/>
+                </a:solidFill>
+              </a:rPr>
               <a:t>)</a:t>
             </a:r>
-            <a:endParaRPr lang="ru-RU" dirty="0"/>
+            <a:endParaRPr lang="ru-RU" dirty="0">
+              <a:solidFill>
+                <a:srgbClr val="FFFF00"/>
+              </a:solidFill>
+            </a:endParaRPr>
           </a:p>
         </p:txBody>
       </p:sp>
@@ -6767,7 +7387,7 @@
 </p:sld>
 </file>
 
-<file path=ppt/slides/slide5.xml><?xml version="1.0" encoding="utf-8"?>
+<file path=ppt/slides/slide6.xml><?xml version="1.0" encoding="utf-8"?>
 <p:sld xmlns:a="http://schemas.openxmlformats.org/drawingml/2006/main" xmlns:r="http://schemas.openxmlformats.org/officeDocument/2006/relationships" xmlns:p="http://schemas.openxmlformats.org/presentationml/2006/main">
   <p:cSld>
     <p:spTree>
@@ -6800,10 +7420,18 @@
           <a:lstStyle/>
           <a:p>
             <a:r>
-              <a:rPr lang="en-US" dirty="0" smtClean="0"/>
+              <a:rPr lang="en-US" dirty="0" smtClean="0">
+                <a:solidFill>
+                  <a:srgbClr val="FFFF00"/>
+                </a:solidFill>
+              </a:rPr>
               <a:t>REST Scaffolding</a:t>
             </a:r>
-            <a:endParaRPr lang="ru-RU" dirty="0"/>
+            <a:endParaRPr lang="ru-RU" dirty="0">
+              <a:solidFill>
+                <a:srgbClr val="FFFF00"/>
+              </a:solidFill>
+            </a:endParaRPr>
           </a:p>
         </p:txBody>
       </p:sp>
@@ -6975,7 +7603,7 @@
 </p:sld>
 </file>
 
-<file path=ppt/slides/slide6.xml><?xml version="1.0" encoding="utf-8"?>
+<file path=ppt/slides/slide7.xml><?xml version="1.0" encoding="utf-8"?>
 <p:sld xmlns:a="http://schemas.openxmlformats.org/drawingml/2006/main" xmlns:r="http://schemas.openxmlformats.org/officeDocument/2006/relationships" xmlns:p="http://schemas.openxmlformats.org/presentationml/2006/main">
   <p:cSld>
     <p:spTree>
@@ -7008,10 +7636,18 @@
           <a:lstStyle/>
           <a:p>
             <a:r>
-              <a:rPr lang="en-US" dirty="0" smtClean="0"/>
+              <a:rPr lang="en-US" dirty="0" smtClean="0">
+                <a:solidFill>
+                  <a:srgbClr val="FFFF00"/>
+                </a:solidFill>
+              </a:rPr>
               <a:t>REST Connectors</a:t>
             </a:r>
-            <a:endParaRPr lang="ru-RU" dirty="0"/>
+            <a:endParaRPr lang="ru-RU" dirty="0">
+              <a:solidFill>
+                <a:srgbClr val="FFFF00"/>
+              </a:solidFill>
+            </a:endParaRPr>
           </a:p>
         </p:txBody>
       </p:sp>
@@ -7064,7 +7700,7 @@
 </p:sld>
 </file>
 
-<file path=ppt/slides/slide7.xml><?xml version="1.0" encoding="utf-8"?>
+<file path=ppt/slides/slide8.xml><?xml version="1.0" encoding="utf-8"?>
 <p:sld xmlns:a="http://schemas.openxmlformats.org/drawingml/2006/main" xmlns:r="http://schemas.openxmlformats.org/officeDocument/2006/relationships" xmlns:p="http://schemas.openxmlformats.org/presentationml/2006/main">
   <p:cSld>
     <p:spTree>
@@ -7097,10 +7733,18 @@
           <a:lstStyle/>
           <a:p>
             <a:r>
-              <a:rPr lang="en-US" dirty="0" smtClean="0"/>
+              <a:rPr lang="en-US" dirty="0" smtClean="0">
+                <a:solidFill>
+                  <a:srgbClr val="FFFF00"/>
+                </a:solidFill>
+              </a:rPr>
               <a:t>Messaging</a:t>
             </a:r>
-            <a:endParaRPr lang="ru-RU" dirty="0"/>
+            <a:endParaRPr lang="ru-RU" dirty="0">
+              <a:solidFill>
+                <a:srgbClr val="FFFF00"/>
+              </a:solidFill>
+            </a:endParaRPr>
           </a:p>
         </p:txBody>
       </p:sp>
@@ -7217,7 +7861,7 @@
 </p:sld>
 </file>
 
-<file path=ppt/slides/slide8.xml><?xml version="1.0" encoding="utf-8"?>
+<file path=ppt/slides/slide9.xml><?xml version="1.0" encoding="utf-8"?>
 <p:sld xmlns:a="http://schemas.openxmlformats.org/drawingml/2006/main" xmlns:r="http://schemas.openxmlformats.org/officeDocument/2006/relationships" xmlns:p="http://schemas.openxmlformats.org/presentationml/2006/main">
   <p:cSld>
     <p:spTree>
@@ -7255,10 +7899,18 @@
           <a:lstStyle/>
           <a:p>
             <a:r>
-              <a:rPr lang="en-US" dirty="0" smtClean="0"/>
+              <a:rPr lang="en-US" dirty="0" smtClean="0">
+                <a:solidFill>
+                  <a:srgbClr val="FFFF00"/>
+                </a:solidFill>
+              </a:rPr>
               <a:t>Service Interaction</a:t>
             </a:r>
-            <a:endParaRPr lang="ru-RU" dirty="0"/>
+            <a:endParaRPr lang="ru-RU" dirty="0">
+              <a:solidFill>
+                <a:srgbClr val="FFFF00"/>
+              </a:solidFill>
+            </a:endParaRPr>
           </a:p>
         </p:txBody>
       </p:sp>
@@ -7295,95 +7947,6 @@
     <p:extLst>
       <p:ext uri="{BB962C8B-B14F-4D97-AF65-F5344CB8AC3E}">
         <p14:creationId xmlns:p14="http://schemas.microsoft.com/office/powerpoint/2010/main" val="4042813364"/>
-      </p:ext>
-    </p:extLst>
-  </p:cSld>
-  <p:clrMapOvr>
-    <a:masterClrMapping/>
-  </p:clrMapOvr>
-  <p:timing>
-    <p:tnLst>
-      <p:par>
-        <p:cTn id="1" dur="indefinite" restart="never" nodeType="tmRoot"/>
-      </p:par>
-    </p:tnLst>
-  </p:timing>
-</p:sld>
-</file>
-
-<file path=ppt/slides/slide9.xml><?xml version="1.0" encoding="utf-8"?>
-<p:sld xmlns:a="http://schemas.openxmlformats.org/drawingml/2006/main" xmlns:r="http://schemas.openxmlformats.org/officeDocument/2006/relationships" xmlns:p="http://schemas.openxmlformats.org/presentationml/2006/main">
-  <p:cSld>
-    <p:spTree>
-      <p:nvGrpSpPr>
-        <p:cNvPr id="1" name=""/>
-        <p:cNvGrpSpPr/>
-        <p:nvPr/>
-      </p:nvGrpSpPr>
-      <p:grpSpPr>
-        <a:xfrm>
-          <a:off x="0" y="0"/>
-          <a:ext cx="0" cy="0"/>
-          <a:chOff x="0" y="0"/>
-          <a:chExt cx="0" cy="0"/>
-        </a:xfrm>
-      </p:grpSpPr>
-      <p:sp>
-        <p:nvSpPr>
-          <p:cNvPr id="2" name="Title 1"/>
-          <p:cNvSpPr>
-            <a:spLocks noGrp="1"/>
-          </p:cNvSpPr>
-          <p:nvPr>
-            <p:ph type="title"/>
-          </p:nvPr>
-        </p:nvSpPr>
-        <p:spPr/>
-        <p:txBody>
-          <a:bodyPr/>
-          <a:lstStyle/>
-          <a:p>
-            <a:r>
-              <a:rPr lang="en-US" dirty="0" smtClean="0"/>
-              <a:t>Booking Saga / Orchestrator</a:t>
-            </a:r>
-            <a:endParaRPr lang="ru-RU" dirty="0"/>
-          </a:p>
-        </p:txBody>
-      </p:sp>
-      <p:pic>
-        <p:nvPicPr>
-          <p:cNvPr id="6" name="Content Placeholder 5"/>
-          <p:cNvPicPr>
-            <a:picLocks noGrp="1" noChangeAspect="1"/>
-          </p:cNvPicPr>
-          <p:nvPr>
-            <p:ph idx="1"/>
-          </p:nvPr>
-        </p:nvPicPr>
-        <p:blipFill>
-          <a:blip r:embed="rId2">
-            <a:extLst>
-              <a:ext uri="{28A0092B-C50C-407E-A947-70E740481C1C}">
-                <a14:useLocalDpi xmlns:a14="http://schemas.microsoft.com/office/drawing/2010/main" val="0"/>
-              </a:ext>
-            </a:extLst>
-          </a:blip>
-          <a:stretch>
-            <a:fillRect/>
-          </a:stretch>
-        </p:blipFill>
-        <p:spPr>
-          <a:xfrm>
-            <a:off x="571500" y="1649863"/>
-            <a:ext cx="11012281" cy="4211526"/>
-          </a:xfrm>
-        </p:spPr>
-      </p:pic>
-    </p:spTree>
-    <p:extLst>
-      <p:ext uri="{BB962C8B-B14F-4D97-AF65-F5344CB8AC3E}">
-        <p14:creationId xmlns:p14="http://schemas.microsoft.com/office/powerpoint/2010/main" val="2531134955"/>
       </p:ext>
     </p:extLst>
   </p:cSld>

</xml_diff>

<commit_message>
CourseWork - final amendments before presentation.
</commit_message>
<xml_diff>
--- a/course-work/Presentation/Circus - Presentation.pptx
+++ b/course-work/Presentation/Circus - Presentation.pptx
@@ -5,19 +5,24 @@
     <p:sldMasterId id="2147484115" r:id="rId1"/>
   </p:sldMasterIdLst>
   <p:sldIdLst>
-    <p:sldId id="269" r:id="rId2"/>
-    <p:sldId id="258" r:id="rId3"/>
-    <p:sldId id="257" r:id="rId4"/>
-    <p:sldId id="271" r:id="rId5"/>
-    <p:sldId id="260" r:id="rId6"/>
-    <p:sldId id="261" r:id="rId7"/>
-    <p:sldId id="264" r:id="rId8"/>
-    <p:sldId id="262" r:id="rId9"/>
-    <p:sldId id="267" r:id="rId10"/>
-    <p:sldId id="268" r:id="rId11"/>
-    <p:sldId id="265" r:id="rId12"/>
-    <p:sldId id="266" r:id="rId13"/>
-    <p:sldId id="270" r:id="rId14"/>
+    <p:sldId id="278" r:id="rId2"/>
+    <p:sldId id="269" r:id="rId3"/>
+    <p:sldId id="272" r:id="rId4"/>
+    <p:sldId id="273" r:id="rId5"/>
+    <p:sldId id="267" r:id="rId6"/>
+    <p:sldId id="258" r:id="rId7"/>
+    <p:sldId id="257" r:id="rId8"/>
+    <p:sldId id="279" r:id="rId9"/>
+    <p:sldId id="274" r:id="rId10"/>
+    <p:sldId id="265" r:id="rId11"/>
+    <p:sldId id="266" r:id="rId12"/>
+    <p:sldId id="271" r:id="rId13"/>
+    <p:sldId id="277" r:id="rId14"/>
+    <p:sldId id="264" r:id="rId15"/>
+    <p:sldId id="261" r:id="rId16"/>
+    <p:sldId id="262" r:id="rId17"/>
+    <p:sldId id="276" r:id="rId18"/>
+    <p:sldId id="270" r:id="rId19"/>
   </p:sldIdLst>
   <p:sldSz cx="12192000" cy="6858000"/>
   <p:notesSz cx="6858000" cy="9144000"/>
@@ -310,7 +315,7 @@
           <a:p>
             <a:fld id="{12FDE44A-B5A5-422E-A044-ACFC71B9BE9C}" type="datetimeFigureOut">
               <a:rPr lang="ru-RU" smtClean="0"/>
-              <a:t>11.06.2021</a:t>
+              <a:t>13.06.2021</a:t>
             </a:fld>
             <a:endParaRPr lang="ru-RU"/>
           </a:p>
@@ -585,7 +590,7 @@
           <a:p>
             <a:fld id="{12FDE44A-B5A5-422E-A044-ACFC71B9BE9C}" type="datetimeFigureOut">
               <a:rPr lang="ru-RU" smtClean="0"/>
-              <a:t>11.06.2021</a:t>
+              <a:t>13.06.2021</a:t>
             </a:fld>
             <a:endParaRPr lang="ru-RU"/>
           </a:p>
@@ -779,7 +784,7 @@
           <a:p>
             <a:fld id="{12FDE44A-B5A5-422E-A044-ACFC71B9BE9C}" type="datetimeFigureOut">
               <a:rPr lang="ru-RU" smtClean="0"/>
-              <a:t>11.06.2021</a:t>
+              <a:t>13.06.2021</a:t>
             </a:fld>
             <a:endParaRPr lang="ru-RU"/>
           </a:p>
@@ -1052,7 +1057,7 @@
           <a:p>
             <a:fld id="{12FDE44A-B5A5-422E-A044-ACFC71B9BE9C}" type="datetimeFigureOut">
               <a:rPr lang="ru-RU" smtClean="0"/>
-              <a:t>11.06.2021</a:t>
+              <a:t>13.06.2021</a:t>
             </a:fld>
             <a:endParaRPr lang="ru-RU"/>
           </a:p>
@@ -1393,7 +1398,7 @@
           <a:p>
             <a:fld id="{12FDE44A-B5A5-422E-A044-ACFC71B9BE9C}" type="datetimeFigureOut">
               <a:rPr lang="ru-RU" smtClean="0"/>
-              <a:t>11.06.2021</a:t>
+              <a:t>13.06.2021</a:t>
             </a:fld>
             <a:endParaRPr lang="ru-RU"/>
           </a:p>
@@ -2016,7 +2021,7 @@
           <a:p>
             <a:fld id="{12FDE44A-B5A5-422E-A044-ACFC71B9BE9C}" type="datetimeFigureOut">
               <a:rPr lang="ru-RU" smtClean="0"/>
-              <a:t>11.06.2021</a:t>
+              <a:t>13.06.2021</a:t>
             </a:fld>
             <a:endParaRPr lang="ru-RU"/>
           </a:p>
@@ -2876,7 +2881,7 @@
           <a:p>
             <a:fld id="{12FDE44A-B5A5-422E-A044-ACFC71B9BE9C}" type="datetimeFigureOut">
               <a:rPr lang="ru-RU" smtClean="0"/>
-              <a:t>11.06.2021</a:t>
+              <a:t>13.06.2021</a:t>
             </a:fld>
             <a:endParaRPr lang="ru-RU"/>
           </a:p>
@@ -3046,7 +3051,7 @@
           <a:p>
             <a:fld id="{12FDE44A-B5A5-422E-A044-ACFC71B9BE9C}" type="datetimeFigureOut">
               <a:rPr lang="ru-RU" smtClean="0"/>
-              <a:t>11.06.2021</a:t>
+              <a:t>13.06.2021</a:t>
             </a:fld>
             <a:endParaRPr lang="ru-RU"/>
           </a:p>
@@ -3226,7 +3231,7 @@
           <a:p>
             <a:fld id="{12FDE44A-B5A5-422E-A044-ACFC71B9BE9C}" type="datetimeFigureOut">
               <a:rPr lang="ru-RU" smtClean="0"/>
-              <a:t>11.06.2021</a:t>
+              <a:t>13.06.2021</a:t>
             </a:fld>
             <a:endParaRPr lang="ru-RU"/>
           </a:p>
@@ -3396,7 +3401,7 @@
           <a:p>
             <a:fld id="{12FDE44A-B5A5-422E-A044-ACFC71B9BE9C}" type="datetimeFigureOut">
               <a:rPr lang="ru-RU" smtClean="0"/>
-              <a:t>11.06.2021</a:t>
+              <a:t>13.06.2021</a:t>
             </a:fld>
             <a:endParaRPr lang="ru-RU"/>
           </a:p>
@@ -3643,7 +3648,7 @@
           <a:p>
             <a:fld id="{12FDE44A-B5A5-422E-A044-ACFC71B9BE9C}" type="datetimeFigureOut">
               <a:rPr lang="ru-RU" smtClean="0"/>
-              <a:t>11.06.2021</a:t>
+              <a:t>13.06.2021</a:t>
             </a:fld>
             <a:endParaRPr lang="ru-RU"/>
           </a:p>
@@ -3935,7 +3940,7 @@
           <a:p>
             <a:fld id="{12FDE44A-B5A5-422E-A044-ACFC71B9BE9C}" type="datetimeFigureOut">
               <a:rPr lang="ru-RU" smtClean="0"/>
-              <a:t>11.06.2021</a:t>
+              <a:t>13.06.2021</a:t>
             </a:fld>
             <a:endParaRPr lang="ru-RU"/>
           </a:p>
@@ -4379,7 +4384,7 @@
           <a:p>
             <a:fld id="{12FDE44A-B5A5-422E-A044-ACFC71B9BE9C}" type="datetimeFigureOut">
               <a:rPr lang="ru-RU" smtClean="0"/>
-              <a:t>11.06.2021</a:t>
+              <a:t>13.06.2021</a:t>
             </a:fld>
             <a:endParaRPr lang="ru-RU"/>
           </a:p>
@@ -4497,7 +4502,7 @@
           <a:p>
             <a:fld id="{12FDE44A-B5A5-422E-A044-ACFC71B9BE9C}" type="datetimeFigureOut">
               <a:rPr lang="ru-RU" smtClean="0"/>
-              <a:t>11.06.2021</a:t>
+              <a:t>13.06.2021</a:t>
             </a:fld>
             <a:endParaRPr lang="ru-RU"/>
           </a:p>
@@ -4592,7 +4597,7 @@
           <a:p>
             <a:fld id="{12FDE44A-B5A5-422E-A044-ACFC71B9BE9C}" type="datetimeFigureOut">
               <a:rPr lang="ru-RU" smtClean="0"/>
-              <a:t>11.06.2021</a:t>
+              <a:t>13.06.2021</a:t>
             </a:fld>
             <a:endParaRPr lang="ru-RU"/>
           </a:p>
@@ -4871,7 +4876,7 @@
           <a:p>
             <a:fld id="{12FDE44A-B5A5-422E-A044-ACFC71B9BE9C}" type="datetimeFigureOut">
               <a:rPr lang="ru-RU" smtClean="0"/>
-              <a:t>11.06.2021</a:t>
+              <a:t>13.06.2021</a:t>
             </a:fld>
             <a:endParaRPr lang="ru-RU"/>
           </a:p>
@@ -5146,7 +5151,7 @@
           <a:p>
             <a:fld id="{12FDE44A-B5A5-422E-A044-ACFC71B9BE9C}" type="datetimeFigureOut">
               <a:rPr lang="ru-RU" smtClean="0"/>
-              <a:t>11.06.2021</a:t>
+              <a:t>13.06.2021</a:t>
             </a:fld>
             <a:endParaRPr lang="ru-RU"/>
           </a:p>
@@ -5575,7 +5580,7 @@
           <a:p>
             <a:fld id="{12FDE44A-B5A5-422E-A044-ACFC71B9BE9C}" type="datetimeFigureOut">
               <a:rPr lang="ru-RU" smtClean="0"/>
-              <a:t>11.06.2021</a:t>
+              <a:t>13.06.2021</a:t>
             </a:fld>
             <a:endParaRPr lang="ru-RU"/>
           </a:p>
@@ -6115,8 +6120,8 @@
         </p:nvSpPr>
         <p:spPr>
           <a:xfrm>
-            <a:off x="0" y="1300616"/>
-            <a:ext cx="12192000" cy="1400530"/>
+            <a:off x="0" y="2510444"/>
+            <a:ext cx="12192000" cy="955963"/>
           </a:xfrm>
         </p:spPr>
         <p:txBody>
@@ -6124,84 +6129,21 @@
           <a:lstStyle/>
           <a:p>
             <a:pPr algn="ctr"/>
-            <a:r>
-              <a:rPr lang="ru-RU" dirty="0" smtClean="0"/>
-              <a:t>Защита проекта</a:t>
-            </a:r>
-            <a:br>
-              <a:rPr lang="ru-RU" dirty="0" smtClean="0"/>
-            </a:br>
-            <a:r>
-              <a:rPr lang="en-US" dirty="0" smtClean="0">
-                <a:solidFill>
-                  <a:srgbClr val="FFFF00"/>
-                </a:solidFill>
-              </a:rPr>
-              <a:t>“</a:t>
-            </a:r>
             <a:r>
               <a:rPr lang="ru-RU" dirty="0" smtClean="0">
                 <a:solidFill>
                   <a:srgbClr val="FFFF00"/>
                 </a:solidFill>
               </a:rPr>
-              <a:t>Система онлайн</a:t>
-            </a:r>
-            <a:r>
-              <a:rPr lang="en-US" dirty="0" smtClean="0">
+              <a:t>Хорошо ли видно и слышно</a:t>
+            </a:r>
+            <a:r>
+              <a:rPr lang="en-US" dirty="0">
                 <a:solidFill>
                   <a:srgbClr val="FFFF00"/>
                 </a:solidFill>
               </a:rPr>
-              <a:t> </a:t>
-            </a:r>
-            <a:r>
-              <a:rPr lang="ru-RU" dirty="0" smtClean="0">
-                <a:solidFill>
-                  <a:srgbClr val="FFFF00"/>
-                </a:solidFill>
-              </a:rPr>
-              <a:t>бронирования</a:t>
-            </a:r>
-            <a:r>
-              <a:rPr lang="ru-RU" dirty="0">
-                <a:solidFill>
-                  <a:srgbClr val="FFFF00"/>
-                </a:solidFill>
-              </a:rPr>
-              <a:t> </a:t>
-            </a:r>
-            <a:r>
-              <a:rPr lang="ru-RU" dirty="0" smtClean="0">
-                <a:solidFill>
-                  <a:srgbClr val="FFFF00"/>
-                </a:solidFill>
-              </a:rPr>
-              <a:t>на </a:t>
-            </a:r>
-            <a:r>
-              <a:rPr lang="ru-RU" dirty="0" err="1" smtClean="0">
-                <a:solidFill>
-                  <a:srgbClr val="FFFF00"/>
-                </a:solidFill>
-              </a:rPr>
-              <a:t>микросервисной</a:t>
-            </a:r>
-            <a:r>
-              <a:rPr lang="ru-RU" dirty="0" smtClean="0">
-                <a:solidFill>
-                  <a:srgbClr val="FFFF00"/>
-                </a:solidFill>
-              </a:rPr>
-              <a:t> архитектуре</a:t>
-            </a:r>
-            <a:r>
-              <a:rPr lang="en-US" dirty="0" smtClean="0">
-                <a:solidFill>
-                  <a:srgbClr val="FFFF00"/>
-                </a:solidFill>
-              </a:rPr>
-              <a:t>”</a:t>
+              <a:t>?</a:t>
             </a:r>
             <a:endParaRPr lang="ru-RU" dirty="0">
               <a:solidFill>
@@ -6211,46 +6153,10 @@
           </a:p>
         </p:txBody>
       </p:sp>
-      <p:sp>
-        <p:nvSpPr>
-          <p:cNvPr id="6" name="Content Placeholder 2"/>
-          <p:cNvSpPr>
-            <a:spLocks noGrp="1"/>
-          </p:cNvSpPr>
-          <p:nvPr>
-            <p:ph idx="1"/>
-          </p:nvPr>
-        </p:nvSpPr>
-        <p:spPr>
-          <a:xfrm>
-            <a:off x="8305013" y="5259729"/>
-            <a:ext cx="2391581" cy="500048"/>
-          </a:xfrm>
-        </p:spPr>
-        <p:txBody>
-          <a:bodyPr/>
-          <a:lstStyle/>
-          <a:p>
-            <a:pPr marL="0" indent="0" algn="r">
-              <a:buNone/>
-            </a:pPr>
-            <a:r>
-              <a:rPr lang="ru-RU" b="1" dirty="0" smtClean="0"/>
-              <a:t>Тиунов Геннадий</a:t>
-            </a:r>
-          </a:p>
-          <a:p>
-            <a:pPr marL="0" indent="0">
-              <a:buNone/>
-            </a:pPr>
-            <a:endParaRPr lang="ru-RU" dirty="0" smtClean="0"/>
-          </a:p>
-        </p:txBody>
-      </p:sp>
     </p:spTree>
     <p:extLst>
       <p:ext uri="{BB962C8B-B14F-4D97-AF65-F5344CB8AC3E}">
-        <p14:creationId xmlns:p14="http://schemas.microsoft.com/office/powerpoint/2010/main" val="3712654356"/>
+        <p14:creationId xmlns:p14="http://schemas.microsoft.com/office/powerpoint/2010/main" val="2374031098"/>
       </p:ext>
     </p:extLst>
   </p:cSld>
@@ -6268,101 +6174,6 @@
 </file>
 
 <file path=ppt/slides/slide10.xml><?xml version="1.0" encoding="utf-8"?>
-<p:sld xmlns:a="http://schemas.openxmlformats.org/drawingml/2006/main" xmlns:r="http://schemas.openxmlformats.org/officeDocument/2006/relationships" xmlns:p="http://schemas.openxmlformats.org/presentationml/2006/main">
-  <p:cSld>
-    <p:spTree>
-      <p:nvGrpSpPr>
-        <p:cNvPr id="1" name=""/>
-        <p:cNvGrpSpPr/>
-        <p:nvPr/>
-      </p:nvGrpSpPr>
-      <p:grpSpPr>
-        <a:xfrm>
-          <a:off x="0" y="0"/>
-          <a:ext cx="0" cy="0"/>
-          <a:chOff x="0" y="0"/>
-          <a:chExt cx="0" cy="0"/>
-        </a:xfrm>
-      </p:grpSpPr>
-      <p:sp>
-        <p:nvSpPr>
-          <p:cNvPr id="2" name="Title 1"/>
-          <p:cNvSpPr>
-            <a:spLocks noGrp="1"/>
-          </p:cNvSpPr>
-          <p:nvPr>
-            <p:ph type="title"/>
-          </p:nvPr>
-        </p:nvSpPr>
-        <p:spPr>
-          <a:xfrm>
-            <a:off x="646111" y="452718"/>
-            <a:ext cx="9404723" cy="812202"/>
-          </a:xfrm>
-        </p:spPr>
-        <p:txBody>
-          <a:bodyPr/>
-          <a:lstStyle/>
-          <a:p>
-            <a:r>
-              <a:rPr lang="en-US" dirty="0" smtClean="0">
-                <a:solidFill>
-                  <a:srgbClr val="FFFF00"/>
-                </a:solidFill>
-              </a:rPr>
-              <a:t>API Gateway</a:t>
-            </a:r>
-            <a:endParaRPr lang="ru-RU" dirty="0">
-              <a:solidFill>
-                <a:srgbClr val="FFFF00"/>
-              </a:solidFill>
-            </a:endParaRPr>
-          </a:p>
-        </p:txBody>
-      </p:sp>
-      <p:pic>
-        <p:nvPicPr>
-          <p:cNvPr id="10" name="Content Placeholder 9"/>
-          <p:cNvPicPr>
-            <a:picLocks noGrp="1" noChangeAspect="1"/>
-          </p:cNvPicPr>
-          <p:nvPr>
-            <p:ph idx="1"/>
-          </p:nvPr>
-        </p:nvPicPr>
-        <p:blipFill>
-          <a:blip r:embed="rId2">
-            <a:extLst>
-              <a:ext uri="{28A0092B-C50C-407E-A947-70E740481C1C}">
-                <a14:useLocalDpi xmlns:a14="http://schemas.microsoft.com/office/drawing/2010/main" val="0"/>
-              </a:ext>
-            </a:extLst>
-          </a:blip>
-          <a:stretch>
-            <a:fillRect/>
-          </a:stretch>
-        </p:blipFill>
-        <p:spPr>
-          <a:xfrm>
-            <a:off x="3183775" y="1450856"/>
-            <a:ext cx="5045825" cy="5135132"/>
-          </a:xfrm>
-        </p:spPr>
-      </p:pic>
-    </p:spTree>
-    <p:extLst>
-      <p:ext uri="{BB962C8B-B14F-4D97-AF65-F5344CB8AC3E}">
-        <p14:creationId xmlns:p14="http://schemas.microsoft.com/office/powerpoint/2010/main" val="1691619045"/>
-      </p:ext>
-    </p:extLst>
-  </p:cSld>
-  <p:clrMapOvr>
-    <a:masterClrMapping/>
-  </p:clrMapOvr>
-</p:sld>
-</file>
-
-<file path=ppt/slides/slide11.xml><?xml version="1.0" encoding="utf-8"?>
 <p:sld xmlns:a="http://schemas.openxmlformats.org/drawingml/2006/main" xmlns:r="http://schemas.openxmlformats.org/officeDocument/2006/relationships" xmlns:p="http://schemas.openxmlformats.org/presentationml/2006/main">
   <p:cSld>
     <p:spTree>
@@ -6459,7 +6270,7 @@
 </p:sld>
 </file>
 
-<file path=ppt/slides/slide12.xml><?xml version="1.0" encoding="utf-8"?>
+<file path=ppt/slides/slide11.xml><?xml version="1.0" encoding="utf-8"?>
 <p:sld xmlns:a="http://schemas.openxmlformats.org/drawingml/2006/main" xmlns:r="http://schemas.openxmlformats.org/officeDocument/2006/relationships" xmlns:p="http://schemas.openxmlformats.org/presentationml/2006/main">
   <p:cSld>
     <p:spTree>
@@ -6556,7 +6367,7 @@
 </p:sld>
 </file>
 
-<file path=ppt/slides/slide13.xml><?xml version="1.0" encoding="utf-8"?>
+<file path=ppt/slides/slide12.xml><?xml version="1.0" encoding="utf-8"?>
 <p:sld xmlns:a="http://schemas.openxmlformats.org/drawingml/2006/main" xmlns:r="http://schemas.openxmlformats.org/officeDocument/2006/relationships" xmlns:p="http://schemas.openxmlformats.org/presentationml/2006/main">
   <p:cSld>
     <p:spTree>
@@ -6583,467 +6394,6 @@
             <p:ph type="title"/>
           </p:nvPr>
         </p:nvSpPr>
-        <p:spPr>
-          <a:xfrm>
-            <a:off x="-66502" y="2140202"/>
-            <a:ext cx="12258501" cy="1400530"/>
-          </a:xfrm>
-        </p:spPr>
-        <p:txBody>
-          <a:bodyPr/>
-          <a:lstStyle/>
-          <a:p>
-            <a:pPr algn="ctr"/>
-            <a:r>
-              <a:rPr lang="ru-RU" dirty="0" smtClean="0">
-                <a:solidFill>
-                  <a:srgbClr val="FFFF00"/>
-                </a:solidFill>
-              </a:rPr>
-              <a:t>Спасибо за внимание!</a:t>
-            </a:r>
-            <a:endParaRPr lang="ru-RU" dirty="0">
-              <a:solidFill>
-                <a:srgbClr val="FFFF00"/>
-              </a:solidFill>
-            </a:endParaRPr>
-          </a:p>
-        </p:txBody>
-      </p:sp>
-      <p:sp>
-        <p:nvSpPr>
-          <p:cNvPr id="3" name="Content Placeholder 2"/>
-          <p:cNvSpPr>
-            <a:spLocks noGrp="1"/>
-          </p:cNvSpPr>
-          <p:nvPr>
-            <p:ph idx="1"/>
-          </p:nvPr>
-        </p:nvSpPr>
-        <p:spPr>
-          <a:xfrm>
-            <a:off x="6909848" y="4976925"/>
-            <a:ext cx="3833881" cy="1141072"/>
-          </a:xfrm>
-        </p:spPr>
-        <p:txBody>
-          <a:bodyPr/>
-          <a:lstStyle/>
-          <a:p>
-            <a:pPr marL="0" indent="0" algn="r">
-              <a:buNone/>
-            </a:pPr>
-            <a:r>
-              <a:rPr lang="ru-RU" b="1" dirty="0" smtClean="0"/>
-              <a:t>Тиунов Геннадий</a:t>
-            </a:r>
-          </a:p>
-          <a:p>
-            <a:pPr marL="0" indent="0" algn="r">
-              <a:buNone/>
-            </a:pPr>
-            <a:r>
-              <a:rPr lang="en-US" dirty="0" smtClean="0"/>
-              <a:t>gennady.tiunov@gmail.com</a:t>
-            </a:r>
-            <a:endParaRPr lang="ru-RU" dirty="0" smtClean="0"/>
-          </a:p>
-          <a:p>
-            <a:pPr marL="0" indent="0">
-              <a:buNone/>
-            </a:pPr>
-            <a:endParaRPr lang="ru-RU" dirty="0" smtClean="0"/>
-          </a:p>
-        </p:txBody>
-      </p:sp>
-    </p:spTree>
-    <p:extLst>
-      <p:ext uri="{BB962C8B-B14F-4D97-AF65-F5344CB8AC3E}">
-        <p14:creationId xmlns:p14="http://schemas.microsoft.com/office/powerpoint/2010/main" val="561744723"/>
-      </p:ext>
-    </p:extLst>
-  </p:cSld>
-  <p:clrMapOvr>
-    <a:masterClrMapping/>
-  </p:clrMapOvr>
-</p:sld>
-</file>
-
-<file path=ppt/slides/slide2.xml><?xml version="1.0" encoding="utf-8"?>
-<p:sld xmlns:a="http://schemas.openxmlformats.org/drawingml/2006/main" xmlns:r="http://schemas.openxmlformats.org/officeDocument/2006/relationships" xmlns:p="http://schemas.openxmlformats.org/presentationml/2006/main">
-  <p:cSld>
-    <p:spTree>
-      <p:nvGrpSpPr>
-        <p:cNvPr id="1" name=""/>
-        <p:cNvGrpSpPr/>
-        <p:nvPr/>
-      </p:nvGrpSpPr>
-      <p:grpSpPr>
-        <a:xfrm>
-          <a:off x="0" y="0"/>
-          <a:ext cx="0" cy="0"/>
-          <a:chOff x="0" y="0"/>
-          <a:chExt cx="0" cy="0"/>
-        </a:xfrm>
-      </p:grpSpPr>
-      <p:sp>
-        <p:nvSpPr>
-          <p:cNvPr id="2" name="Title 1"/>
-          <p:cNvSpPr>
-            <a:spLocks noGrp="1"/>
-          </p:cNvSpPr>
-          <p:nvPr>
-            <p:ph type="title"/>
-          </p:nvPr>
-        </p:nvSpPr>
-        <p:spPr/>
-        <p:txBody>
-          <a:bodyPr/>
-          <a:lstStyle/>
-          <a:p>
-            <a:r>
-              <a:rPr lang="ru-RU" dirty="0" smtClean="0">
-                <a:solidFill>
-                  <a:srgbClr val="FFFF00"/>
-                </a:solidFill>
-              </a:rPr>
-              <a:t>Технологии и компоненты</a:t>
-            </a:r>
-            <a:endParaRPr lang="ru-RU" dirty="0">
-              <a:solidFill>
-                <a:srgbClr val="FFFF00"/>
-              </a:solidFill>
-            </a:endParaRPr>
-          </a:p>
-        </p:txBody>
-      </p:sp>
-      <p:sp>
-        <p:nvSpPr>
-          <p:cNvPr id="3" name="Content Placeholder 2"/>
-          <p:cNvSpPr>
-            <a:spLocks noGrp="1"/>
-          </p:cNvSpPr>
-          <p:nvPr>
-            <p:ph idx="1"/>
-          </p:nvPr>
-        </p:nvSpPr>
-        <p:spPr/>
-        <p:txBody>
-          <a:bodyPr>
-            <a:normAutofit lnSpcReduction="10000"/>
-          </a:bodyPr>
-          <a:lstStyle/>
-          <a:p>
-            <a:r>
-              <a:rPr lang="en-US" dirty="0" smtClean="0"/>
-              <a:t>Framework: </a:t>
-            </a:r>
-            <a:r>
-              <a:rPr lang="en-US" dirty="0" err="1" smtClean="0"/>
-              <a:t>.Net</a:t>
-            </a:r>
-            <a:r>
-              <a:rPr lang="en-US" dirty="0" smtClean="0"/>
-              <a:t> Core 3.1</a:t>
-            </a:r>
-          </a:p>
-          <a:p>
-            <a:r>
-              <a:rPr lang="en-US" dirty="0" smtClean="0"/>
-              <a:t>DB</a:t>
-            </a:r>
-            <a:r>
-              <a:rPr lang="ru-RU" dirty="0" smtClean="0"/>
-              <a:t> – </a:t>
-            </a:r>
-            <a:r>
-              <a:rPr lang="en-US" dirty="0" smtClean="0"/>
-              <a:t>MS SQL (Express Edition)</a:t>
-            </a:r>
-          </a:p>
-          <a:p>
-            <a:r>
-              <a:rPr lang="en-US" dirty="0" smtClean="0"/>
-              <a:t>ORM: LINQ 2 DB</a:t>
-            </a:r>
-          </a:p>
-          <a:p>
-            <a:r>
-              <a:rPr lang="en-US" dirty="0" smtClean="0"/>
-              <a:t>Message Broker – Kafka (Confluent)</a:t>
-            </a:r>
-          </a:p>
-          <a:p>
-            <a:r>
-              <a:rPr lang="en-US" dirty="0" smtClean="0"/>
-              <a:t>Saga State Machine: </a:t>
-            </a:r>
-            <a:r>
-              <a:rPr lang="en-US" dirty="0" err="1" smtClean="0"/>
-              <a:t>MassTransit</a:t>
-            </a:r>
-            <a:r>
-              <a:rPr lang="en-US" dirty="0" smtClean="0"/>
-              <a:t> (</a:t>
-            </a:r>
-            <a:r>
-              <a:rPr lang="en-US" dirty="0" err="1" smtClean="0"/>
-              <a:t>Automatonymous</a:t>
-            </a:r>
-            <a:r>
-              <a:rPr lang="en-US" dirty="0" smtClean="0"/>
-              <a:t>)</a:t>
-            </a:r>
-          </a:p>
-          <a:p>
-            <a:r>
-              <a:rPr lang="en-US" dirty="0" smtClean="0"/>
-              <a:t>Kubernetes (Windows </a:t>
-            </a:r>
-            <a:r>
-              <a:rPr lang="en-US" dirty="0" err="1" smtClean="0"/>
-              <a:t>Minikube</a:t>
-            </a:r>
-            <a:r>
-              <a:rPr lang="en-US" dirty="0" smtClean="0"/>
-              <a:t>) / Docker</a:t>
-            </a:r>
-          </a:p>
-          <a:p>
-            <a:r>
-              <a:rPr lang="en-US" dirty="0" smtClean="0"/>
-              <a:t>Helm</a:t>
-            </a:r>
-            <a:endParaRPr lang="ru-RU" dirty="0" smtClean="0"/>
-          </a:p>
-          <a:p>
-            <a:r>
-              <a:rPr lang="en-US" dirty="0" smtClean="0"/>
-              <a:t>Logging (</a:t>
-            </a:r>
-            <a:r>
-              <a:rPr lang="en-US" dirty="0" err="1" smtClean="0"/>
-              <a:t>Serilog</a:t>
-            </a:r>
-            <a:r>
-              <a:rPr lang="en-US" dirty="0" smtClean="0"/>
-              <a:t>)</a:t>
-            </a:r>
-          </a:p>
-          <a:p>
-            <a:r>
-              <a:rPr lang="en-US" dirty="0" err="1" smtClean="0"/>
-              <a:t>Automapper</a:t>
-            </a:r>
-            <a:endParaRPr lang="en-US" dirty="0" smtClean="0"/>
-          </a:p>
-          <a:p>
-            <a:r>
-              <a:rPr lang="en-US" dirty="0" smtClean="0"/>
-              <a:t>Front-end: Postman Collection</a:t>
-            </a:r>
-          </a:p>
-          <a:p>
-            <a:endParaRPr lang="en-US" dirty="0" smtClean="0"/>
-          </a:p>
-          <a:p>
-            <a:pPr marL="0" indent="0">
-              <a:buNone/>
-            </a:pPr>
-            <a:endParaRPr lang="en-US" dirty="0" smtClean="0"/>
-          </a:p>
-          <a:p>
-            <a:endParaRPr lang="ru-RU" dirty="0"/>
-          </a:p>
-        </p:txBody>
-      </p:sp>
-    </p:spTree>
-    <p:extLst>
-      <p:ext uri="{BB962C8B-B14F-4D97-AF65-F5344CB8AC3E}">
-        <p14:creationId xmlns:p14="http://schemas.microsoft.com/office/powerpoint/2010/main" val="1278317033"/>
-      </p:ext>
-    </p:extLst>
-  </p:cSld>
-  <p:clrMapOvr>
-    <a:masterClrMapping/>
-  </p:clrMapOvr>
-  <p:timing>
-    <p:tnLst>
-      <p:par>
-        <p:cTn id="1" dur="indefinite" restart="never" nodeType="tmRoot"/>
-      </p:par>
-    </p:tnLst>
-  </p:timing>
-</p:sld>
-</file>
-
-<file path=ppt/slides/slide3.xml><?xml version="1.0" encoding="utf-8"?>
-<p:sld xmlns:a="http://schemas.openxmlformats.org/drawingml/2006/main" xmlns:r="http://schemas.openxmlformats.org/officeDocument/2006/relationships" xmlns:p="http://schemas.openxmlformats.org/presentationml/2006/main">
-  <p:cSld>
-    <p:spTree>
-      <p:nvGrpSpPr>
-        <p:cNvPr id="1" name=""/>
-        <p:cNvGrpSpPr/>
-        <p:nvPr/>
-      </p:nvGrpSpPr>
-      <p:grpSpPr>
-        <a:xfrm>
-          <a:off x="0" y="0"/>
-          <a:ext cx="0" cy="0"/>
-          <a:chOff x="0" y="0"/>
-          <a:chExt cx="0" cy="0"/>
-        </a:xfrm>
-      </p:grpSpPr>
-      <p:sp>
-        <p:nvSpPr>
-          <p:cNvPr id="2" name="Title 1"/>
-          <p:cNvSpPr>
-            <a:spLocks noGrp="1"/>
-          </p:cNvSpPr>
-          <p:nvPr>
-            <p:ph type="title"/>
-          </p:nvPr>
-        </p:nvSpPr>
-        <p:spPr/>
-        <p:txBody>
-          <a:bodyPr/>
-          <a:lstStyle/>
-          <a:p>
-            <a:r>
-              <a:rPr lang="ru-RU" dirty="0" smtClean="0">
-                <a:solidFill>
-                  <a:srgbClr val="FFFF00"/>
-                </a:solidFill>
-              </a:rPr>
-              <a:t>Паттерны и подходы</a:t>
-            </a:r>
-            <a:endParaRPr lang="ru-RU" dirty="0">
-              <a:solidFill>
-                <a:srgbClr val="FFFF00"/>
-              </a:solidFill>
-            </a:endParaRPr>
-          </a:p>
-        </p:txBody>
-      </p:sp>
-      <p:sp>
-        <p:nvSpPr>
-          <p:cNvPr id="3" name="Content Placeholder 2"/>
-          <p:cNvSpPr>
-            <a:spLocks noGrp="1"/>
-          </p:cNvSpPr>
-          <p:nvPr>
-            <p:ph idx="1"/>
-          </p:nvPr>
-        </p:nvSpPr>
-        <p:spPr/>
-        <p:txBody>
-          <a:bodyPr/>
-          <a:lstStyle/>
-          <a:p>
-            <a:r>
-              <a:rPr lang="en-US" dirty="0" smtClean="0"/>
-              <a:t>API Gateway (Nginx)</a:t>
-            </a:r>
-          </a:p>
-          <a:p>
-            <a:r>
-              <a:rPr lang="en-US" dirty="0" smtClean="0"/>
-              <a:t>REST &amp; EDA</a:t>
-            </a:r>
-          </a:p>
-          <a:p>
-            <a:r>
-              <a:rPr lang="en-US" dirty="0"/>
-              <a:t>REST Endpoint Connectors</a:t>
-            </a:r>
-          </a:p>
-          <a:p>
-            <a:r>
-              <a:rPr lang="en-US" dirty="0" smtClean="0"/>
-              <a:t>S2S Authorization (X-Service-Token, GUID) for REST interaction</a:t>
-            </a:r>
-          </a:p>
-          <a:p>
-            <a:r>
-              <a:rPr lang="en-US" dirty="0" smtClean="0"/>
-              <a:t>Booking: </a:t>
-            </a:r>
-            <a:r>
-              <a:rPr lang="en-US" dirty="0" err="1" smtClean="0"/>
-              <a:t>idempotency</a:t>
-            </a:r>
-            <a:r>
-              <a:rPr lang="en-US" dirty="0" smtClean="0"/>
-              <a:t> keys (client generated natural key – Booking Id)</a:t>
-            </a:r>
-          </a:p>
-          <a:p>
-            <a:r>
-              <a:rPr lang="en-US" dirty="0" smtClean="0"/>
-              <a:t>Booking: concurrency resolution (available seat check) based on transactions with serializable isolation level</a:t>
-            </a:r>
-          </a:p>
-          <a:p>
-            <a:r>
-              <a:rPr lang="en-US" dirty="0" smtClean="0"/>
-              <a:t>Saga with orchestration</a:t>
-            </a:r>
-          </a:p>
-          <a:p>
-            <a:endParaRPr lang="en-US" dirty="0" smtClean="0"/>
-          </a:p>
-          <a:p>
-            <a:endParaRPr lang="en-US" dirty="0" smtClean="0"/>
-          </a:p>
-        </p:txBody>
-      </p:sp>
-    </p:spTree>
-    <p:extLst>
-      <p:ext uri="{BB962C8B-B14F-4D97-AF65-F5344CB8AC3E}">
-        <p14:creationId xmlns:p14="http://schemas.microsoft.com/office/powerpoint/2010/main" val="469862735"/>
-      </p:ext>
-    </p:extLst>
-  </p:cSld>
-  <p:clrMapOvr>
-    <a:masterClrMapping/>
-  </p:clrMapOvr>
-  <p:timing>
-    <p:tnLst>
-      <p:par>
-        <p:cTn id="1" dur="indefinite" restart="never" nodeType="tmRoot"/>
-      </p:par>
-    </p:tnLst>
-  </p:timing>
-</p:sld>
-</file>
-
-<file path=ppt/slides/slide4.xml><?xml version="1.0" encoding="utf-8"?>
-<p:sld xmlns:a="http://schemas.openxmlformats.org/drawingml/2006/main" xmlns:r="http://schemas.openxmlformats.org/officeDocument/2006/relationships" xmlns:p="http://schemas.openxmlformats.org/presentationml/2006/main">
-  <p:cSld>
-    <p:spTree>
-      <p:nvGrpSpPr>
-        <p:cNvPr id="1" name=""/>
-        <p:cNvGrpSpPr/>
-        <p:nvPr/>
-      </p:nvGrpSpPr>
-      <p:grpSpPr>
-        <a:xfrm>
-          <a:off x="0" y="0"/>
-          <a:ext cx="0" cy="0"/>
-          <a:chOff x="0" y="0"/>
-          <a:chExt cx="0" cy="0"/>
-        </a:xfrm>
-      </p:grpSpPr>
-      <p:sp>
-        <p:nvSpPr>
-          <p:cNvPr id="2" name="Title 1"/>
-          <p:cNvSpPr>
-            <a:spLocks noGrp="1"/>
-          </p:cNvSpPr>
-          <p:nvPr>
-            <p:ph type="title"/>
-          </p:nvPr>
-        </p:nvSpPr>
         <p:spPr/>
         <p:txBody>
           <a:bodyPr/>
@@ -7093,7 +6443,11 @@
           <a:p>
             <a:r>
               <a:rPr lang="ru-RU" dirty="0" smtClean="0"/>
-              <a:t>4 сервиса используются для аутентификации </a:t>
+              <a:t>4 из них используются </a:t>
+            </a:r>
+            <a:r>
+              <a:rPr lang="ru-RU" dirty="0" smtClean="0"/>
+              <a:t>для аутентификации </a:t>
             </a:r>
             <a:r>
               <a:rPr lang="en-US" dirty="0" smtClean="0"/>
@@ -7101,77 +6455,19 @@
             </a:r>
             <a:r>
               <a:rPr lang="ru-RU" dirty="0" smtClean="0"/>
-              <a:t> идентификации</a:t>
-            </a:r>
-          </a:p>
-          <a:p>
+              <a:t> </a:t>
+            </a:r>
             <a:r>
               <a:rPr lang="ru-RU" dirty="0" smtClean="0"/>
-              <a:t>каждый сервис может включать в себя</a:t>
+              <a:t>авторизации </a:t>
             </a:r>
             <a:r>
               <a:rPr lang="en-US" dirty="0" smtClean="0"/>
-              <a:t>:</a:t>
-            </a:r>
-          </a:p>
-          <a:p>
-            <a:pPr lvl="1">
-              <a:buFont typeface="Arial" panose="020B0604020202020204" pitchFamily="34" charset="0"/>
-              <a:buChar char="•"/>
-            </a:pPr>
-            <a:r>
-              <a:rPr lang="en-US" dirty="0" smtClean="0"/>
-              <a:t>REST Endpoint</a:t>
-            </a:r>
-          </a:p>
-          <a:p>
-            <a:pPr lvl="1">
-              <a:buFont typeface="Arial" panose="020B0604020202020204" pitchFamily="34" charset="0"/>
-              <a:buChar char="•"/>
-            </a:pPr>
-            <a:r>
-              <a:rPr lang="en-US" dirty="0" smtClean="0"/>
-              <a:t>REST Endpoint Connector</a:t>
-            </a:r>
-          </a:p>
-          <a:p>
-            <a:pPr lvl="1">
-              <a:buFont typeface="Arial" panose="020B0604020202020204" pitchFamily="34" charset="0"/>
-              <a:buChar char="•"/>
-            </a:pPr>
-            <a:r>
-              <a:rPr lang="en-US" dirty="0" smtClean="0"/>
-              <a:t>Contract (REST / EDA)</a:t>
-            </a:r>
-          </a:p>
-          <a:p>
-            <a:pPr lvl="1">
-              <a:buFont typeface="Arial" panose="020B0604020202020204" pitchFamily="34" charset="0"/>
-              <a:buChar char="•"/>
-            </a:pPr>
-            <a:r>
-              <a:rPr lang="en-US" dirty="0" smtClean="0"/>
-              <a:t>Data Access</a:t>
-            </a:r>
-          </a:p>
-          <a:p>
-            <a:pPr lvl="1">
-              <a:buFont typeface="Arial" panose="020B0604020202020204" pitchFamily="34" charset="0"/>
-              <a:buChar char="•"/>
-            </a:pPr>
-            <a:r>
-              <a:rPr lang="en-US" dirty="0" smtClean="0"/>
-              <a:t>Domain (Entities / Repositories)</a:t>
-            </a:r>
-          </a:p>
-          <a:p>
-            <a:pPr lvl="1">
-              <a:buFont typeface="Arial" panose="020B0604020202020204" pitchFamily="34" charset="0"/>
-              <a:buChar char="•"/>
-            </a:pPr>
-            <a:r>
-              <a:rPr lang="en-US" dirty="0" smtClean="0"/>
-              <a:t>Message Listeners / Handlers</a:t>
+              <a:t>/ </a:t>
+            </a:r>
+            <a:r>
+              <a:rPr lang="ru-RU" dirty="0" smtClean="0"/>
+              <a:t>идентификации</a:t>
             </a:r>
             <a:endParaRPr lang="ru-RU" dirty="0"/>
           </a:p>
@@ -7219,7 +6515,7 @@
 </p:sld>
 </file>
 
-<file path=ppt/slides/slide5.xml><?xml version="1.0" encoding="utf-8"?>
+<file path=ppt/slides/slide13.xml><?xml version="1.0" encoding="utf-8"?>
 <p:sld xmlns:a="http://schemas.openxmlformats.org/drawingml/2006/main" xmlns:r="http://schemas.openxmlformats.org/officeDocument/2006/relationships" xmlns:p="http://schemas.openxmlformats.org/presentationml/2006/main">
   <p:cSld>
     <p:spTree>
@@ -7252,7 +6548,7 @@
           <a:lstStyle/>
           <a:p>
             <a:r>
-              <a:rPr lang="ru-RU" dirty="0" smtClean="0">
+              <a:rPr lang="ru-RU" dirty="0">
                 <a:solidFill>
                   <a:srgbClr val="FFFF00"/>
                 </a:solidFill>
@@ -7260,7 +6556,7 @@
               <a:t>Структура сервиса (</a:t>
             </a:r>
             <a:r>
-              <a:rPr lang="en-US" dirty="0" smtClean="0">
+              <a:rPr lang="en-US" dirty="0">
                 <a:solidFill>
                   <a:srgbClr val="FFFF00"/>
                 </a:solidFill>
@@ -7268,30 +6564,88 @@
               <a:t>User Service</a:t>
             </a:r>
             <a:r>
-              <a:rPr lang="ru-RU" dirty="0" smtClean="0">
+              <a:rPr lang="ru-RU" dirty="0">
                 <a:solidFill>
                   <a:srgbClr val="FFFF00"/>
                 </a:solidFill>
               </a:rPr>
               <a:t>)</a:t>
             </a:r>
-            <a:endParaRPr lang="ru-RU" dirty="0">
-              <a:solidFill>
-                <a:srgbClr val="FFFF00"/>
-              </a:solidFill>
-            </a:endParaRPr>
+            <a:endParaRPr lang="ru-RU" dirty="0"/>
+          </a:p>
+        </p:txBody>
+      </p:sp>
+      <p:sp>
+        <p:nvSpPr>
+          <p:cNvPr id="6" name="Content Placeholder 5"/>
+          <p:cNvSpPr>
+            <a:spLocks noGrp="1"/>
+          </p:cNvSpPr>
+          <p:nvPr>
+            <p:ph sz="quarter" idx="4"/>
+          </p:nvPr>
+        </p:nvSpPr>
+        <p:spPr>
+          <a:xfrm>
+            <a:off x="5237018" y="1553814"/>
+            <a:ext cx="4123113" cy="4702524"/>
+          </a:xfrm>
+        </p:spPr>
+        <p:txBody>
+          <a:bodyPr/>
+          <a:lstStyle/>
+          <a:p>
+            <a:pPr lvl="1"/>
+            <a:r>
+              <a:rPr lang="en-US" dirty="0" smtClean="0"/>
+              <a:t>REST Endpoint</a:t>
+            </a:r>
+          </a:p>
+          <a:p>
+            <a:pPr lvl="1"/>
+            <a:r>
+              <a:rPr lang="en-US" dirty="0" smtClean="0"/>
+              <a:t>REST Endpoint Connector</a:t>
+            </a:r>
+          </a:p>
+          <a:p>
+            <a:pPr lvl="1"/>
+            <a:r>
+              <a:rPr lang="en-US" dirty="0" smtClean="0"/>
+              <a:t>Contract (REST / EDA)</a:t>
+            </a:r>
+          </a:p>
+          <a:p>
+            <a:pPr lvl="1"/>
+            <a:r>
+              <a:rPr lang="en-US" dirty="0" smtClean="0"/>
+              <a:t>Data Access</a:t>
+            </a:r>
+          </a:p>
+          <a:p>
+            <a:pPr lvl="1"/>
+            <a:r>
+              <a:rPr lang="en-US" dirty="0" smtClean="0"/>
+              <a:t>Domain (Entities / Repositories)</a:t>
+            </a:r>
+          </a:p>
+          <a:p>
+            <a:pPr lvl="1"/>
+            <a:r>
+              <a:rPr lang="en-US" dirty="0" smtClean="0"/>
+              <a:t>Message Listeners / Handlers</a:t>
+            </a:r>
+            <a:endParaRPr lang="ru-RU" dirty="0"/>
           </a:p>
         </p:txBody>
       </p:sp>
       <p:pic>
         <p:nvPicPr>
-          <p:cNvPr id="4" name="Content Placeholder 3"/>
+          <p:cNvPr id="5" name="Content Placeholder 3"/>
           <p:cNvPicPr>
-            <a:picLocks noGrp="1" noChangeAspect="1"/>
+            <a:picLocks noChangeAspect="1"/>
           </p:cNvPicPr>
-          <p:nvPr>
-            <p:ph idx="1"/>
-          </p:nvPr>
+          <p:nvPr/>
         </p:nvPicPr>
         <p:blipFill>
           <a:blip r:embed="rId2">
@@ -7307,221 +6661,8 @@
         </p:blipFill>
         <p:spPr>
           <a:xfrm>
-            <a:off x="4413626" y="1554479"/>
+            <a:off x="1662546" y="1553814"/>
             <a:ext cx="2770220" cy="4995949"/>
-          </a:xfrm>
-        </p:spPr>
-      </p:pic>
-    </p:spTree>
-    <p:extLst>
-      <p:ext uri="{BB962C8B-B14F-4D97-AF65-F5344CB8AC3E}">
-        <p14:creationId xmlns:p14="http://schemas.microsoft.com/office/powerpoint/2010/main" val="1479725362"/>
-      </p:ext>
-    </p:extLst>
-  </p:cSld>
-  <p:clrMapOvr>
-    <a:masterClrMapping/>
-  </p:clrMapOvr>
-  <p:timing>
-    <p:tnLst>
-      <p:par>
-        <p:cTn id="1" dur="indefinite" restart="never" nodeType="tmRoot"/>
-      </p:par>
-    </p:tnLst>
-  </p:timing>
-</p:sld>
-</file>
-
-<file path=ppt/slides/slide6.xml><?xml version="1.0" encoding="utf-8"?>
-<p:sld xmlns:a="http://schemas.openxmlformats.org/drawingml/2006/main" xmlns:r="http://schemas.openxmlformats.org/officeDocument/2006/relationships" xmlns:p="http://schemas.openxmlformats.org/presentationml/2006/main">
-  <p:cSld>
-    <p:spTree>
-      <p:nvGrpSpPr>
-        <p:cNvPr id="1" name=""/>
-        <p:cNvGrpSpPr/>
-        <p:nvPr/>
-      </p:nvGrpSpPr>
-      <p:grpSpPr>
-        <a:xfrm>
-          <a:off x="0" y="0"/>
-          <a:ext cx="0" cy="0"/>
-          <a:chOff x="0" y="0"/>
-          <a:chExt cx="0" cy="0"/>
-        </a:xfrm>
-      </p:grpSpPr>
-      <p:sp>
-        <p:nvSpPr>
-          <p:cNvPr id="2" name="Title 1"/>
-          <p:cNvSpPr>
-            <a:spLocks noGrp="1"/>
-          </p:cNvSpPr>
-          <p:nvPr>
-            <p:ph type="title"/>
-          </p:nvPr>
-        </p:nvSpPr>
-        <p:spPr/>
-        <p:txBody>
-          <a:bodyPr/>
-          <a:lstStyle/>
-          <a:p>
-            <a:r>
-              <a:rPr lang="en-US" dirty="0" smtClean="0">
-                <a:solidFill>
-                  <a:srgbClr val="FFFF00"/>
-                </a:solidFill>
-              </a:rPr>
-              <a:t>REST Scaffolding</a:t>
-            </a:r>
-            <a:endParaRPr lang="ru-RU" dirty="0">
-              <a:solidFill>
-                <a:srgbClr val="FFFF00"/>
-              </a:solidFill>
-            </a:endParaRPr>
-          </a:p>
-        </p:txBody>
-      </p:sp>
-      <p:sp>
-        <p:nvSpPr>
-          <p:cNvPr id="6" name="Content Placeholder 5"/>
-          <p:cNvSpPr>
-            <a:spLocks noGrp="1"/>
-          </p:cNvSpPr>
-          <p:nvPr>
-            <p:ph sz="half" idx="2"/>
-          </p:nvPr>
-        </p:nvSpPr>
-        <p:spPr>
-          <a:xfrm>
-            <a:off x="1103312" y="1905000"/>
-            <a:ext cx="4396339" cy="4351338"/>
-          </a:xfrm>
-        </p:spPr>
-        <p:txBody>
-          <a:bodyPr/>
-          <a:lstStyle/>
-          <a:p>
-            <a:pPr marL="0" indent="0">
-              <a:buNone/>
-            </a:pPr>
-            <a:endParaRPr lang="ru-RU" dirty="0"/>
-          </a:p>
-        </p:txBody>
-      </p:sp>
-      <p:sp>
-        <p:nvSpPr>
-          <p:cNvPr id="8" name="Content Placeholder 7"/>
-          <p:cNvSpPr>
-            <a:spLocks noGrp="1"/>
-          </p:cNvSpPr>
-          <p:nvPr>
-            <p:ph sz="quarter" idx="4"/>
-          </p:nvPr>
-        </p:nvSpPr>
-        <p:spPr>
-          <a:xfrm>
-            <a:off x="5654495" y="1905000"/>
-            <a:ext cx="4396339" cy="4351338"/>
-          </a:xfrm>
-        </p:spPr>
-        <p:txBody>
-          <a:bodyPr/>
-          <a:lstStyle/>
-          <a:p>
-            <a:r>
-              <a:rPr lang="ru-RU" dirty="0" smtClean="0"/>
-              <a:t>Обвязка для взаимодействия с сервисами через </a:t>
-            </a:r>
-            <a:r>
-              <a:rPr lang="en-US" dirty="0" smtClean="0"/>
-              <a:t>REST</a:t>
-            </a:r>
-          </a:p>
-          <a:p>
-            <a:pPr lvl="1">
-              <a:buFont typeface="Arial" panose="020B0604020202020204" pitchFamily="34" charset="0"/>
-              <a:buChar char="•"/>
-            </a:pPr>
-            <a:r>
-              <a:rPr lang="en-US" dirty="0"/>
-              <a:t>GET, POST, PUT, DELETE</a:t>
-            </a:r>
-          </a:p>
-          <a:p>
-            <a:pPr lvl="1">
-              <a:buFont typeface="Arial" panose="020B0604020202020204" pitchFamily="34" charset="0"/>
-              <a:buChar char="•"/>
-            </a:pPr>
-            <a:r>
-              <a:rPr lang="en-US" dirty="0" smtClean="0"/>
-              <a:t>JSON </a:t>
-            </a:r>
-            <a:r>
-              <a:rPr lang="ru-RU" dirty="0" err="1" smtClean="0"/>
-              <a:t>сериализация</a:t>
-            </a:r>
-            <a:r>
-              <a:rPr lang="en-US" dirty="0" smtClean="0"/>
-              <a:t> </a:t>
-            </a:r>
-            <a:r>
-              <a:rPr lang="en-US" dirty="0"/>
-              <a:t>/</a:t>
-            </a:r>
-            <a:r>
-              <a:rPr lang="ru-RU" dirty="0"/>
-              <a:t> </a:t>
-            </a:r>
-            <a:r>
-              <a:rPr lang="ru-RU" dirty="0" err="1"/>
-              <a:t>десериализация</a:t>
-            </a:r>
-            <a:r>
-              <a:rPr lang="ru-RU" dirty="0"/>
-              <a:t> для типизированных </a:t>
-            </a:r>
-            <a:r>
-              <a:rPr lang="en-US" dirty="0"/>
-              <a:t>Entities</a:t>
-            </a:r>
-          </a:p>
-          <a:p>
-            <a:endParaRPr lang="en-US" dirty="0" smtClean="0"/>
-          </a:p>
-          <a:p>
-            <a:r>
-              <a:rPr lang="en-US" dirty="0" smtClean="0"/>
-              <a:t>S2S Authorization</a:t>
-            </a:r>
-          </a:p>
-          <a:p>
-            <a:pPr>
-              <a:buFont typeface="Wingdings" panose="05000000000000000000" pitchFamily="2" charset="2"/>
-              <a:buChar char="ü"/>
-            </a:pPr>
-            <a:endParaRPr lang="en-US" dirty="0" smtClean="0"/>
-          </a:p>
-        </p:txBody>
-      </p:sp>
-      <p:pic>
-        <p:nvPicPr>
-          <p:cNvPr id="4" name="Content Placeholder 3"/>
-          <p:cNvPicPr>
-            <a:picLocks noGrp="1" noChangeAspect="1"/>
-          </p:cNvPicPr>
-          <p:nvPr>
-            <p:ph idx="4294967295"/>
-          </p:nvPr>
-        </p:nvPicPr>
-        <p:blipFill>
-          <a:blip r:embed="rId2"/>
-          <a:stretch>
-            <a:fillRect/>
-          </a:stretch>
-        </p:blipFill>
-        <p:spPr>
-          <a:xfrm>
-            <a:off x="1103312" y="1905000"/>
-            <a:ext cx="3427124" cy="3813364"/>
           </a:xfrm>
           <a:prstGeom prst="rect">
             <a:avLst/>
@@ -7531,24 +6672,17 @@
     </p:spTree>
     <p:extLst>
       <p:ext uri="{BB962C8B-B14F-4D97-AF65-F5344CB8AC3E}">
-        <p14:creationId xmlns:p14="http://schemas.microsoft.com/office/powerpoint/2010/main" val="1026477303"/>
+        <p14:creationId xmlns:p14="http://schemas.microsoft.com/office/powerpoint/2010/main" val="2827239154"/>
       </p:ext>
     </p:extLst>
   </p:cSld>
   <p:clrMapOvr>
     <a:masterClrMapping/>
   </p:clrMapOvr>
-  <p:timing>
-    <p:tnLst>
-      <p:par>
-        <p:cTn id="1" dur="indefinite" restart="never" nodeType="tmRoot"/>
-      </p:par>
-    </p:tnLst>
-  </p:timing>
 </p:sld>
 </file>
 
-<file path=ppt/slides/slide7.xml><?xml version="1.0" encoding="utf-8"?>
+<file path=ppt/slides/slide14.xml><?xml version="1.0" encoding="utf-8"?>
 <p:sld xmlns:a="http://schemas.openxmlformats.org/drawingml/2006/main" xmlns:r="http://schemas.openxmlformats.org/officeDocument/2006/relationships" xmlns:p="http://schemas.openxmlformats.org/presentationml/2006/main">
   <p:cSld>
     <p:spTree>
@@ -7645,7 +6779,224 @@
 </p:sld>
 </file>
 
-<file path=ppt/slides/slide8.xml><?xml version="1.0" encoding="utf-8"?>
+<file path=ppt/slides/slide15.xml><?xml version="1.0" encoding="utf-8"?>
+<p:sld xmlns:a="http://schemas.openxmlformats.org/drawingml/2006/main" xmlns:r="http://schemas.openxmlformats.org/officeDocument/2006/relationships" xmlns:p="http://schemas.openxmlformats.org/presentationml/2006/main">
+  <p:cSld>
+    <p:spTree>
+      <p:nvGrpSpPr>
+        <p:cNvPr id="1" name=""/>
+        <p:cNvGrpSpPr/>
+        <p:nvPr/>
+      </p:nvGrpSpPr>
+      <p:grpSpPr>
+        <a:xfrm>
+          <a:off x="0" y="0"/>
+          <a:ext cx="0" cy="0"/>
+          <a:chOff x="0" y="0"/>
+          <a:chExt cx="0" cy="0"/>
+        </a:xfrm>
+      </p:grpSpPr>
+      <p:sp>
+        <p:nvSpPr>
+          <p:cNvPr id="2" name="Title 1"/>
+          <p:cNvSpPr>
+            <a:spLocks noGrp="1"/>
+          </p:cNvSpPr>
+          <p:nvPr>
+            <p:ph type="title"/>
+          </p:nvPr>
+        </p:nvSpPr>
+        <p:spPr/>
+        <p:txBody>
+          <a:bodyPr/>
+          <a:lstStyle/>
+          <a:p>
+            <a:r>
+              <a:rPr lang="en-US" dirty="0" smtClean="0">
+                <a:solidFill>
+                  <a:srgbClr val="FFFF00"/>
+                </a:solidFill>
+              </a:rPr>
+              <a:t>REST Scaffolding</a:t>
+            </a:r>
+            <a:endParaRPr lang="ru-RU" dirty="0">
+              <a:solidFill>
+                <a:srgbClr val="FFFF00"/>
+              </a:solidFill>
+            </a:endParaRPr>
+          </a:p>
+        </p:txBody>
+      </p:sp>
+      <p:sp>
+        <p:nvSpPr>
+          <p:cNvPr id="6" name="Content Placeholder 5"/>
+          <p:cNvSpPr>
+            <a:spLocks noGrp="1"/>
+          </p:cNvSpPr>
+          <p:nvPr>
+            <p:ph sz="half" idx="2"/>
+          </p:nvPr>
+        </p:nvSpPr>
+        <p:spPr>
+          <a:xfrm>
+            <a:off x="1103312" y="1905000"/>
+            <a:ext cx="4396339" cy="4351338"/>
+          </a:xfrm>
+        </p:spPr>
+        <p:txBody>
+          <a:bodyPr/>
+          <a:lstStyle/>
+          <a:p>
+            <a:pPr marL="0" indent="0">
+              <a:buNone/>
+            </a:pPr>
+            <a:endParaRPr lang="ru-RU" dirty="0"/>
+          </a:p>
+        </p:txBody>
+      </p:sp>
+      <p:sp>
+        <p:nvSpPr>
+          <p:cNvPr id="8" name="Content Placeholder 7"/>
+          <p:cNvSpPr>
+            <a:spLocks noGrp="1"/>
+          </p:cNvSpPr>
+          <p:nvPr>
+            <p:ph sz="quarter" idx="4"/>
+          </p:nvPr>
+        </p:nvSpPr>
+        <p:spPr>
+          <a:xfrm>
+            <a:off x="5654495" y="1905000"/>
+            <a:ext cx="4396339" cy="4351338"/>
+          </a:xfrm>
+        </p:spPr>
+        <p:txBody>
+          <a:bodyPr/>
+          <a:lstStyle/>
+          <a:p>
+            <a:r>
+              <a:rPr lang="ru-RU" dirty="0" smtClean="0"/>
+              <a:t>Обвязка для взаимодействия с сервисами через </a:t>
+            </a:r>
+            <a:r>
+              <a:rPr lang="en-US" dirty="0" smtClean="0"/>
+              <a:t>REST</a:t>
+            </a:r>
+          </a:p>
+          <a:p>
+            <a:pPr lvl="1">
+              <a:buFont typeface="Arial" panose="020B0604020202020204" pitchFamily="34" charset="0"/>
+              <a:buChar char="•"/>
+            </a:pPr>
+            <a:r>
+              <a:rPr lang="en-US" dirty="0"/>
+              <a:t>GET, POST, PUT, DELETE</a:t>
+            </a:r>
+          </a:p>
+          <a:p>
+            <a:pPr lvl="1">
+              <a:buFont typeface="Arial" panose="020B0604020202020204" pitchFamily="34" charset="0"/>
+              <a:buChar char="•"/>
+            </a:pPr>
+            <a:r>
+              <a:rPr lang="en-US" dirty="0" smtClean="0"/>
+              <a:t>JSON </a:t>
+            </a:r>
+            <a:r>
+              <a:rPr lang="ru-RU" dirty="0" err="1" smtClean="0"/>
+              <a:t>сериализация</a:t>
+            </a:r>
+            <a:r>
+              <a:rPr lang="en-US" dirty="0" smtClean="0"/>
+              <a:t> </a:t>
+            </a:r>
+            <a:r>
+              <a:rPr lang="en-US" dirty="0"/>
+              <a:t>/</a:t>
+            </a:r>
+            <a:r>
+              <a:rPr lang="ru-RU" dirty="0"/>
+              <a:t> </a:t>
+            </a:r>
+            <a:r>
+              <a:rPr lang="ru-RU" dirty="0" err="1"/>
+              <a:t>десериализация</a:t>
+            </a:r>
+            <a:r>
+              <a:rPr lang="ru-RU" dirty="0"/>
+              <a:t> для типизированных </a:t>
+            </a:r>
+            <a:r>
+              <a:rPr lang="en-US" dirty="0"/>
+              <a:t>Entities</a:t>
+            </a:r>
+          </a:p>
+          <a:p>
+            <a:r>
+              <a:rPr lang="en-US" dirty="0" smtClean="0"/>
+              <a:t>S2S </a:t>
+            </a:r>
+            <a:r>
+              <a:rPr lang="en-US" dirty="0" smtClean="0"/>
+              <a:t>Authorization</a:t>
+            </a:r>
+          </a:p>
+          <a:p>
+            <a:pPr>
+              <a:buFont typeface="Wingdings" panose="05000000000000000000" pitchFamily="2" charset="2"/>
+              <a:buChar char="ü"/>
+            </a:pPr>
+            <a:endParaRPr lang="en-US" dirty="0" smtClean="0"/>
+          </a:p>
+        </p:txBody>
+      </p:sp>
+      <p:pic>
+        <p:nvPicPr>
+          <p:cNvPr id="4" name="Content Placeholder 3"/>
+          <p:cNvPicPr>
+            <a:picLocks noGrp="1" noChangeAspect="1"/>
+          </p:cNvPicPr>
+          <p:nvPr>
+            <p:ph idx="4294967295"/>
+          </p:nvPr>
+        </p:nvPicPr>
+        <p:blipFill>
+          <a:blip r:embed="rId2"/>
+          <a:stretch>
+            <a:fillRect/>
+          </a:stretch>
+        </p:blipFill>
+        <p:spPr>
+          <a:xfrm>
+            <a:off x="1103312" y="1905000"/>
+            <a:ext cx="3427124" cy="3813364"/>
+          </a:xfrm>
+          <a:prstGeom prst="rect">
+            <a:avLst/>
+          </a:prstGeom>
+        </p:spPr>
+      </p:pic>
+    </p:spTree>
+    <p:extLst>
+      <p:ext uri="{BB962C8B-B14F-4D97-AF65-F5344CB8AC3E}">
+        <p14:creationId xmlns:p14="http://schemas.microsoft.com/office/powerpoint/2010/main" val="1026477303"/>
+      </p:ext>
+    </p:extLst>
+  </p:cSld>
+  <p:clrMapOvr>
+    <a:masterClrMapping/>
+  </p:clrMapOvr>
+  <p:timing>
+    <p:tnLst>
+      <p:par>
+        <p:cTn id="1" dur="indefinite" restart="never" nodeType="tmRoot"/>
+      </p:par>
+    </p:tnLst>
+  </p:timing>
+</p:sld>
+</file>
+
+<file path=ppt/slides/slide16.xml><?xml version="1.0" encoding="utf-8"?>
 <p:sld xmlns:a="http://schemas.openxmlformats.org/drawingml/2006/main" xmlns:r="http://schemas.openxmlformats.org/officeDocument/2006/relationships" xmlns:p="http://schemas.openxmlformats.org/presentationml/2006/main">
   <p:cSld>
     <p:spTree>
@@ -7806,7 +7157,7 @@
 </p:sld>
 </file>
 
-<file path=ppt/slides/slide9.xml><?xml version="1.0" encoding="utf-8"?>
+<file path=ppt/slides/slide17.xml><?xml version="1.0" encoding="utf-8"?>
 <p:sld xmlns:a="http://schemas.openxmlformats.org/drawingml/2006/main" xmlns:r="http://schemas.openxmlformats.org/officeDocument/2006/relationships" xmlns:p="http://schemas.openxmlformats.org/presentationml/2006/main">
   <p:cSld>
     <p:spTree>
@@ -7833,23 +7184,26 @@
             <p:ph type="title"/>
           </p:nvPr>
         </p:nvSpPr>
-        <p:spPr>
-          <a:xfrm>
-            <a:off x="646111" y="452718"/>
-            <a:ext cx="9404723" cy="829327"/>
-          </a:xfrm>
-        </p:spPr>
+        <p:spPr/>
         <p:txBody>
           <a:bodyPr/>
           <a:lstStyle/>
           <a:p>
+            <a:r>
+              <a:rPr lang="ru-RU" dirty="0" smtClean="0">
+                <a:solidFill>
+                  <a:srgbClr val="FFFF00"/>
+                </a:solidFill>
+              </a:rPr>
+              <a:t>Демонстрация в </a:t>
+            </a:r>
             <a:r>
               <a:rPr lang="en-US" dirty="0" smtClean="0">
                 <a:solidFill>
                   <a:srgbClr val="FFFF00"/>
                 </a:solidFill>
               </a:rPr>
-              <a:t>Service Interaction</a:t>
+              <a:t>Postman</a:t>
             </a:r>
             <a:endParaRPr lang="ru-RU" dirty="0">
               <a:solidFill>
@@ -7861,7 +7215,7 @@
       </p:sp>
       <p:pic>
         <p:nvPicPr>
-          <p:cNvPr id="4" name="Content Placeholder 3"/>
+          <p:cNvPr id="6" name="Content Placeholder 5"/>
           <p:cNvPicPr>
             <a:picLocks noGrp="1" noChangeAspect="1"/>
           </p:cNvPicPr>
@@ -7883,8 +7237,815 @@
         </p:blipFill>
         <p:spPr>
           <a:xfrm>
-            <a:off x="2336666" y="1282045"/>
-            <a:ext cx="7137272" cy="5470441"/>
+            <a:off x="2485505" y="1618949"/>
+            <a:ext cx="6525491" cy="4788330"/>
+          </a:xfrm>
+        </p:spPr>
+      </p:pic>
+    </p:spTree>
+    <p:extLst>
+      <p:ext uri="{BB962C8B-B14F-4D97-AF65-F5344CB8AC3E}">
+        <p14:creationId xmlns:p14="http://schemas.microsoft.com/office/powerpoint/2010/main" val="3298034387"/>
+      </p:ext>
+    </p:extLst>
+  </p:cSld>
+  <p:clrMapOvr>
+    <a:masterClrMapping/>
+  </p:clrMapOvr>
+  <p:timing>
+    <p:tnLst>
+      <p:par>
+        <p:cTn id="1" dur="indefinite" restart="never" nodeType="tmRoot"/>
+      </p:par>
+    </p:tnLst>
+  </p:timing>
+</p:sld>
+</file>
+
+<file path=ppt/slides/slide18.xml><?xml version="1.0" encoding="utf-8"?>
+<p:sld xmlns:a="http://schemas.openxmlformats.org/drawingml/2006/main" xmlns:r="http://schemas.openxmlformats.org/officeDocument/2006/relationships" xmlns:p="http://schemas.openxmlformats.org/presentationml/2006/main">
+  <p:cSld>
+    <p:spTree>
+      <p:nvGrpSpPr>
+        <p:cNvPr id="1" name=""/>
+        <p:cNvGrpSpPr/>
+        <p:nvPr/>
+      </p:nvGrpSpPr>
+      <p:grpSpPr>
+        <a:xfrm>
+          <a:off x="0" y="0"/>
+          <a:ext cx="0" cy="0"/>
+          <a:chOff x="0" y="0"/>
+          <a:chExt cx="0" cy="0"/>
+        </a:xfrm>
+      </p:grpSpPr>
+      <p:sp>
+        <p:nvSpPr>
+          <p:cNvPr id="2" name="Title 1"/>
+          <p:cNvSpPr>
+            <a:spLocks noGrp="1"/>
+          </p:cNvSpPr>
+          <p:nvPr>
+            <p:ph type="title"/>
+          </p:nvPr>
+        </p:nvSpPr>
+        <p:spPr>
+          <a:xfrm>
+            <a:off x="-66502" y="2140202"/>
+            <a:ext cx="12258501" cy="1400530"/>
+          </a:xfrm>
+        </p:spPr>
+        <p:txBody>
+          <a:bodyPr/>
+          <a:lstStyle/>
+          <a:p>
+            <a:pPr algn="ctr"/>
+            <a:r>
+              <a:rPr lang="ru-RU" dirty="0" smtClean="0">
+                <a:solidFill>
+                  <a:srgbClr val="FFFF00"/>
+                </a:solidFill>
+              </a:rPr>
+              <a:t>Спасибо за внимание!</a:t>
+            </a:r>
+            <a:endParaRPr lang="ru-RU" dirty="0">
+              <a:solidFill>
+                <a:srgbClr val="FFFF00"/>
+              </a:solidFill>
+            </a:endParaRPr>
+          </a:p>
+        </p:txBody>
+      </p:sp>
+      <p:sp>
+        <p:nvSpPr>
+          <p:cNvPr id="3" name="Content Placeholder 2"/>
+          <p:cNvSpPr>
+            <a:spLocks noGrp="1"/>
+          </p:cNvSpPr>
+          <p:nvPr>
+            <p:ph idx="1"/>
+          </p:nvPr>
+        </p:nvSpPr>
+        <p:spPr>
+          <a:xfrm>
+            <a:off x="6909848" y="4976925"/>
+            <a:ext cx="3833881" cy="1141072"/>
+          </a:xfrm>
+        </p:spPr>
+        <p:txBody>
+          <a:bodyPr/>
+          <a:lstStyle/>
+          <a:p>
+            <a:pPr marL="0" indent="0" algn="r">
+              <a:buNone/>
+            </a:pPr>
+            <a:r>
+              <a:rPr lang="ru-RU" b="1" dirty="0" smtClean="0"/>
+              <a:t>Тиунов Геннадий</a:t>
+            </a:r>
+          </a:p>
+          <a:p>
+            <a:pPr marL="0" indent="0" algn="r">
+              <a:buNone/>
+            </a:pPr>
+            <a:r>
+              <a:rPr lang="en-US" dirty="0" smtClean="0"/>
+              <a:t>gennady.tiunov@gmail.com</a:t>
+            </a:r>
+            <a:endParaRPr lang="ru-RU" dirty="0" smtClean="0"/>
+          </a:p>
+          <a:p>
+            <a:pPr marL="0" indent="0">
+              <a:buNone/>
+            </a:pPr>
+            <a:endParaRPr lang="ru-RU" dirty="0" smtClean="0"/>
+          </a:p>
+        </p:txBody>
+      </p:sp>
+    </p:spTree>
+    <p:extLst>
+      <p:ext uri="{BB962C8B-B14F-4D97-AF65-F5344CB8AC3E}">
+        <p14:creationId xmlns:p14="http://schemas.microsoft.com/office/powerpoint/2010/main" val="561744723"/>
+      </p:ext>
+    </p:extLst>
+  </p:cSld>
+  <p:clrMapOvr>
+    <a:masterClrMapping/>
+  </p:clrMapOvr>
+</p:sld>
+</file>
+
+<file path=ppt/slides/slide2.xml><?xml version="1.0" encoding="utf-8"?>
+<p:sld xmlns:a="http://schemas.openxmlformats.org/drawingml/2006/main" xmlns:r="http://schemas.openxmlformats.org/officeDocument/2006/relationships" xmlns:p="http://schemas.openxmlformats.org/presentationml/2006/main">
+  <p:cSld>
+    <p:spTree>
+      <p:nvGrpSpPr>
+        <p:cNvPr id="1" name=""/>
+        <p:cNvGrpSpPr/>
+        <p:nvPr/>
+      </p:nvGrpSpPr>
+      <p:grpSpPr>
+        <a:xfrm>
+          <a:off x="0" y="0"/>
+          <a:ext cx="0" cy="0"/>
+          <a:chOff x="0" y="0"/>
+          <a:chExt cx="0" cy="0"/>
+        </a:xfrm>
+      </p:grpSpPr>
+      <p:sp>
+        <p:nvSpPr>
+          <p:cNvPr id="2" name="Title 1"/>
+          <p:cNvSpPr>
+            <a:spLocks noGrp="1"/>
+          </p:cNvSpPr>
+          <p:nvPr>
+            <p:ph type="title"/>
+          </p:nvPr>
+        </p:nvSpPr>
+        <p:spPr>
+          <a:xfrm>
+            <a:off x="0" y="1300616"/>
+            <a:ext cx="12192000" cy="1400530"/>
+          </a:xfrm>
+        </p:spPr>
+        <p:txBody>
+          <a:bodyPr/>
+          <a:lstStyle/>
+          <a:p>
+            <a:pPr algn="ctr"/>
+            <a:r>
+              <a:rPr lang="ru-RU" dirty="0" smtClean="0"/>
+              <a:t>Защита проекта</a:t>
+            </a:r>
+            <a:br>
+              <a:rPr lang="ru-RU" dirty="0" smtClean="0"/>
+            </a:br>
+            <a:r>
+              <a:rPr lang="en-US" dirty="0" smtClean="0">
+                <a:solidFill>
+                  <a:srgbClr val="FFFF00"/>
+                </a:solidFill>
+              </a:rPr>
+              <a:t>“</a:t>
+            </a:r>
+            <a:r>
+              <a:rPr lang="ru-RU" dirty="0" smtClean="0">
+                <a:solidFill>
+                  <a:srgbClr val="FFFF00"/>
+                </a:solidFill>
+              </a:rPr>
+              <a:t>Система онлайн</a:t>
+            </a:r>
+            <a:r>
+              <a:rPr lang="en-US" dirty="0" smtClean="0">
+                <a:solidFill>
+                  <a:srgbClr val="FFFF00"/>
+                </a:solidFill>
+              </a:rPr>
+              <a:t> </a:t>
+            </a:r>
+            <a:r>
+              <a:rPr lang="ru-RU" dirty="0" smtClean="0">
+                <a:solidFill>
+                  <a:srgbClr val="FFFF00"/>
+                </a:solidFill>
+              </a:rPr>
+              <a:t>бронирования</a:t>
+            </a:r>
+            <a:r>
+              <a:rPr lang="ru-RU" dirty="0">
+                <a:solidFill>
+                  <a:srgbClr val="FFFF00"/>
+                </a:solidFill>
+              </a:rPr>
+              <a:t> </a:t>
+            </a:r>
+            <a:r>
+              <a:rPr lang="ru-RU" dirty="0" smtClean="0">
+                <a:solidFill>
+                  <a:srgbClr val="FFFF00"/>
+                </a:solidFill>
+              </a:rPr>
+              <a:t>на </a:t>
+            </a:r>
+            <a:r>
+              <a:rPr lang="ru-RU" dirty="0" err="1" smtClean="0">
+                <a:solidFill>
+                  <a:srgbClr val="FFFF00"/>
+                </a:solidFill>
+              </a:rPr>
+              <a:t>микросервисной</a:t>
+            </a:r>
+            <a:r>
+              <a:rPr lang="ru-RU" dirty="0" smtClean="0">
+                <a:solidFill>
+                  <a:srgbClr val="FFFF00"/>
+                </a:solidFill>
+              </a:rPr>
+              <a:t> архитектуре</a:t>
+            </a:r>
+            <a:r>
+              <a:rPr lang="en-US" dirty="0" smtClean="0">
+                <a:solidFill>
+                  <a:srgbClr val="FFFF00"/>
+                </a:solidFill>
+              </a:rPr>
+              <a:t>”</a:t>
+            </a:r>
+            <a:endParaRPr lang="ru-RU" dirty="0">
+              <a:solidFill>
+                <a:srgbClr val="FFFF00"/>
+              </a:solidFill>
+            </a:endParaRPr>
+          </a:p>
+        </p:txBody>
+      </p:sp>
+      <p:sp>
+        <p:nvSpPr>
+          <p:cNvPr id="6" name="Content Placeholder 2"/>
+          <p:cNvSpPr>
+            <a:spLocks noGrp="1"/>
+          </p:cNvSpPr>
+          <p:nvPr>
+            <p:ph idx="1"/>
+          </p:nvPr>
+        </p:nvSpPr>
+        <p:spPr>
+          <a:xfrm>
+            <a:off x="8305013" y="5259729"/>
+            <a:ext cx="2391581" cy="500048"/>
+          </a:xfrm>
+        </p:spPr>
+        <p:txBody>
+          <a:bodyPr/>
+          <a:lstStyle/>
+          <a:p>
+            <a:pPr marL="0" indent="0" algn="r">
+              <a:buNone/>
+            </a:pPr>
+            <a:r>
+              <a:rPr lang="ru-RU" b="1" dirty="0" smtClean="0"/>
+              <a:t>Тиунов Геннадий</a:t>
+            </a:r>
+          </a:p>
+          <a:p>
+            <a:pPr marL="0" indent="0">
+              <a:buNone/>
+            </a:pPr>
+            <a:endParaRPr lang="ru-RU" dirty="0" smtClean="0"/>
+          </a:p>
+        </p:txBody>
+      </p:sp>
+    </p:spTree>
+    <p:extLst>
+      <p:ext uri="{BB962C8B-B14F-4D97-AF65-F5344CB8AC3E}">
+        <p14:creationId xmlns:p14="http://schemas.microsoft.com/office/powerpoint/2010/main" val="3712654356"/>
+      </p:ext>
+    </p:extLst>
+  </p:cSld>
+  <p:clrMapOvr>
+    <a:masterClrMapping/>
+  </p:clrMapOvr>
+  <p:timing>
+    <p:tnLst>
+      <p:par>
+        <p:cTn id="1" dur="indefinite" restart="never" nodeType="tmRoot"/>
+      </p:par>
+    </p:tnLst>
+  </p:timing>
+</p:sld>
+</file>
+
+<file path=ppt/slides/slide3.xml><?xml version="1.0" encoding="utf-8"?>
+<p:sld xmlns:a="http://schemas.openxmlformats.org/drawingml/2006/main" xmlns:r="http://schemas.openxmlformats.org/officeDocument/2006/relationships" xmlns:p="http://schemas.openxmlformats.org/presentationml/2006/main">
+  <p:cSld>
+    <p:spTree>
+      <p:nvGrpSpPr>
+        <p:cNvPr id="1" name=""/>
+        <p:cNvGrpSpPr/>
+        <p:nvPr/>
+      </p:nvGrpSpPr>
+      <p:grpSpPr>
+        <a:xfrm>
+          <a:off x="0" y="0"/>
+          <a:ext cx="0" cy="0"/>
+          <a:chOff x="0" y="0"/>
+          <a:chExt cx="0" cy="0"/>
+        </a:xfrm>
+      </p:grpSpPr>
+      <p:sp>
+        <p:nvSpPr>
+          <p:cNvPr id="2" name="Title 1"/>
+          <p:cNvSpPr>
+            <a:spLocks noGrp="1"/>
+          </p:cNvSpPr>
+          <p:nvPr>
+            <p:ph type="title"/>
+          </p:nvPr>
+        </p:nvSpPr>
+        <p:spPr/>
+        <p:txBody>
+          <a:bodyPr/>
+          <a:lstStyle/>
+          <a:p>
+            <a:r>
+              <a:rPr lang="ru-RU" dirty="0" smtClean="0">
+                <a:solidFill>
+                  <a:srgbClr val="FFFF00"/>
+                </a:solidFill>
+              </a:rPr>
+              <a:t>Основной бизнес-сценарий</a:t>
+            </a:r>
+            <a:endParaRPr lang="ru-RU" dirty="0">
+              <a:solidFill>
+                <a:srgbClr val="FFFF00"/>
+              </a:solidFill>
+            </a:endParaRPr>
+          </a:p>
+        </p:txBody>
+      </p:sp>
+      <p:sp>
+        <p:nvSpPr>
+          <p:cNvPr id="3" name="Content Placeholder 2"/>
+          <p:cNvSpPr>
+            <a:spLocks noGrp="1"/>
+          </p:cNvSpPr>
+          <p:nvPr>
+            <p:ph idx="1"/>
+          </p:nvPr>
+        </p:nvSpPr>
+        <p:spPr>
+          <a:xfrm>
+            <a:off x="1103312" y="1712422"/>
+            <a:ext cx="8946541" cy="4535977"/>
+          </a:xfrm>
+        </p:spPr>
+        <p:txBody>
+          <a:bodyPr>
+            <a:normAutofit lnSpcReduction="10000"/>
+          </a:bodyPr>
+          <a:lstStyle/>
+          <a:p>
+            <a:pPr marL="457200" indent="-457200">
+              <a:buFont typeface="+mj-lt"/>
+              <a:buAutoNum type="arabicPeriod"/>
+            </a:pPr>
+            <a:r>
+              <a:rPr lang="ru-RU" dirty="0" smtClean="0"/>
+              <a:t>Просмотр афиши (списка) представлений</a:t>
+            </a:r>
+          </a:p>
+          <a:p>
+            <a:pPr marL="457200" indent="-457200">
+              <a:buFont typeface="+mj-lt"/>
+              <a:buAutoNum type="arabicPeriod"/>
+            </a:pPr>
+            <a:r>
+              <a:rPr lang="ru-RU" dirty="0" smtClean="0"/>
+              <a:t>Просмотр подробностей о конкретном представлении</a:t>
+            </a:r>
+          </a:p>
+          <a:p>
+            <a:pPr marL="457200" indent="-457200">
+              <a:buFont typeface="+mj-lt"/>
+              <a:buAutoNum type="arabicPeriod"/>
+            </a:pPr>
+            <a:r>
+              <a:rPr lang="ru-RU" dirty="0" smtClean="0"/>
+              <a:t>Просмотр расписание сеансов на выбранное представление</a:t>
+            </a:r>
+          </a:p>
+          <a:p>
+            <a:pPr marL="457200" indent="-457200">
+              <a:buFont typeface="+mj-lt"/>
+              <a:buAutoNum type="arabicPeriod"/>
+            </a:pPr>
+            <a:r>
+              <a:rPr lang="ru-RU" dirty="0" smtClean="0"/>
+              <a:t>Просмотр доступных мест на выбранный сеанс</a:t>
+            </a:r>
+          </a:p>
+          <a:p>
+            <a:pPr marL="457200" indent="-457200">
+              <a:buFont typeface="+mj-lt"/>
+              <a:buAutoNum type="arabicPeriod"/>
+            </a:pPr>
+            <a:r>
+              <a:rPr lang="ru-RU" dirty="0" smtClean="0"/>
+              <a:t>Бронирование выбранных мест (оплата </a:t>
+            </a:r>
+            <a:r>
+              <a:rPr lang="ru-RU" dirty="0"/>
+              <a:t>с</a:t>
+            </a:r>
+            <a:r>
+              <a:rPr lang="ru-RU" dirty="0" smtClean="0"/>
+              <a:t>о счёта)</a:t>
+            </a:r>
+          </a:p>
+          <a:p>
+            <a:pPr marL="457200" indent="-457200">
+              <a:buFont typeface="+mj-lt"/>
+              <a:buAutoNum type="arabicPeriod"/>
+            </a:pPr>
+            <a:r>
+              <a:rPr lang="ru-RU" dirty="0" smtClean="0"/>
+              <a:t>Получение </a:t>
+            </a:r>
+            <a:r>
+              <a:rPr lang="en-US" dirty="0" smtClean="0"/>
+              <a:t>e-mail </a:t>
+            </a:r>
+            <a:r>
+              <a:rPr lang="ru-RU" dirty="0" smtClean="0"/>
+              <a:t>подтверждения бронирования</a:t>
+            </a:r>
+          </a:p>
+          <a:p>
+            <a:pPr marL="457200" indent="-457200">
+              <a:buFont typeface="+mj-lt"/>
+              <a:buAutoNum type="arabicPeriod"/>
+            </a:pPr>
+            <a:r>
+              <a:rPr lang="ru-RU" dirty="0" smtClean="0"/>
+              <a:t>Просмотр </a:t>
+            </a:r>
+            <a:r>
+              <a:rPr lang="ru-RU" dirty="0"/>
+              <a:t>информации о </a:t>
+            </a:r>
+            <a:r>
+              <a:rPr lang="ru-RU" dirty="0" smtClean="0"/>
+              <a:t>бронирования</a:t>
+            </a:r>
+          </a:p>
+          <a:p>
+            <a:pPr marL="457200" indent="-457200">
+              <a:buFont typeface="+mj-lt"/>
+              <a:buAutoNum type="arabicPeriod"/>
+            </a:pPr>
+            <a:r>
+              <a:rPr lang="ru-RU" dirty="0" smtClean="0"/>
+              <a:t>Отмена бронирования (возврат денег на счёт)</a:t>
+            </a:r>
+            <a:endParaRPr lang="ru-RU" dirty="0"/>
+          </a:p>
+          <a:p>
+            <a:pPr marL="457200" indent="-457200">
+              <a:buFont typeface="+mj-lt"/>
+              <a:buAutoNum type="arabicPeriod"/>
+            </a:pPr>
+            <a:endParaRPr lang="ru-RU" dirty="0" smtClean="0"/>
+          </a:p>
+          <a:p>
+            <a:pPr marL="0" indent="0">
+              <a:buNone/>
+            </a:pPr>
+            <a:r>
+              <a:rPr lang="ru-RU" dirty="0" smtClean="0"/>
+              <a:t>Предусловия</a:t>
+            </a:r>
+            <a:r>
+              <a:rPr lang="en-US" dirty="0" smtClean="0"/>
+              <a:t>: </a:t>
+            </a:r>
+            <a:r>
+              <a:rPr lang="ru-RU" dirty="0" smtClean="0"/>
+              <a:t>для совершения бронирования пользователь должен быть зарегистрирован и </a:t>
+            </a:r>
+            <a:r>
+              <a:rPr lang="ru-RU" dirty="0" err="1" smtClean="0"/>
+              <a:t>залогинен</a:t>
+            </a:r>
+            <a:r>
+              <a:rPr lang="en-US" dirty="0" smtClean="0"/>
+              <a:t> </a:t>
+            </a:r>
+            <a:r>
+              <a:rPr lang="ru-RU" dirty="0" smtClean="0"/>
+              <a:t>на сайте, на платёжном аккаунте должно быть достаточно средств.</a:t>
+            </a:r>
+            <a:endParaRPr lang="ru-RU" dirty="0"/>
+          </a:p>
+        </p:txBody>
+      </p:sp>
+    </p:spTree>
+    <p:extLst>
+      <p:ext uri="{BB962C8B-B14F-4D97-AF65-F5344CB8AC3E}">
+        <p14:creationId xmlns:p14="http://schemas.microsoft.com/office/powerpoint/2010/main" val="1401825894"/>
+      </p:ext>
+    </p:extLst>
+  </p:cSld>
+  <p:clrMapOvr>
+    <a:masterClrMapping/>
+  </p:clrMapOvr>
+</p:sld>
+</file>
+
+<file path=ppt/slides/slide4.xml><?xml version="1.0" encoding="utf-8"?>
+<p:sld xmlns:a="http://schemas.openxmlformats.org/drawingml/2006/main" xmlns:r="http://schemas.openxmlformats.org/officeDocument/2006/relationships" xmlns:p="http://schemas.openxmlformats.org/presentationml/2006/main">
+  <p:cSld>
+    <p:spTree>
+      <p:nvGrpSpPr>
+        <p:cNvPr id="1" name=""/>
+        <p:cNvGrpSpPr/>
+        <p:nvPr/>
+      </p:nvGrpSpPr>
+      <p:grpSpPr>
+        <a:xfrm>
+          <a:off x="0" y="0"/>
+          <a:ext cx="0" cy="0"/>
+          <a:chOff x="0" y="0"/>
+          <a:chExt cx="0" cy="0"/>
+        </a:xfrm>
+      </p:grpSpPr>
+      <p:sp>
+        <p:nvSpPr>
+          <p:cNvPr id="2" name="Title 1"/>
+          <p:cNvSpPr>
+            <a:spLocks noGrp="1"/>
+          </p:cNvSpPr>
+          <p:nvPr>
+            <p:ph type="title"/>
+          </p:nvPr>
+        </p:nvSpPr>
+        <p:spPr/>
+        <p:txBody>
+          <a:bodyPr/>
+          <a:lstStyle/>
+          <a:p>
+            <a:r>
+              <a:rPr lang="ru-RU" dirty="0" smtClean="0">
+                <a:solidFill>
+                  <a:srgbClr val="FFFF00"/>
+                </a:solidFill>
+              </a:rPr>
+              <a:t>Ограничения</a:t>
+            </a:r>
+            <a:endParaRPr lang="ru-RU" dirty="0">
+              <a:solidFill>
+                <a:srgbClr val="FFFF00"/>
+              </a:solidFill>
+            </a:endParaRPr>
+          </a:p>
+        </p:txBody>
+      </p:sp>
+      <p:sp>
+        <p:nvSpPr>
+          <p:cNvPr id="3" name="Content Placeholder 2"/>
+          <p:cNvSpPr>
+            <a:spLocks noGrp="1"/>
+          </p:cNvSpPr>
+          <p:nvPr>
+            <p:ph idx="1"/>
+          </p:nvPr>
+        </p:nvSpPr>
+        <p:spPr>
+          <a:xfrm>
+            <a:off x="789709" y="1421476"/>
+            <a:ext cx="10548851" cy="4826923"/>
+          </a:xfrm>
+        </p:spPr>
+        <p:txBody>
+          <a:bodyPr>
+            <a:normAutofit/>
+          </a:bodyPr>
+          <a:lstStyle/>
+          <a:p>
+            <a:r>
+              <a:rPr lang="ru-RU" dirty="0" smtClean="0"/>
+              <a:t>Пока система рассчитана для работу с единственной организацией (то есть объём данных небольшой и кэшировани</a:t>
+            </a:r>
+            <a:r>
+              <a:rPr lang="ru-RU" dirty="0"/>
+              <a:t>е</a:t>
+            </a:r>
+            <a:r>
+              <a:rPr lang="ru-RU" dirty="0" smtClean="0"/>
+              <a:t> </a:t>
+            </a:r>
+            <a:r>
+              <a:rPr lang="en-US" dirty="0" smtClean="0"/>
+              <a:t>/</a:t>
+            </a:r>
+            <a:r>
+              <a:rPr lang="ru-RU" dirty="0" smtClean="0"/>
+              <a:t> </a:t>
+            </a:r>
+            <a:r>
+              <a:rPr lang="ru-RU" dirty="0" err="1" smtClean="0"/>
+              <a:t>шардирование</a:t>
+            </a:r>
+            <a:r>
+              <a:rPr lang="ru-RU" dirty="0" smtClean="0"/>
+              <a:t> пока не реализовано)</a:t>
+            </a:r>
+          </a:p>
+          <a:p>
+            <a:r>
+              <a:rPr lang="ru-RU" dirty="0" smtClean="0"/>
+              <a:t>Управление контентом системы (представления, сеансы и т.д.) находится за рамками работы (контент</a:t>
+            </a:r>
+            <a:r>
+              <a:rPr lang="en-US" dirty="0" smtClean="0"/>
+              <a:t> </a:t>
+            </a:r>
+            <a:r>
+              <a:rPr lang="ru-RU" dirty="0" err="1" smtClean="0"/>
+              <a:t>предзаполнен</a:t>
+            </a:r>
+            <a:r>
+              <a:rPr lang="ru-RU" dirty="0" smtClean="0"/>
+              <a:t> </a:t>
+            </a:r>
+            <a:r>
+              <a:rPr lang="ru-RU" dirty="0"/>
+              <a:t>при инициализации</a:t>
+            </a:r>
+            <a:r>
+              <a:rPr lang="ru-RU" dirty="0" smtClean="0"/>
+              <a:t>)</a:t>
+            </a:r>
+          </a:p>
+          <a:p>
+            <a:r>
+              <a:rPr lang="ru-RU" dirty="0" smtClean="0"/>
+              <a:t>Из-за ограниченности ресурсов среды таблицы расположены в единой БД (но каждый сервис работает через собственный </a:t>
+            </a:r>
+            <a:r>
+              <a:rPr lang="en-US" dirty="0" smtClean="0"/>
+              <a:t>Connection String </a:t>
+            </a:r>
+            <a:r>
+              <a:rPr lang="ru-RU" dirty="0" smtClean="0"/>
+              <a:t>и знает только про свои таблицы )</a:t>
+            </a:r>
+          </a:p>
+          <a:p>
+            <a:r>
+              <a:rPr lang="ru-RU" dirty="0" smtClean="0"/>
+              <a:t>Нет мониторинга </a:t>
+            </a:r>
+            <a:r>
+              <a:rPr lang="en-US" dirty="0" smtClean="0"/>
+              <a:t>/</a:t>
+            </a:r>
+            <a:r>
+              <a:rPr lang="ru-RU" dirty="0" smtClean="0"/>
+              <a:t> </a:t>
+            </a:r>
+            <a:r>
+              <a:rPr lang="ru-RU" dirty="0" err="1" smtClean="0"/>
+              <a:t>алёртинга</a:t>
+            </a:r>
+            <a:r>
+              <a:rPr lang="ru-RU" dirty="0" smtClean="0"/>
+              <a:t> (но реализовывал в рамках ДЗ)</a:t>
+            </a:r>
+          </a:p>
+          <a:p>
+            <a:endParaRPr lang="ru-RU" dirty="0" smtClean="0"/>
+          </a:p>
+          <a:p>
+            <a:endParaRPr lang="ru-RU" dirty="0" smtClean="0"/>
+          </a:p>
+          <a:p>
+            <a:endParaRPr lang="ru-RU" dirty="0"/>
+          </a:p>
+        </p:txBody>
+      </p:sp>
+    </p:spTree>
+    <p:extLst>
+      <p:ext uri="{BB962C8B-B14F-4D97-AF65-F5344CB8AC3E}">
+        <p14:creationId xmlns:p14="http://schemas.microsoft.com/office/powerpoint/2010/main" val="854741282"/>
+      </p:ext>
+    </p:extLst>
+  </p:cSld>
+  <p:clrMapOvr>
+    <a:masterClrMapping/>
+  </p:clrMapOvr>
+</p:sld>
+</file>
+
+<file path=ppt/slides/slide5.xml><?xml version="1.0" encoding="utf-8"?>
+<p:sld xmlns:a="http://schemas.openxmlformats.org/drawingml/2006/main" xmlns:r="http://schemas.openxmlformats.org/officeDocument/2006/relationships" xmlns:p="http://schemas.openxmlformats.org/presentationml/2006/main">
+  <p:cSld>
+    <p:spTree>
+      <p:nvGrpSpPr>
+        <p:cNvPr id="1" name=""/>
+        <p:cNvGrpSpPr/>
+        <p:nvPr/>
+      </p:nvGrpSpPr>
+      <p:grpSpPr>
+        <a:xfrm>
+          <a:off x="0" y="0"/>
+          <a:ext cx="0" cy="0"/>
+          <a:chOff x="0" y="0"/>
+          <a:chExt cx="0" cy="0"/>
+        </a:xfrm>
+      </p:grpSpPr>
+      <p:sp>
+        <p:nvSpPr>
+          <p:cNvPr id="2" name="Title 1"/>
+          <p:cNvSpPr>
+            <a:spLocks noGrp="1"/>
+          </p:cNvSpPr>
+          <p:nvPr>
+            <p:ph type="title"/>
+          </p:nvPr>
+        </p:nvSpPr>
+        <p:spPr>
+          <a:xfrm>
+            <a:off x="646111" y="452718"/>
+            <a:ext cx="9404723" cy="829327"/>
+          </a:xfrm>
+        </p:spPr>
+        <p:txBody>
+          <a:bodyPr/>
+          <a:lstStyle/>
+          <a:p>
+            <a:r>
+              <a:rPr lang="en-US" dirty="0" smtClean="0">
+                <a:solidFill>
+                  <a:srgbClr val="FFFF00"/>
+                </a:solidFill>
+              </a:rPr>
+              <a:t>Database</a:t>
+            </a:r>
+            <a:endParaRPr lang="ru-RU" dirty="0">
+              <a:solidFill>
+                <a:srgbClr val="FFFF00"/>
+              </a:solidFill>
+            </a:endParaRPr>
+          </a:p>
+        </p:txBody>
+      </p:sp>
+      <p:pic>
+        <p:nvPicPr>
+          <p:cNvPr id="7" name="Content Placeholder 6"/>
+          <p:cNvPicPr>
+            <a:picLocks noGrp="1" noChangeAspect="1"/>
+          </p:cNvPicPr>
+          <p:nvPr>
+            <p:ph idx="1"/>
+          </p:nvPr>
+        </p:nvPicPr>
+        <p:blipFill>
+          <a:blip r:embed="rId2">
+            <a:extLst>
+              <a:ext uri="{28A0092B-C50C-407E-A947-70E740481C1C}">
+                <a14:useLocalDpi xmlns:a14="http://schemas.microsoft.com/office/drawing/2010/main" val="0"/>
+              </a:ext>
+            </a:extLst>
+          </a:blip>
+          <a:stretch>
+            <a:fillRect/>
+          </a:stretch>
+        </p:blipFill>
+        <p:spPr>
+          <a:xfrm>
+            <a:off x="4206241" y="1734802"/>
+            <a:ext cx="2759824" cy="4799212"/>
           </a:xfrm>
         </p:spPr>
       </p:pic>
@@ -7905,6 +8066,676 @@
       </p:par>
     </p:tnLst>
   </p:timing>
+</p:sld>
+</file>
+
+<file path=ppt/slides/slide6.xml><?xml version="1.0" encoding="utf-8"?>
+<p:sld xmlns:a="http://schemas.openxmlformats.org/drawingml/2006/main" xmlns:r="http://schemas.openxmlformats.org/officeDocument/2006/relationships" xmlns:p="http://schemas.openxmlformats.org/presentationml/2006/main">
+  <p:cSld>
+    <p:spTree>
+      <p:nvGrpSpPr>
+        <p:cNvPr id="1" name=""/>
+        <p:cNvGrpSpPr/>
+        <p:nvPr/>
+      </p:nvGrpSpPr>
+      <p:grpSpPr>
+        <a:xfrm>
+          <a:off x="0" y="0"/>
+          <a:ext cx="0" cy="0"/>
+          <a:chOff x="0" y="0"/>
+          <a:chExt cx="0" cy="0"/>
+        </a:xfrm>
+      </p:grpSpPr>
+      <p:sp>
+        <p:nvSpPr>
+          <p:cNvPr id="2" name="Title 1"/>
+          <p:cNvSpPr>
+            <a:spLocks noGrp="1"/>
+          </p:cNvSpPr>
+          <p:nvPr>
+            <p:ph type="title"/>
+          </p:nvPr>
+        </p:nvSpPr>
+        <p:spPr/>
+        <p:txBody>
+          <a:bodyPr/>
+          <a:lstStyle/>
+          <a:p>
+            <a:r>
+              <a:rPr lang="ru-RU" dirty="0" smtClean="0">
+                <a:solidFill>
+                  <a:srgbClr val="FFFF00"/>
+                </a:solidFill>
+              </a:rPr>
+              <a:t>Технологии и компоненты</a:t>
+            </a:r>
+            <a:endParaRPr lang="ru-RU" dirty="0">
+              <a:solidFill>
+                <a:srgbClr val="FFFF00"/>
+              </a:solidFill>
+            </a:endParaRPr>
+          </a:p>
+        </p:txBody>
+      </p:sp>
+      <p:sp>
+        <p:nvSpPr>
+          <p:cNvPr id="3" name="Content Placeholder 2"/>
+          <p:cNvSpPr>
+            <a:spLocks noGrp="1"/>
+          </p:cNvSpPr>
+          <p:nvPr>
+            <p:ph idx="1"/>
+          </p:nvPr>
+        </p:nvSpPr>
+        <p:spPr>
+          <a:xfrm>
+            <a:off x="1103312" y="1512916"/>
+            <a:ext cx="8946541" cy="4735483"/>
+          </a:xfrm>
+        </p:spPr>
+        <p:txBody>
+          <a:bodyPr>
+            <a:normAutofit/>
+          </a:bodyPr>
+          <a:lstStyle/>
+          <a:p>
+            <a:r>
+              <a:rPr lang="en-US" dirty="0" smtClean="0"/>
+              <a:t>Framework: </a:t>
+            </a:r>
+            <a:r>
+              <a:rPr lang="en-US" dirty="0" err="1" smtClean="0"/>
+              <a:t>.Net</a:t>
+            </a:r>
+            <a:r>
+              <a:rPr lang="en-US" dirty="0" smtClean="0"/>
+              <a:t> Core 3.1</a:t>
+            </a:r>
+          </a:p>
+          <a:p>
+            <a:r>
+              <a:rPr lang="en-US" dirty="0" smtClean="0"/>
+              <a:t>DB</a:t>
+            </a:r>
+            <a:r>
+              <a:rPr lang="ru-RU" dirty="0" smtClean="0"/>
+              <a:t> – </a:t>
+            </a:r>
+            <a:r>
+              <a:rPr lang="en-US" dirty="0" smtClean="0"/>
+              <a:t>MS SQL (Express Edition)</a:t>
+            </a:r>
+          </a:p>
+          <a:p>
+            <a:r>
+              <a:rPr lang="en-US" dirty="0" smtClean="0"/>
+              <a:t>ORM: LINQ 2 DB</a:t>
+            </a:r>
+          </a:p>
+          <a:p>
+            <a:r>
+              <a:rPr lang="en-US" dirty="0" smtClean="0"/>
+              <a:t>Message Broker – Kafka (Confluent)</a:t>
+            </a:r>
+          </a:p>
+          <a:p>
+            <a:r>
+              <a:rPr lang="en-US" dirty="0" smtClean="0"/>
+              <a:t>Saga State Machine: </a:t>
+            </a:r>
+            <a:r>
+              <a:rPr lang="en-US" dirty="0" err="1" smtClean="0"/>
+              <a:t>MassTransit</a:t>
+            </a:r>
+            <a:r>
+              <a:rPr lang="en-US" dirty="0" smtClean="0"/>
+              <a:t> (</a:t>
+            </a:r>
+            <a:r>
+              <a:rPr lang="en-US" dirty="0" err="1" smtClean="0"/>
+              <a:t>Automatonymous</a:t>
+            </a:r>
+            <a:r>
+              <a:rPr lang="en-US" dirty="0" smtClean="0"/>
+              <a:t>)</a:t>
+            </a:r>
+          </a:p>
+          <a:p>
+            <a:r>
+              <a:rPr lang="en-US" dirty="0" smtClean="0"/>
+              <a:t>Kubernetes (Windows </a:t>
+            </a:r>
+            <a:r>
+              <a:rPr lang="en-US" dirty="0" err="1" smtClean="0"/>
+              <a:t>Minikube</a:t>
+            </a:r>
+            <a:r>
+              <a:rPr lang="en-US" dirty="0" smtClean="0"/>
+              <a:t>) / Docker</a:t>
+            </a:r>
+          </a:p>
+          <a:p>
+            <a:r>
+              <a:rPr lang="en-US" dirty="0" smtClean="0"/>
+              <a:t>Helm</a:t>
+            </a:r>
+            <a:endParaRPr lang="ru-RU" dirty="0" smtClean="0"/>
+          </a:p>
+          <a:p>
+            <a:r>
+              <a:rPr lang="en-US" dirty="0" smtClean="0"/>
+              <a:t>Logging (</a:t>
+            </a:r>
+            <a:r>
+              <a:rPr lang="en-US" dirty="0" err="1" smtClean="0"/>
+              <a:t>Serilog</a:t>
+            </a:r>
+            <a:r>
+              <a:rPr lang="en-US" dirty="0" smtClean="0"/>
+              <a:t>)</a:t>
+            </a:r>
+          </a:p>
+          <a:p>
+            <a:r>
+              <a:rPr lang="en-US" dirty="0" err="1" smtClean="0"/>
+              <a:t>Automapper</a:t>
+            </a:r>
+            <a:endParaRPr lang="en-US" dirty="0" smtClean="0"/>
+          </a:p>
+          <a:p>
+            <a:r>
+              <a:rPr lang="en-US" dirty="0" smtClean="0"/>
+              <a:t>Front-end: Postman Collection</a:t>
+            </a:r>
+          </a:p>
+          <a:p>
+            <a:endParaRPr lang="en-US" dirty="0" smtClean="0"/>
+          </a:p>
+          <a:p>
+            <a:pPr marL="0" indent="0">
+              <a:buNone/>
+            </a:pPr>
+            <a:endParaRPr lang="en-US" dirty="0" smtClean="0"/>
+          </a:p>
+          <a:p>
+            <a:endParaRPr lang="ru-RU" dirty="0"/>
+          </a:p>
+        </p:txBody>
+      </p:sp>
+    </p:spTree>
+    <p:extLst>
+      <p:ext uri="{BB962C8B-B14F-4D97-AF65-F5344CB8AC3E}">
+        <p14:creationId xmlns:p14="http://schemas.microsoft.com/office/powerpoint/2010/main" val="1278317033"/>
+      </p:ext>
+    </p:extLst>
+  </p:cSld>
+  <p:clrMapOvr>
+    <a:masterClrMapping/>
+  </p:clrMapOvr>
+  <p:timing>
+    <p:tnLst>
+      <p:par>
+        <p:cTn id="1" dur="indefinite" restart="never" nodeType="tmRoot"/>
+      </p:par>
+    </p:tnLst>
+  </p:timing>
+</p:sld>
+</file>
+
+<file path=ppt/slides/slide7.xml><?xml version="1.0" encoding="utf-8"?>
+<p:sld xmlns:a="http://schemas.openxmlformats.org/drawingml/2006/main" xmlns:r="http://schemas.openxmlformats.org/officeDocument/2006/relationships" xmlns:p="http://schemas.openxmlformats.org/presentationml/2006/main">
+  <p:cSld>
+    <p:spTree>
+      <p:nvGrpSpPr>
+        <p:cNvPr id="1" name=""/>
+        <p:cNvGrpSpPr/>
+        <p:nvPr/>
+      </p:nvGrpSpPr>
+      <p:grpSpPr>
+        <a:xfrm>
+          <a:off x="0" y="0"/>
+          <a:ext cx="0" cy="0"/>
+          <a:chOff x="0" y="0"/>
+          <a:chExt cx="0" cy="0"/>
+        </a:xfrm>
+      </p:grpSpPr>
+      <p:sp>
+        <p:nvSpPr>
+          <p:cNvPr id="2" name="Title 1"/>
+          <p:cNvSpPr>
+            <a:spLocks noGrp="1"/>
+          </p:cNvSpPr>
+          <p:nvPr>
+            <p:ph type="title"/>
+          </p:nvPr>
+        </p:nvSpPr>
+        <p:spPr/>
+        <p:txBody>
+          <a:bodyPr/>
+          <a:lstStyle/>
+          <a:p>
+            <a:r>
+              <a:rPr lang="ru-RU" dirty="0" smtClean="0">
+                <a:solidFill>
+                  <a:srgbClr val="FFFF00"/>
+                </a:solidFill>
+              </a:rPr>
+              <a:t>Паттерны и подходы</a:t>
+            </a:r>
+            <a:endParaRPr lang="ru-RU" dirty="0">
+              <a:solidFill>
+                <a:srgbClr val="FFFF00"/>
+              </a:solidFill>
+            </a:endParaRPr>
+          </a:p>
+        </p:txBody>
+      </p:sp>
+      <p:sp>
+        <p:nvSpPr>
+          <p:cNvPr id="3" name="Content Placeholder 2"/>
+          <p:cNvSpPr>
+            <a:spLocks noGrp="1"/>
+          </p:cNvSpPr>
+          <p:nvPr>
+            <p:ph idx="1"/>
+          </p:nvPr>
+        </p:nvSpPr>
+        <p:spPr>
+          <a:xfrm>
+            <a:off x="1103312" y="1454728"/>
+            <a:ext cx="8946541" cy="4793672"/>
+          </a:xfrm>
+        </p:spPr>
+        <p:txBody>
+          <a:bodyPr/>
+          <a:lstStyle/>
+          <a:p>
+            <a:r>
+              <a:rPr lang="en-US" dirty="0" smtClean="0"/>
+              <a:t>API Gateway (Nginx)</a:t>
+            </a:r>
+          </a:p>
+          <a:p>
+            <a:r>
+              <a:rPr lang="en-US" dirty="0" smtClean="0"/>
+              <a:t>REST &amp; EDA</a:t>
+            </a:r>
+          </a:p>
+          <a:p>
+            <a:r>
+              <a:rPr lang="en-US" dirty="0"/>
+              <a:t>REST Endpoint Connectors</a:t>
+            </a:r>
+          </a:p>
+          <a:p>
+            <a:r>
+              <a:rPr lang="en-US" dirty="0" smtClean="0"/>
+              <a:t>S2S Authorization (X-Service-Token, GUID) for REST interaction</a:t>
+            </a:r>
+          </a:p>
+          <a:p>
+            <a:r>
+              <a:rPr lang="en-US" dirty="0" smtClean="0"/>
+              <a:t>Booking: </a:t>
+            </a:r>
+            <a:r>
+              <a:rPr lang="en-US" dirty="0" err="1" smtClean="0"/>
+              <a:t>idempotency</a:t>
+            </a:r>
+            <a:r>
+              <a:rPr lang="en-US" dirty="0" smtClean="0"/>
+              <a:t> keys (client generated natural key – Booking Id)</a:t>
+            </a:r>
+          </a:p>
+          <a:p>
+            <a:r>
+              <a:rPr lang="en-US" dirty="0" smtClean="0"/>
+              <a:t>Booking: concurrency resolution (available seat check) based on transactions with serializable isolation level</a:t>
+            </a:r>
+          </a:p>
+          <a:p>
+            <a:r>
+              <a:rPr lang="en-US" dirty="0" smtClean="0"/>
+              <a:t>Saga with orchestration</a:t>
+            </a:r>
+          </a:p>
+          <a:p>
+            <a:endParaRPr lang="en-US" dirty="0" smtClean="0"/>
+          </a:p>
+          <a:p>
+            <a:endParaRPr lang="en-US" dirty="0" smtClean="0"/>
+          </a:p>
+        </p:txBody>
+      </p:sp>
+    </p:spTree>
+    <p:extLst>
+      <p:ext uri="{BB962C8B-B14F-4D97-AF65-F5344CB8AC3E}">
+        <p14:creationId xmlns:p14="http://schemas.microsoft.com/office/powerpoint/2010/main" val="469862735"/>
+      </p:ext>
+    </p:extLst>
+  </p:cSld>
+  <p:clrMapOvr>
+    <a:masterClrMapping/>
+  </p:clrMapOvr>
+  <p:timing>
+    <p:tnLst>
+      <p:par>
+        <p:cTn id="1" dur="indefinite" restart="never" nodeType="tmRoot"/>
+      </p:par>
+    </p:tnLst>
+  </p:timing>
+</p:sld>
+</file>
+
+<file path=ppt/slides/slide8.xml><?xml version="1.0" encoding="utf-8"?>
+<p:sld xmlns:a="http://schemas.openxmlformats.org/drawingml/2006/main" xmlns:r="http://schemas.openxmlformats.org/officeDocument/2006/relationships" xmlns:p="http://schemas.openxmlformats.org/presentationml/2006/main">
+  <p:cSld>
+    <p:spTree>
+      <p:nvGrpSpPr>
+        <p:cNvPr id="1" name=""/>
+        <p:cNvGrpSpPr/>
+        <p:nvPr/>
+      </p:nvGrpSpPr>
+      <p:grpSpPr>
+        <a:xfrm>
+          <a:off x="0" y="0"/>
+          <a:ext cx="0" cy="0"/>
+          <a:chOff x="0" y="0"/>
+          <a:chExt cx="0" cy="0"/>
+        </a:xfrm>
+      </p:grpSpPr>
+      <p:sp>
+        <p:nvSpPr>
+          <p:cNvPr id="2" name="Title 1"/>
+          <p:cNvSpPr>
+            <a:spLocks noGrp="1"/>
+          </p:cNvSpPr>
+          <p:nvPr>
+            <p:ph type="title"/>
+          </p:nvPr>
+        </p:nvSpPr>
+        <p:spPr>
+          <a:xfrm>
+            <a:off x="646111" y="452718"/>
+            <a:ext cx="9404723" cy="829327"/>
+          </a:xfrm>
+        </p:spPr>
+        <p:txBody>
+          <a:bodyPr/>
+          <a:lstStyle/>
+          <a:p>
+            <a:r>
+              <a:rPr lang="en-US" dirty="0" smtClean="0">
+                <a:solidFill>
+                  <a:srgbClr val="FFFF00"/>
+                </a:solidFill>
+              </a:rPr>
+              <a:t>Service Interaction</a:t>
+            </a:r>
+            <a:endParaRPr lang="ru-RU" dirty="0">
+              <a:solidFill>
+                <a:srgbClr val="FFFF00"/>
+              </a:solidFill>
+            </a:endParaRPr>
+          </a:p>
+        </p:txBody>
+      </p:sp>
+      <p:pic>
+        <p:nvPicPr>
+          <p:cNvPr id="5" name="Content Placeholder 4"/>
+          <p:cNvPicPr>
+            <a:picLocks noGrp="1" noChangeAspect="1"/>
+          </p:cNvPicPr>
+          <p:nvPr>
+            <p:ph idx="1"/>
+          </p:nvPr>
+        </p:nvPicPr>
+        <p:blipFill>
+          <a:blip r:embed="rId2">
+            <a:extLst>
+              <a:ext uri="{28A0092B-C50C-407E-A947-70E740481C1C}">
+                <a14:useLocalDpi xmlns:a14="http://schemas.microsoft.com/office/drawing/2010/main" val="0"/>
+              </a:ext>
+            </a:extLst>
+          </a:blip>
+          <a:stretch>
+            <a:fillRect/>
+          </a:stretch>
+        </p:blipFill>
+        <p:spPr>
+          <a:xfrm>
+            <a:off x="2718262" y="1508093"/>
+            <a:ext cx="6675120" cy="5116219"/>
+          </a:xfrm>
+        </p:spPr>
+      </p:pic>
+    </p:spTree>
+    <p:extLst>
+      <p:ext uri="{BB962C8B-B14F-4D97-AF65-F5344CB8AC3E}">
+        <p14:creationId xmlns:p14="http://schemas.microsoft.com/office/powerpoint/2010/main" val="2468512826"/>
+      </p:ext>
+    </p:extLst>
+  </p:cSld>
+  <p:clrMapOvr>
+    <a:masterClrMapping/>
+  </p:clrMapOvr>
+  <p:timing>
+    <p:tnLst>
+      <p:par>
+        <p:cTn id="1" dur="indefinite" restart="never" nodeType="tmRoot"/>
+      </p:par>
+    </p:tnLst>
+  </p:timing>
+</p:sld>
+</file>
+
+<file path=ppt/slides/slide9.xml><?xml version="1.0" encoding="utf-8"?>
+<p:sld xmlns:a="http://schemas.openxmlformats.org/drawingml/2006/main" xmlns:r="http://schemas.openxmlformats.org/officeDocument/2006/relationships" xmlns:p="http://schemas.openxmlformats.org/presentationml/2006/main">
+  <p:cSld>
+    <p:spTree>
+      <p:nvGrpSpPr>
+        <p:cNvPr id="1" name=""/>
+        <p:cNvGrpSpPr/>
+        <p:nvPr/>
+      </p:nvGrpSpPr>
+      <p:grpSpPr>
+        <a:xfrm>
+          <a:off x="0" y="0"/>
+          <a:ext cx="0" cy="0"/>
+          <a:chOff x="0" y="0"/>
+          <a:chExt cx="0" cy="0"/>
+        </a:xfrm>
+      </p:grpSpPr>
+      <p:sp>
+        <p:nvSpPr>
+          <p:cNvPr id="2" name="Title 1"/>
+          <p:cNvSpPr>
+            <a:spLocks noGrp="1"/>
+          </p:cNvSpPr>
+          <p:nvPr>
+            <p:ph type="title"/>
+          </p:nvPr>
+        </p:nvSpPr>
+        <p:spPr/>
+        <p:txBody>
+          <a:bodyPr/>
+          <a:lstStyle/>
+          <a:p>
+            <a:r>
+              <a:rPr lang="en-US" dirty="0">
+                <a:solidFill>
+                  <a:srgbClr val="FFFF00"/>
+                </a:solidFill>
+              </a:rPr>
+              <a:t>API </a:t>
+            </a:r>
+            <a:r>
+              <a:rPr lang="en-US" dirty="0" smtClean="0">
+                <a:solidFill>
+                  <a:srgbClr val="FFFF00"/>
+                </a:solidFill>
+              </a:rPr>
+              <a:t>Gateway</a:t>
+            </a:r>
+            <a:r>
+              <a:rPr lang="ru-RU" dirty="0" smtClean="0">
+                <a:solidFill>
+                  <a:srgbClr val="FFFF00"/>
+                </a:solidFill>
+              </a:rPr>
+              <a:t> (</a:t>
+            </a:r>
+            <a:r>
+              <a:rPr lang="ru-RU" dirty="0">
+                <a:solidFill>
+                  <a:srgbClr val="FFFF00"/>
+                </a:solidFill>
+              </a:rPr>
+              <a:t>аутентификация </a:t>
+            </a:r>
+            <a:r>
+              <a:rPr lang="en-US" dirty="0" smtClean="0">
+                <a:solidFill>
+                  <a:srgbClr val="FFFF00"/>
+                </a:solidFill>
+              </a:rPr>
+              <a:t>/ </a:t>
+            </a:r>
+            <a:r>
+              <a:rPr lang="ru-RU" dirty="0" smtClean="0">
+                <a:solidFill>
+                  <a:srgbClr val="FFFF00"/>
+                </a:solidFill>
+              </a:rPr>
+              <a:t>авторизация)</a:t>
+            </a:r>
+            <a:endParaRPr lang="ru-RU" dirty="0"/>
+          </a:p>
+        </p:txBody>
+      </p:sp>
+      <p:sp>
+        <p:nvSpPr>
+          <p:cNvPr id="6" name="Content Placeholder 5"/>
+          <p:cNvSpPr>
+            <a:spLocks noGrp="1"/>
+          </p:cNvSpPr>
+          <p:nvPr>
+            <p:ph sz="quarter" idx="4"/>
+          </p:nvPr>
+        </p:nvSpPr>
+        <p:spPr>
+          <a:xfrm>
+            <a:off x="5654495" y="2111433"/>
+            <a:ext cx="4819541" cy="4144905"/>
+          </a:xfrm>
+        </p:spPr>
+        <p:txBody>
+          <a:bodyPr/>
+          <a:lstStyle/>
+          <a:p>
+            <a:r>
+              <a:rPr lang="ru-RU" dirty="0" smtClean="0"/>
+              <a:t>У некоторых сервисов есть открытая </a:t>
+            </a:r>
+            <a:r>
+              <a:rPr lang="en-US" dirty="0" smtClean="0"/>
+              <a:t>/</a:t>
+            </a:r>
+            <a:r>
+              <a:rPr lang="ru-RU" dirty="0" smtClean="0"/>
+              <a:t> публичная и закрытые части</a:t>
+            </a:r>
+            <a:r>
+              <a:rPr lang="en-US" dirty="0" smtClean="0"/>
+              <a:t>. </a:t>
+            </a:r>
+            <a:br>
+              <a:rPr lang="en-US" dirty="0" smtClean="0"/>
+            </a:br>
+            <a:r>
+              <a:rPr lang="ru-RU" dirty="0"/>
+              <a:t>Н</a:t>
+            </a:r>
+            <a:r>
+              <a:rPr lang="ru-RU" dirty="0" smtClean="0"/>
+              <a:t>апример, </a:t>
+            </a:r>
+            <a:r>
+              <a:rPr lang="en-US" dirty="0" smtClean="0"/>
+              <a:t>Booking Service </a:t>
+            </a:r>
+            <a:r>
+              <a:rPr lang="ru-RU" dirty="0" smtClean="0"/>
+              <a:t>(информация о доступных местах и собственно бронирование).</a:t>
+            </a:r>
+          </a:p>
+          <a:p>
+            <a:r>
+              <a:rPr lang="ru-RU" dirty="0"/>
+              <a:t>Единственная роль – конечный пользователь (администраторов и пр. нет</a:t>
+            </a:r>
+            <a:r>
+              <a:rPr lang="ru-RU" dirty="0" smtClean="0"/>
+              <a:t>)</a:t>
+            </a:r>
+            <a:endParaRPr lang="en-US" dirty="0" smtClean="0"/>
+          </a:p>
+          <a:p>
+            <a:r>
+              <a:rPr lang="ru-RU" dirty="0" smtClean="0"/>
+              <a:t>Пароль хранятся в открытом виде (в реальном проекте хранился бы подсолённый </a:t>
+            </a:r>
+            <a:r>
+              <a:rPr lang="ru-RU" dirty="0" err="1" smtClean="0"/>
+              <a:t>хэш</a:t>
+            </a:r>
+            <a:r>
+              <a:rPr lang="ru-RU" dirty="0" smtClean="0"/>
+              <a:t>)</a:t>
+            </a:r>
+            <a:endParaRPr lang="ru-RU" dirty="0"/>
+          </a:p>
+        </p:txBody>
+      </p:sp>
+      <p:pic>
+        <p:nvPicPr>
+          <p:cNvPr id="7" name="Content Placeholder 4"/>
+          <p:cNvPicPr>
+            <a:picLocks noGrp="1" noChangeAspect="1"/>
+          </p:cNvPicPr>
+          <p:nvPr>
+            <p:ph sz="half" idx="2"/>
+          </p:nvPr>
+        </p:nvPicPr>
+        <p:blipFill>
+          <a:blip r:embed="rId2">
+            <a:extLst>
+              <a:ext uri="{28A0092B-C50C-407E-A947-70E740481C1C}">
+                <a14:useLocalDpi xmlns:a14="http://schemas.microsoft.com/office/drawing/2010/main" val="0"/>
+              </a:ext>
+            </a:extLst>
+          </a:blip>
+          <a:stretch>
+            <a:fillRect/>
+          </a:stretch>
+        </p:blipFill>
+        <p:spPr>
+          <a:xfrm>
+            <a:off x="881150" y="2111433"/>
+            <a:ext cx="4123012" cy="4144905"/>
+          </a:xfrm>
+        </p:spPr>
+      </p:pic>
+    </p:spTree>
+    <p:extLst>
+      <p:ext uri="{BB962C8B-B14F-4D97-AF65-F5344CB8AC3E}">
+        <p14:creationId xmlns:p14="http://schemas.microsoft.com/office/powerpoint/2010/main" val="429011688"/>
+      </p:ext>
+    </p:extLst>
+  </p:cSld>
+  <p:clrMapOvr>
+    <a:masterClrMapping/>
+  </p:clrMapOvr>
 </p:sld>
 </file>
 

</xml_diff>